<commit_message>
feat: nestjs 01 added
</commit_message>
<xml_diff>
--- a/nestjs/nestjs-01.pptx
+++ b/nestjs/nestjs-01.pptx
@@ -5,7 +5,7 @@
     <p:sldMasterId id="2147483705" r:id="rId1"/>
   </p:sldMasterIdLst>
   <p:notesMasterIdLst>
-    <p:notesMasterId r:id="rId11"/>
+    <p:notesMasterId r:id="rId29"/>
   </p:notesMasterIdLst>
   <p:sldIdLst>
     <p:sldId id="259" r:id="rId2"/>
@@ -17,6 +17,24 @@
     <p:sldId id="300" r:id="rId8"/>
     <p:sldId id="301" r:id="rId9"/>
     <p:sldId id="302" r:id="rId10"/>
+    <p:sldId id="303" r:id="rId11"/>
+    <p:sldId id="304" r:id="rId12"/>
+    <p:sldId id="305" r:id="rId13"/>
+    <p:sldId id="306" r:id="rId14"/>
+    <p:sldId id="307" r:id="rId15"/>
+    <p:sldId id="308" r:id="rId16"/>
+    <p:sldId id="309" r:id="rId17"/>
+    <p:sldId id="310" r:id="rId18"/>
+    <p:sldId id="311" r:id="rId19"/>
+    <p:sldId id="312" r:id="rId20"/>
+    <p:sldId id="313" r:id="rId21"/>
+    <p:sldId id="314" r:id="rId22"/>
+    <p:sldId id="315" r:id="rId23"/>
+    <p:sldId id="316" r:id="rId24"/>
+    <p:sldId id="317" r:id="rId25"/>
+    <p:sldId id="318" r:id="rId26"/>
+    <p:sldId id="319" r:id="rId27"/>
+    <p:sldId id="320" r:id="rId28"/>
   </p:sldIdLst>
   <p:sldSz cx="12192000" cy="6858000"/>
   <p:notesSz cx="6858000" cy="9144000"/>
@@ -205,7 +223,7 @@
           <a:p>
             <a:fld id="{9B9ECB28-6A22-4037-9487-F3F739F744D6}" type="datetimeFigureOut">
               <a:rPr lang="en-US" smtClean="0"/>
-              <a:t>1/13/2022</a:t>
+              <a:t>1/17/2022</a:t>
             </a:fld>
             <a:endParaRPr lang="en-US"/>
           </a:p>
@@ -656,7 +674,7 @@
           <a:p>
             <a:fld id="{19B6F524-99F3-4BEA-ACD7-976EF4D36657}" type="datetime1">
               <a:rPr lang="en-US" smtClean="0"/>
-              <a:t>1/13/2022</a:t>
+              <a:t>1/17/2022</a:t>
             </a:fld>
             <a:endParaRPr lang="en-US" dirty="0"/>
           </a:p>
@@ -965,7 +983,7 @@
           <a:p>
             <a:fld id="{2145C3A9-05D9-428D-9788-A7F14838F6F9}" type="datetime1">
               <a:rPr lang="en-US" smtClean="0"/>
-              <a:t>1/13/2022</a:t>
+              <a:t>1/17/2022</a:t>
             </a:fld>
             <a:endParaRPr lang="en-US" dirty="0"/>
           </a:p>
@@ -1163,7 +1181,7 @@
           <a:p>
             <a:fld id="{82C701FB-B03E-4981-A9F8-99B474DD173A}" type="datetime1">
               <a:rPr lang="en-US" smtClean="0"/>
-              <a:t>1/13/2022</a:t>
+              <a:t>1/17/2022</a:t>
             </a:fld>
             <a:endParaRPr lang="en-US" dirty="0"/>
           </a:p>
@@ -1430,7 +1448,7 @@
           <a:p>
             <a:fld id="{7A7E8EF3-CBF7-4EB9-B6E5-3754574E3433}" type="datetime1">
               <a:rPr lang="en-US" smtClean="0"/>
-              <a:t>1/13/2022</a:t>
+              <a:t>1/17/2022</a:t>
             </a:fld>
             <a:endParaRPr lang="en-US" dirty="0"/>
           </a:p>
@@ -1870,7 +1888,7 @@
           <a:p>
             <a:fld id="{DA8A4A96-31AC-487C-9F15-1822D58542B7}" type="datetime1">
               <a:rPr lang="en-US" smtClean="0"/>
-              <a:t>1/13/2022</a:t>
+              <a:t>1/17/2022</a:t>
             </a:fld>
             <a:endParaRPr lang="en-US" dirty="0"/>
           </a:p>
@@ -2411,7 +2429,7 @@
           <a:p>
             <a:fld id="{FBBF9546-09C4-4F24-A284-5B81FF8659B4}" type="datetime1">
               <a:rPr lang="en-US" smtClean="0"/>
-              <a:t>1/13/2022</a:t>
+              <a:t>1/17/2022</a:t>
             </a:fld>
             <a:endParaRPr lang="en-US" dirty="0"/>
           </a:p>
@@ -3297,7 +3315,7 @@
           <a:p>
             <a:fld id="{5BF4405D-15A5-450B-B053-484859B9C8F7}" type="datetime1">
               <a:rPr lang="en-US" smtClean="0"/>
-              <a:t>1/13/2022</a:t>
+              <a:t>1/17/2022</a:t>
             </a:fld>
             <a:endParaRPr lang="en-US" dirty="0"/>
           </a:p>
@@ -3471,7 +3489,7 @@
           <a:p>
             <a:fld id="{E0366559-EC21-40C1-8A65-9A3B4EA78391}" type="datetime1">
               <a:rPr lang="en-US" smtClean="0"/>
-              <a:t>1/13/2022</a:t>
+              <a:t>1/17/2022</a:t>
             </a:fld>
             <a:endParaRPr lang="en-US" dirty="0"/>
           </a:p>
@@ -3659,7 +3677,7 @@
           <a:p>
             <a:fld id="{4F09CA92-695C-4FFA-8E37-4D2C288BCC04}" type="datetime1">
               <a:rPr lang="en-US" smtClean="0"/>
-              <a:t>1/13/2022</a:t>
+              <a:t>1/17/2022</a:t>
             </a:fld>
             <a:endParaRPr lang="en-US" dirty="0"/>
           </a:p>
@@ -3833,7 +3851,7 @@
           <a:p>
             <a:fld id="{CA551262-FC07-4FE4-9221-F72F7D4F209A}" type="datetime1">
               <a:rPr lang="en-US" smtClean="0"/>
-              <a:t>1/13/2022</a:t>
+              <a:t>1/17/2022</a:t>
             </a:fld>
             <a:endParaRPr lang="en-US" dirty="0"/>
           </a:p>
@@ -4081,7 +4099,7 @@
           <a:p>
             <a:fld id="{46A321E4-8899-4F7D-BEB1-BD52626ABD8D}" type="datetime1">
               <a:rPr lang="en-US" smtClean="0"/>
-              <a:t>1/13/2022</a:t>
+              <a:t>1/17/2022</a:t>
             </a:fld>
             <a:endParaRPr lang="en-US" dirty="0"/>
           </a:p>
@@ -4327,7 +4345,7 @@
           <a:p>
             <a:fld id="{B53F6DFA-8A0E-4513-867D-18B9AA66B23C}" type="datetime1">
               <a:rPr lang="en-US" smtClean="0"/>
-              <a:t>1/13/2022</a:t>
+              <a:t>1/17/2022</a:t>
             </a:fld>
             <a:endParaRPr lang="en-US" dirty="0"/>
           </a:p>
@@ -4814,7 +4832,7 @@
           <a:p>
             <a:fld id="{154283A7-B9AC-454B-A468-44B75A398B49}" type="datetime1">
               <a:rPr lang="en-US" smtClean="0"/>
-              <a:t>1/13/2022</a:t>
+              <a:t>1/17/2022</a:t>
             </a:fld>
             <a:endParaRPr lang="en-US" dirty="0"/>
           </a:p>
@@ -4936,7 +4954,7 @@
           <a:p>
             <a:fld id="{A3F8184D-DEDD-48A0-9ACA-5F6ED9EFE5B8}" type="datetime1">
               <a:rPr lang="en-US" smtClean="0"/>
-              <a:t>1/13/2022</a:t>
+              <a:t>1/17/2022</a:t>
             </a:fld>
             <a:endParaRPr lang="en-US" dirty="0"/>
           </a:p>
@@ -5035,7 +5053,7 @@
           <a:p>
             <a:fld id="{BF38AC0E-F520-48F3-BA14-8BAB82D735FB}" type="datetime1">
               <a:rPr lang="en-US" smtClean="0"/>
-              <a:t>1/13/2022</a:t>
+              <a:t>1/17/2022</a:t>
             </a:fld>
             <a:endParaRPr lang="en-US" dirty="0"/>
           </a:p>
@@ -5294,7 +5312,7 @@
           <a:p>
             <a:fld id="{317D0F2A-2724-4AD4-BF4C-A7B1910D9412}" type="datetime1">
               <a:rPr lang="en-US" smtClean="0"/>
-              <a:t>1/13/2022</a:t>
+              <a:t>1/17/2022</a:t>
             </a:fld>
             <a:endParaRPr lang="en-US" dirty="0"/>
           </a:p>
@@ -5605,7 +5623,7 @@
           <a:p>
             <a:fld id="{9A0B82A5-4A21-4F82-91DB-989CE997E82E}" type="datetime1">
               <a:rPr lang="en-US" smtClean="0"/>
-              <a:t>1/13/2022</a:t>
+              <a:t>1/17/2022</a:t>
             </a:fld>
             <a:endParaRPr lang="en-US" dirty="0"/>
           </a:p>
@@ -5842,7 +5860,7 @@
           <a:p>
             <a:fld id="{01BFEF8A-AE08-4951-B923-589F814B0C31}" type="datetime1">
               <a:rPr lang="en-US" smtClean="0"/>
-              <a:t>1/13/2022</a:t>
+              <a:t>1/17/2022</a:t>
             </a:fld>
             <a:endParaRPr lang="en-US" dirty="0"/>
           </a:p>
@@ -6678,6 +6696,2042 @@
 </p:sld>
 </file>
 
+<file path=ppt/slides/slide10.xml><?xml version="1.0" encoding="utf-8"?>
+<p:sld xmlns:a="http://schemas.openxmlformats.org/drawingml/2006/main" xmlns:r="http://schemas.openxmlformats.org/officeDocument/2006/relationships" xmlns:p="http://schemas.openxmlformats.org/presentationml/2006/main">
+  <p:cSld>
+    <p:spTree>
+      <p:nvGrpSpPr>
+        <p:cNvPr id="1" name=""/>
+        <p:cNvGrpSpPr/>
+        <p:nvPr/>
+      </p:nvGrpSpPr>
+      <p:grpSpPr>
+        <a:xfrm>
+          <a:off x="0" y="0"/>
+          <a:ext cx="0" cy="0"/>
+          <a:chOff x="0" y="0"/>
+          <a:chExt cx="0" cy="0"/>
+        </a:xfrm>
+      </p:grpSpPr>
+      <p:sp>
+        <p:nvSpPr>
+          <p:cNvPr id="2" name="Title 1">
+            <a:extLst>
+              <a:ext uri="{FF2B5EF4-FFF2-40B4-BE49-F238E27FC236}">
+                <a16:creationId xmlns:a16="http://schemas.microsoft.com/office/drawing/2014/main" id="{D3620152-29F5-45CB-BC9E-651CB850C13E}"/>
+              </a:ext>
+            </a:extLst>
+          </p:cNvPr>
+          <p:cNvSpPr>
+            <a:spLocks noGrp="1"/>
+          </p:cNvSpPr>
+          <p:nvPr>
+            <p:ph type="title"/>
+          </p:nvPr>
+        </p:nvSpPr>
+        <p:spPr/>
+        <p:txBody>
+          <a:bodyPr/>
+          <a:lstStyle/>
+          <a:p>
+            <a:r>
+              <a:rPr lang="en-US" dirty="0"/>
+              <a:t>What is Nest.js?</a:t>
+            </a:r>
+          </a:p>
+        </p:txBody>
+      </p:sp>
+      <p:sp>
+        <p:nvSpPr>
+          <p:cNvPr id="3" name="Content Placeholder 2">
+            <a:extLst>
+              <a:ext uri="{FF2B5EF4-FFF2-40B4-BE49-F238E27FC236}">
+                <a16:creationId xmlns:a16="http://schemas.microsoft.com/office/drawing/2014/main" id="{EBB8F926-A5BB-449A-94A6-BDE6DC2FB8E6}"/>
+              </a:ext>
+            </a:extLst>
+          </p:cNvPr>
+          <p:cNvSpPr>
+            <a:spLocks noGrp="1"/>
+          </p:cNvSpPr>
+          <p:nvPr>
+            <p:ph idx="1"/>
+          </p:nvPr>
+        </p:nvSpPr>
+        <p:spPr/>
+        <p:txBody>
+          <a:bodyPr>
+            <a:normAutofit lnSpcReduction="10000"/>
+          </a:bodyPr>
+          <a:lstStyle/>
+          <a:p>
+            <a:r>
+              <a:rPr lang="en-US" dirty="0"/>
+              <a:t>A progressive Node.js framework for building efficient, reliable and scalable server-side applications.</a:t>
+            </a:r>
+          </a:p>
+          <a:p>
+            <a:r>
+              <a:rPr lang="en-US" dirty="0">
+                <a:hlinkClick r:id="rId2"/>
+              </a:rPr>
+              <a:t>https://nestjs.com/</a:t>
+            </a:r>
+            <a:endParaRPr lang="en-US" dirty="0"/>
+          </a:p>
+          <a:p>
+            <a:r>
+              <a:rPr lang="en-US" dirty="0"/>
+              <a:t>Nest makes use of robust HTTP Server frameworks like </a:t>
+            </a:r>
+            <a:r>
+              <a:rPr lang="en-US" dirty="0">
+                <a:solidFill>
+                  <a:srgbClr val="00B050"/>
+                </a:solidFill>
+              </a:rPr>
+              <a:t>Express</a:t>
+            </a:r>
+            <a:r>
+              <a:rPr lang="en-US" dirty="0"/>
+              <a:t> (the default) and optionally can be configured to use </a:t>
+            </a:r>
+            <a:r>
+              <a:rPr lang="en-US" dirty="0" err="1"/>
+              <a:t>Fastify</a:t>
+            </a:r>
+            <a:r>
+              <a:rPr lang="en-US" dirty="0"/>
+              <a:t> as well!</a:t>
+            </a:r>
+          </a:p>
+          <a:p>
+            <a:r>
+              <a:rPr lang="en-US" dirty="0"/>
+              <a:t>Nest.js is effectively solve the Architecture problem in backend.</a:t>
+            </a:r>
+          </a:p>
+          <a:p>
+            <a:r>
+              <a:rPr lang="en-US" dirty="0"/>
+              <a:t>Nest provides an out-of-the-box application architecture which allows developers and teams to create highly testable, scalable, loosely coupled, and easily maintainable applications. The architecture is heavily inspired by </a:t>
+            </a:r>
+            <a:r>
+              <a:rPr lang="en-US" dirty="0">
+                <a:solidFill>
+                  <a:srgbClr val="00B050"/>
+                </a:solidFill>
+              </a:rPr>
+              <a:t>Angular</a:t>
+            </a:r>
+            <a:r>
+              <a:rPr lang="en-US" dirty="0"/>
+              <a:t>.</a:t>
+            </a:r>
+          </a:p>
+          <a:p>
+            <a:endParaRPr lang="en-US" dirty="0"/>
+          </a:p>
+          <a:p>
+            <a:endParaRPr lang="en-US" dirty="0"/>
+          </a:p>
+        </p:txBody>
+      </p:sp>
+      <p:sp>
+        <p:nvSpPr>
+          <p:cNvPr id="4" name="Footer Placeholder 3">
+            <a:extLst>
+              <a:ext uri="{FF2B5EF4-FFF2-40B4-BE49-F238E27FC236}">
+                <a16:creationId xmlns:a16="http://schemas.microsoft.com/office/drawing/2014/main" id="{3D25360E-56CE-4E5D-B206-0C8B82E3E5D1}"/>
+              </a:ext>
+            </a:extLst>
+          </p:cNvPr>
+          <p:cNvSpPr>
+            <a:spLocks noGrp="1"/>
+          </p:cNvSpPr>
+          <p:nvPr>
+            <p:ph type="ftr" sz="quarter" idx="11"/>
+          </p:nvPr>
+        </p:nvSpPr>
+        <p:spPr/>
+        <p:txBody>
+          <a:bodyPr/>
+          <a:lstStyle/>
+          <a:p>
+            <a:r>
+              <a:rPr lang="en-US"/>
+              <a:t>Nodejs Basics</a:t>
+            </a:r>
+            <a:endParaRPr lang="en-US" dirty="0"/>
+          </a:p>
+        </p:txBody>
+      </p:sp>
+      <p:sp>
+        <p:nvSpPr>
+          <p:cNvPr id="5" name="Slide Number Placeholder 4">
+            <a:extLst>
+              <a:ext uri="{FF2B5EF4-FFF2-40B4-BE49-F238E27FC236}">
+                <a16:creationId xmlns:a16="http://schemas.microsoft.com/office/drawing/2014/main" id="{FA865039-41CD-44B1-B0BE-1A18D73FA7D0}"/>
+              </a:ext>
+            </a:extLst>
+          </p:cNvPr>
+          <p:cNvSpPr>
+            <a:spLocks noGrp="1"/>
+          </p:cNvSpPr>
+          <p:nvPr>
+            <p:ph type="sldNum" sz="quarter" idx="12"/>
+          </p:nvPr>
+        </p:nvSpPr>
+        <p:spPr/>
+        <p:txBody>
+          <a:bodyPr/>
+          <a:lstStyle/>
+          <a:p>
+            <a:fld id="{3A98EE3D-8CD1-4C3F-BD1C-C98C9596463C}" type="slidenum">
+              <a:rPr lang="en-US" smtClean="0"/>
+              <a:t>10</a:t>
+            </a:fld>
+            <a:endParaRPr lang="en-US" dirty="0"/>
+          </a:p>
+        </p:txBody>
+      </p:sp>
+    </p:spTree>
+    <p:extLst>
+      <p:ext uri="{BB962C8B-B14F-4D97-AF65-F5344CB8AC3E}">
+        <p14:creationId xmlns:p14="http://schemas.microsoft.com/office/powerpoint/2010/main" val="211680475"/>
+      </p:ext>
+    </p:extLst>
+  </p:cSld>
+  <p:clrMapOvr>
+    <a:masterClrMapping/>
+  </p:clrMapOvr>
+</p:sld>
+</file>
+
+<file path=ppt/slides/slide11.xml><?xml version="1.0" encoding="utf-8"?>
+<p:sld xmlns:a="http://schemas.openxmlformats.org/drawingml/2006/main" xmlns:r="http://schemas.openxmlformats.org/officeDocument/2006/relationships" xmlns:p="http://schemas.openxmlformats.org/presentationml/2006/main">
+  <p:cSld>
+    <p:spTree>
+      <p:nvGrpSpPr>
+        <p:cNvPr id="1" name=""/>
+        <p:cNvGrpSpPr/>
+        <p:nvPr/>
+      </p:nvGrpSpPr>
+      <p:grpSpPr>
+        <a:xfrm>
+          <a:off x="0" y="0"/>
+          <a:ext cx="0" cy="0"/>
+          <a:chOff x="0" y="0"/>
+          <a:chExt cx="0" cy="0"/>
+        </a:xfrm>
+      </p:grpSpPr>
+      <p:sp>
+        <p:nvSpPr>
+          <p:cNvPr id="2" name="Title 1">
+            <a:extLst>
+              <a:ext uri="{FF2B5EF4-FFF2-40B4-BE49-F238E27FC236}">
+                <a16:creationId xmlns:a16="http://schemas.microsoft.com/office/drawing/2014/main" id="{CEC59CE1-314A-43D2-A086-386143C79099}"/>
+              </a:ext>
+            </a:extLst>
+          </p:cNvPr>
+          <p:cNvSpPr>
+            <a:spLocks noGrp="1"/>
+          </p:cNvSpPr>
+          <p:nvPr>
+            <p:ph type="title"/>
+          </p:nvPr>
+        </p:nvSpPr>
+        <p:spPr/>
+        <p:txBody>
+          <a:bodyPr/>
+          <a:lstStyle/>
+          <a:p>
+            <a:r>
+              <a:rPr lang="en-US" dirty="0"/>
+              <a:t>Demo</a:t>
+            </a:r>
+          </a:p>
+        </p:txBody>
+      </p:sp>
+      <p:sp>
+        <p:nvSpPr>
+          <p:cNvPr id="3" name="Content Placeholder 2">
+            <a:extLst>
+              <a:ext uri="{FF2B5EF4-FFF2-40B4-BE49-F238E27FC236}">
+                <a16:creationId xmlns:a16="http://schemas.microsoft.com/office/drawing/2014/main" id="{97D3585A-D803-408F-8ABB-4161FDCC3CFC}"/>
+              </a:ext>
+            </a:extLst>
+          </p:cNvPr>
+          <p:cNvSpPr>
+            <a:spLocks noGrp="1"/>
+          </p:cNvSpPr>
+          <p:nvPr>
+            <p:ph idx="1"/>
+          </p:nvPr>
+        </p:nvSpPr>
+        <p:spPr/>
+        <p:txBody>
+          <a:bodyPr/>
+          <a:lstStyle/>
+          <a:p>
+            <a:r>
+              <a:rPr lang="en-US" dirty="0"/>
+              <a:t>Install nest.js</a:t>
+            </a:r>
+          </a:p>
+          <a:p>
+            <a:pPr lvl="1"/>
+            <a:r>
+              <a:rPr lang="en-US" sz="1800" dirty="0" err="1">
+                <a:latin typeface="Consolas" panose="020B0609020204030204" pitchFamily="49" charset="0"/>
+              </a:rPr>
+              <a:t>npm</a:t>
+            </a:r>
+            <a:r>
+              <a:rPr lang="en-US" sz="1800" dirty="0">
+                <a:latin typeface="Consolas" panose="020B0609020204030204" pitchFamily="49" charset="0"/>
+              </a:rPr>
+              <a:t> </a:t>
+            </a:r>
+            <a:r>
+              <a:rPr lang="en-US" sz="1800" dirty="0" err="1">
+                <a:latin typeface="Consolas" panose="020B0609020204030204" pitchFamily="49" charset="0"/>
+              </a:rPr>
+              <a:t>i</a:t>
+            </a:r>
+            <a:r>
+              <a:rPr lang="en-US" sz="1800" dirty="0">
+                <a:latin typeface="Consolas" panose="020B0609020204030204" pitchFamily="49" charset="0"/>
+              </a:rPr>
+              <a:t> -g @nestjs/cli</a:t>
+            </a:r>
+          </a:p>
+          <a:p>
+            <a:pPr lvl="1"/>
+            <a:r>
+              <a:rPr lang="en-US" sz="1800" dirty="0">
+                <a:latin typeface="Consolas" panose="020B0609020204030204" pitchFamily="49" charset="0"/>
+              </a:rPr>
+              <a:t>nest new project-name</a:t>
+            </a:r>
+          </a:p>
+          <a:p>
+            <a:r>
+              <a:rPr lang="en-US" dirty="0"/>
+              <a:t>Remove unnecessary controllers and services</a:t>
+            </a:r>
+          </a:p>
+          <a:p>
+            <a:pPr lvl="1"/>
+            <a:r>
+              <a:rPr lang="en-US" dirty="0"/>
+              <a:t>app related controllers and services</a:t>
+            </a:r>
+          </a:p>
+          <a:p>
+            <a:r>
+              <a:rPr lang="en-US" dirty="0"/>
+              <a:t>Run application</a:t>
+            </a:r>
+          </a:p>
+          <a:p>
+            <a:pPr lvl="1"/>
+            <a:r>
+              <a:rPr lang="en-US" sz="1800" dirty="0">
+                <a:latin typeface="Consolas" panose="020B0609020204030204" pitchFamily="49" charset="0"/>
+              </a:rPr>
+              <a:t>nest start</a:t>
+            </a:r>
+          </a:p>
+          <a:p>
+            <a:pPr lvl="1"/>
+            <a:r>
+              <a:rPr lang="en-US" sz="1800" dirty="0">
+                <a:latin typeface="Consolas" panose="020B0609020204030204" pitchFamily="49" charset="0"/>
+              </a:rPr>
+              <a:t>nest start --watch</a:t>
+            </a:r>
+          </a:p>
+          <a:p>
+            <a:pPr lvl="1"/>
+            <a:endParaRPr lang="en-US" dirty="0"/>
+          </a:p>
+        </p:txBody>
+      </p:sp>
+      <p:sp>
+        <p:nvSpPr>
+          <p:cNvPr id="4" name="Footer Placeholder 3">
+            <a:extLst>
+              <a:ext uri="{FF2B5EF4-FFF2-40B4-BE49-F238E27FC236}">
+                <a16:creationId xmlns:a16="http://schemas.microsoft.com/office/drawing/2014/main" id="{3650E9E3-910E-4612-BB69-63339723C66B}"/>
+              </a:ext>
+            </a:extLst>
+          </p:cNvPr>
+          <p:cNvSpPr>
+            <a:spLocks noGrp="1"/>
+          </p:cNvSpPr>
+          <p:nvPr>
+            <p:ph type="ftr" sz="quarter" idx="11"/>
+          </p:nvPr>
+        </p:nvSpPr>
+        <p:spPr/>
+        <p:txBody>
+          <a:bodyPr/>
+          <a:lstStyle/>
+          <a:p>
+            <a:r>
+              <a:rPr lang="en-US"/>
+              <a:t>Nodejs Basics</a:t>
+            </a:r>
+            <a:endParaRPr lang="en-US" dirty="0"/>
+          </a:p>
+        </p:txBody>
+      </p:sp>
+      <p:sp>
+        <p:nvSpPr>
+          <p:cNvPr id="5" name="Slide Number Placeholder 4">
+            <a:extLst>
+              <a:ext uri="{FF2B5EF4-FFF2-40B4-BE49-F238E27FC236}">
+                <a16:creationId xmlns:a16="http://schemas.microsoft.com/office/drawing/2014/main" id="{77951953-AE28-49EB-A63A-1A5796569B68}"/>
+              </a:ext>
+            </a:extLst>
+          </p:cNvPr>
+          <p:cNvSpPr>
+            <a:spLocks noGrp="1"/>
+          </p:cNvSpPr>
+          <p:nvPr>
+            <p:ph type="sldNum" sz="quarter" idx="12"/>
+          </p:nvPr>
+        </p:nvSpPr>
+        <p:spPr/>
+        <p:txBody>
+          <a:bodyPr/>
+          <a:lstStyle/>
+          <a:p>
+            <a:fld id="{3A98EE3D-8CD1-4C3F-BD1C-C98C9596463C}" type="slidenum">
+              <a:rPr lang="en-US" smtClean="0"/>
+              <a:t>11</a:t>
+            </a:fld>
+            <a:endParaRPr lang="en-US" dirty="0"/>
+          </a:p>
+        </p:txBody>
+      </p:sp>
+    </p:spTree>
+    <p:extLst>
+      <p:ext uri="{BB962C8B-B14F-4D97-AF65-F5344CB8AC3E}">
+        <p14:creationId xmlns:p14="http://schemas.microsoft.com/office/powerpoint/2010/main" val="3808513728"/>
+      </p:ext>
+    </p:extLst>
+  </p:cSld>
+  <p:clrMapOvr>
+    <a:masterClrMapping/>
+  </p:clrMapOvr>
+</p:sld>
+</file>
+
+<file path=ppt/slides/slide12.xml><?xml version="1.0" encoding="utf-8"?>
+<p:sld xmlns:a="http://schemas.openxmlformats.org/drawingml/2006/main" xmlns:r="http://schemas.openxmlformats.org/officeDocument/2006/relationships" xmlns:p="http://schemas.openxmlformats.org/presentationml/2006/main">
+  <p:cSld>
+    <p:spTree>
+      <p:nvGrpSpPr>
+        <p:cNvPr id="1" name=""/>
+        <p:cNvGrpSpPr/>
+        <p:nvPr/>
+      </p:nvGrpSpPr>
+      <p:grpSpPr>
+        <a:xfrm>
+          <a:off x="0" y="0"/>
+          <a:ext cx="0" cy="0"/>
+          <a:chOff x="0" y="0"/>
+          <a:chExt cx="0" cy="0"/>
+        </a:xfrm>
+      </p:grpSpPr>
+      <p:sp>
+        <p:nvSpPr>
+          <p:cNvPr id="2" name="Title 1">
+            <a:extLst>
+              <a:ext uri="{FF2B5EF4-FFF2-40B4-BE49-F238E27FC236}">
+                <a16:creationId xmlns:a16="http://schemas.microsoft.com/office/drawing/2014/main" id="{B8BD42FA-2032-4C63-905C-217C4E3C02DC}"/>
+              </a:ext>
+            </a:extLst>
+          </p:cNvPr>
+          <p:cNvSpPr>
+            <a:spLocks noGrp="1"/>
+          </p:cNvSpPr>
+          <p:nvPr>
+            <p:ph type="title"/>
+          </p:nvPr>
+        </p:nvSpPr>
+        <p:spPr/>
+        <p:txBody>
+          <a:bodyPr/>
+          <a:lstStyle/>
+          <a:p>
+            <a:r>
+              <a:rPr lang="en-US" dirty="0"/>
+              <a:t>Demo</a:t>
+            </a:r>
+          </a:p>
+        </p:txBody>
+      </p:sp>
+      <p:sp>
+        <p:nvSpPr>
+          <p:cNvPr id="3" name="Content Placeholder 2">
+            <a:extLst>
+              <a:ext uri="{FF2B5EF4-FFF2-40B4-BE49-F238E27FC236}">
+                <a16:creationId xmlns:a16="http://schemas.microsoft.com/office/drawing/2014/main" id="{17870891-7F06-4153-9700-7E4F30D4C17C}"/>
+              </a:ext>
+            </a:extLst>
+          </p:cNvPr>
+          <p:cNvSpPr>
+            <a:spLocks noGrp="1"/>
+          </p:cNvSpPr>
+          <p:nvPr>
+            <p:ph idx="1"/>
+          </p:nvPr>
+        </p:nvSpPr>
+        <p:spPr/>
+        <p:txBody>
+          <a:bodyPr/>
+          <a:lstStyle/>
+          <a:p>
+            <a:r>
+              <a:rPr lang="en-US" dirty="0"/>
+              <a:t>Create controller</a:t>
+            </a:r>
+          </a:p>
+          <a:p>
+            <a:pPr lvl="1"/>
+            <a:r>
+              <a:rPr lang="en-US" dirty="0"/>
+              <a:t>Manual</a:t>
+            </a:r>
+          </a:p>
+          <a:p>
+            <a:pPr lvl="2"/>
+            <a:r>
+              <a:rPr lang="en-US" dirty="0"/>
+              <a:t>Create controller file</a:t>
+            </a:r>
+          </a:p>
+          <a:p>
+            <a:pPr lvl="2"/>
+            <a:r>
+              <a:rPr lang="en-US" dirty="0"/>
+              <a:t>Add to module</a:t>
+            </a:r>
+          </a:p>
+          <a:p>
+            <a:pPr lvl="2"/>
+            <a:r>
+              <a:rPr lang="en-US" dirty="0">
+                <a:latin typeface="Consolas" panose="020B0609020204030204" pitchFamily="49" charset="0"/>
+              </a:rPr>
+              <a:t>@nestjs/common</a:t>
+            </a:r>
+          </a:p>
+          <a:p>
+            <a:pPr lvl="1"/>
+            <a:r>
+              <a:rPr lang="en-US" dirty="0"/>
+              <a:t>Using CLI</a:t>
+            </a:r>
+          </a:p>
+          <a:p>
+            <a:pPr lvl="2"/>
+            <a:r>
+              <a:rPr lang="en-US" dirty="0">
+                <a:latin typeface="Consolas" panose="020B0609020204030204" pitchFamily="49" charset="0"/>
+              </a:rPr>
+              <a:t>nest generate controller</a:t>
+            </a:r>
+          </a:p>
+          <a:p>
+            <a:pPr lvl="3"/>
+            <a:r>
+              <a:rPr lang="en-US" sz="1800" dirty="0">
+                <a:latin typeface="Consolas" panose="020B0609020204030204" pitchFamily="49" charset="0"/>
+              </a:rPr>
+              <a:t>--no-spec</a:t>
+            </a:r>
+          </a:p>
+          <a:p>
+            <a:pPr lvl="2"/>
+            <a:r>
+              <a:rPr lang="en-US" dirty="0"/>
+              <a:t>How to Create inside folders?</a:t>
+            </a:r>
+          </a:p>
+          <a:p>
+            <a:pPr lvl="3"/>
+            <a:r>
+              <a:rPr lang="en-US" sz="1800" dirty="0">
+                <a:latin typeface="Consolas" panose="020B0609020204030204" pitchFamily="49" charset="0"/>
+              </a:rPr>
+              <a:t>--dry-run</a:t>
+            </a:r>
+          </a:p>
+        </p:txBody>
+      </p:sp>
+      <p:sp>
+        <p:nvSpPr>
+          <p:cNvPr id="4" name="Footer Placeholder 3">
+            <a:extLst>
+              <a:ext uri="{FF2B5EF4-FFF2-40B4-BE49-F238E27FC236}">
+                <a16:creationId xmlns:a16="http://schemas.microsoft.com/office/drawing/2014/main" id="{A44A6A22-2BD6-482D-8101-EC6CEDBE212F}"/>
+              </a:ext>
+            </a:extLst>
+          </p:cNvPr>
+          <p:cNvSpPr>
+            <a:spLocks noGrp="1"/>
+          </p:cNvSpPr>
+          <p:nvPr>
+            <p:ph type="ftr" sz="quarter" idx="11"/>
+          </p:nvPr>
+        </p:nvSpPr>
+        <p:spPr/>
+        <p:txBody>
+          <a:bodyPr/>
+          <a:lstStyle/>
+          <a:p>
+            <a:r>
+              <a:rPr lang="en-US"/>
+              <a:t>Nodejs Basics</a:t>
+            </a:r>
+            <a:endParaRPr lang="en-US" dirty="0"/>
+          </a:p>
+        </p:txBody>
+      </p:sp>
+      <p:sp>
+        <p:nvSpPr>
+          <p:cNvPr id="5" name="Slide Number Placeholder 4">
+            <a:extLst>
+              <a:ext uri="{FF2B5EF4-FFF2-40B4-BE49-F238E27FC236}">
+                <a16:creationId xmlns:a16="http://schemas.microsoft.com/office/drawing/2014/main" id="{ED192603-06A4-4F97-9D0D-F18CF0CCDC17}"/>
+              </a:ext>
+            </a:extLst>
+          </p:cNvPr>
+          <p:cNvSpPr>
+            <a:spLocks noGrp="1"/>
+          </p:cNvSpPr>
+          <p:nvPr>
+            <p:ph type="sldNum" sz="quarter" idx="12"/>
+          </p:nvPr>
+        </p:nvSpPr>
+        <p:spPr/>
+        <p:txBody>
+          <a:bodyPr/>
+          <a:lstStyle/>
+          <a:p>
+            <a:fld id="{3A98EE3D-8CD1-4C3F-BD1C-C98C9596463C}" type="slidenum">
+              <a:rPr lang="en-US" smtClean="0"/>
+              <a:t>12</a:t>
+            </a:fld>
+            <a:endParaRPr lang="en-US" dirty="0"/>
+          </a:p>
+        </p:txBody>
+      </p:sp>
+    </p:spTree>
+    <p:extLst>
+      <p:ext uri="{BB962C8B-B14F-4D97-AF65-F5344CB8AC3E}">
+        <p14:creationId xmlns:p14="http://schemas.microsoft.com/office/powerpoint/2010/main" val="2931356992"/>
+      </p:ext>
+    </p:extLst>
+  </p:cSld>
+  <p:clrMapOvr>
+    <a:masterClrMapping/>
+  </p:clrMapOvr>
+</p:sld>
+</file>
+
+<file path=ppt/slides/slide13.xml><?xml version="1.0" encoding="utf-8"?>
+<p:sld xmlns:a="http://schemas.openxmlformats.org/drawingml/2006/main" xmlns:r="http://schemas.openxmlformats.org/officeDocument/2006/relationships" xmlns:p="http://schemas.openxmlformats.org/presentationml/2006/main">
+  <p:cSld>
+    <p:spTree>
+      <p:nvGrpSpPr>
+        <p:cNvPr id="1" name=""/>
+        <p:cNvGrpSpPr/>
+        <p:nvPr/>
+      </p:nvGrpSpPr>
+      <p:grpSpPr>
+        <a:xfrm>
+          <a:off x="0" y="0"/>
+          <a:ext cx="0" cy="0"/>
+          <a:chOff x="0" y="0"/>
+          <a:chExt cx="0" cy="0"/>
+        </a:xfrm>
+      </p:grpSpPr>
+      <p:sp>
+        <p:nvSpPr>
+          <p:cNvPr id="2" name="Title 1">
+            <a:extLst>
+              <a:ext uri="{FF2B5EF4-FFF2-40B4-BE49-F238E27FC236}">
+                <a16:creationId xmlns:a16="http://schemas.microsoft.com/office/drawing/2014/main" id="{98B5AF20-9773-49B5-8833-10D94738B647}"/>
+              </a:ext>
+            </a:extLst>
+          </p:cNvPr>
+          <p:cNvSpPr>
+            <a:spLocks noGrp="1"/>
+          </p:cNvSpPr>
+          <p:nvPr>
+            <p:ph type="title"/>
+          </p:nvPr>
+        </p:nvSpPr>
+        <p:spPr/>
+        <p:txBody>
+          <a:bodyPr/>
+          <a:lstStyle/>
+          <a:p>
+            <a:r>
+              <a:rPr lang="en-US" dirty="0"/>
+              <a:t>Demo</a:t>
+            </a:r>
+          </a:p>
+        </p:txBody>
+      </p:sp>
+      <p:sp>
+        <p:nvSpPr>
+          <p:cNvPr id="3" name="Content Placeholder 2">
+            <a:extLst>
+              <a:ext uri="{FF2B5EF4-FFF2-40B4-BE49-F238E27FC236}">
+                <a16:creationId xmlns:a16="http://schemas.microsoft.com/office/drawing/2014/main" id="{38E1D740-F264-496A-9E22-FD6679DA240C}"/>
+              </a:ext>
+            </a:extLst>
+          </p:cNvPr>
+          <p:cNvSpPr>
+            <a:spLocks noGrp="1"/>
+          </p:cNvSpPr>
+          <p:nvPr>
+            <p:ph idx="1"/>
+          </p:nvPr>
+        </p:nvSpPr>
+        <p:spPr/>
+        <p:txBody>
+          <a:bodyPr/>
+          <a:lstStyle/>
+          <a:p>
+            <a:r>
+              <a:rPr lang="en-US" dirty="0"/>
+              <a:t>Params</a:t>
+            </a:r>
+          </a:p>
+          <a:p>
+            <a:pPr lvl="1"/>
+            <a:r>
+              <a:rPr lang="en-US" sz="1800" dirty="0">
+                <a:latin typeface="Consolas" panose="020B0609020204030204" pitchFamily="49" charset="0"/>
+              </a:rPr>
+              <a:t>@Param()</a:t>
+            </a:r>
+          </a:p>
+          <a:p>
+            <a:pPr lvl="2"/>
+            <a:r>
+              <a:rPr lang="en-US" dirty="0"/>
+              <a:t>All request parameters</a:t>
+            </a:r>
+          </a:p>
+          <a:p>
+            <a:pPr lvl="1"/>
+            <a:r>
+              <a:rPr lang="en-US" sz="1800" dirty="0">
+                <a:latin typeface="Consolas" panose="020B0609020204030204" pitchFamily="49" charset="0"/>
+              </a:rPr>
+              <a:t>@Param(‘id’)</a:t>
+            </a:r>
+          </a:p>
+          <a:p>
+            <a:pPr lvl="2"/>
+            <a:r>
+              <a:rPr lang="en-US" dirty="0"/>
+              <a:t>Just the one we want</a:t>
+            </a:r>
+          </a:p>
+          <a:p>
+            <a:pPr lvl="1"/>
+            <a:endParaRPr lang="en-US" dirty="0"/>
+          </a:p>
+        </p:txBody>
+      </p:sp>
+      <p:sp>
+        <p:nvSpPr>
+          <p:cNvPr id="4" name="Footer Placeholder 3">
+            <a:extLst>
+              <a:ext uri="{FF2B5EF4-FFF2-40B4-BE49-F238E27FC236}">
+                <a16:creationId xmlns:a16="http://schemas.microsoft.com/office/drawing/2014/main" id="{469FDEE7-63E5-4CA6-8C92-4A486D40E1CC}"/>
+              </a:ext>
+            </a:extLst>
+          </p:cNvPr>
+          <p:cNvSpPr>
+            <a:spLocks noGrp="1"/>
+          </p:cNvSpPr>
+          <p:nvPr>
+            <p:ph type="ftr" sz="quarter" idx="11"/>
+          </p:nvPr>
+        </p:nvSpPr>
+        <p:spPr/>
+        <p:txBody>
+          <a:bodyPr/>
+          <a:lstStyle/>
+          <a:p>
+            <a:r>
+              <a:rPr lang="en-US"/>
+              <a:t>Nodejs Basics</a:t>
+            </a:r>
+            <a:endParaRPr lang="en-US" dirty="0"/>
+          </a:p>
+        </p:txBody>
+      </p:sp>
+      <p:sp>
+        <p:nvSpPr>
+          <p:cNvPr id="5" name="Slide Number Placeholder 4">
+            <a:extLst>
+              <a:ext uri="{FF2B5EF4-FFF2-40B4-BE49-F238E27FC236}">
+                <a16:creationId xmlns:a16="http://schemas.microsoft.com/office/drawing/2014/main" id="{96B18B88-54BB-45F3-B8D1-D5B12A171055}"/>
+              </a:ext>
+            </a:extLst>
+          </p:cNvPr>
+          <p:cNvSpPr>
+            <a:spLocks noGrp="1"/>
+          </p:cNvSpPr>
+          <p:nvPr>
+            <p:ph type="sldNum" sz="quarter" idx="12"/>
+          </p:nvPr>
+        </p:nvSpPr>
+        <p:spPr/>
+        <p:txBody>
+          <a:bodyPr/>
+          <a:lstStyle/>
+          <a:p>
+            <a:fld id="{3A98EE3D-8CD1-4C3F-BD1C-C98C9596463C}" type="slidenum">
+              <a:rPr lang="en-US" smtClean="0"/>
+              <a:t>13</a:t>
+            </a:fld>
+            <a:endParaRPr lang="en-US" dirty="0"/>
+          </a:p>
+        </p:txBody>
+      </p:sp>
+    </p:spTree>
+    <p:extLst>
+      <p:ext uri="{BB962C8B-B14F-4D97-AF65-F5344CB8AC3E}">
+        <p14:creationId xmlns:p14="http://schemas.microsoft.com/office/powerpoint/2010/main" val="2754988617"/>
+      </p:ext>
+    </p:extLst>
+  </p:cSld>
+  <p:clrMapOvr>
+    <a:masterClrMapping/>
+  </p:clrMapOvr>
+</p:sld>
+</file>
+
+<file path=ppt/slides/slide14.xml><?xml version="1.0" encoding="utf-8"?>
+<p:sld xmlns:a="http://schemas.openxmlformats.org/drawingml/2006/main" xmlns:r="http://schemas.openxmlformats.org/officeDocument/2006/relationships" xmlns:p="http://schemas.openxmlformats.org/presentationml/2006/main">
+  <p:cSld>
+    <p:spTree>
+      <p:nvGrpSpPr>
+        <p:cNvPr id="1" name=""/>
+        <p:cNvGrpSpPr/>
+        <p:nvPr/>
+      </p:nvGrpSpPr>
+      <p:grpSpPr>
+        <a:xfrm>
+          <a:off x="0" y="0"/>
+          <a:ext cx="0" cy="0"/>
+          <a:chOff x="0" y="0"/>
+          <a:chExt cx="0" cy="0"/>
+        </a:xfrm>
+      </p:grpSpPr>
+      <p:sp>
+        <p:nvSpPr>
+          <p:cNvPr id="2" name="Title 1">
+            <a:extLst>
+              <a:ext uri="{FF2B5EF4-FFF2-40B4-BE49-F238E27FC236}">
+                <a16:creationId xmlns:a16="http://schemas.microsoft.com/office/drawing/2014/main" id="{8AC66E60-DC0C-4788-A31D-39B45CA825B1}"/>
+              </a:ext>
+            </a:extLst>
+          </p:cNvPr>
+          <p:cNvSpPr>
+            <a:spLocks noGrp="1"/>
+          </p:cNvSpPr>
+          <p:nvPr>
+            <p:ph type="title"/>
+          </p:nvPr>
+        </p:nvSpPr>
+        <p:spPr/>
+        <p:txBody>
+          <a:bodyPr/>
+          <a:lstStyle/>
+          <a:p>
+            <a:r>
+              <a:rPr lang="en-US" dirty="0"/>
+              <a:t>Demo</a:t>
+            </a:r>
+          </a:p>
+        </p:txBody>
+      </p:sp>
+      <p:sp>
+        <p:nvSpPr>
+          <p:cNvPr id="3" name="Content Placeholder 2">
+            <a:extLst>
+              <a:ext uri="{FF2B5EF4-FFF2-40B4-BE49-F238E27FC236}">
+                <a16:creationId xmlns:a16="http://schemas.microsoft.com/office/drawing/2014/main" id="{2D2888DE-955B-48CB-AFFA-E0F0CC016B94}"/>
+              </a:ext>
+            </a:extLst>
+          </p:cNvPr>
+          <p:cNvSpPr>
+            <a:spLocks noGrp="1"/>
+          </p:cNvSpPr>
+          <p:nvPr>
+            <p:ph idx="1"/>
+          </p:nvPr>
+        </p:nvSpPr>
+        <p:spPr/>
+        <p:txBody>
+          <a:bodyPr/>
+          <a:lstStyle/>
+          <a:p>
+            <a:r>
+              <a:rPr lang="en-US" dirty="0"/>
+              <a:t>Body payloads</a:t>
+            </a:r>
+          </a:p>
+          <a:p>
+            <a:pPr lvl="1"/>
+            <a:r>
+              <a:rPr lang="en-US" sz="1800" dirty="0">
+                <a:latin typeface="Consolas" panose="020B0609020204030204" pitchFamily="49" charset="0"/>
+              </a:rPr>
+              <a:t>@Body()</a:t>
+            </a:r>
+          </a:p>
+          <a:p>
+            <a:pPr lvl="2"/>
+            <a:r>
+              <a:rPr lang="en-US" dirty="0"/>
+              <a:t>Get all the body</a:t>
+            </a:r>
+          </a:p>
+          <a:p>
+            <a:pPr lvl="1"/>
+            <a:r>
+              <a:rPr lang="en-US" sz="1800" dirty="0">
+                <a:latin typeface="Consolas" panose="020B0609020204030204" pitchFamily="49" charset="0"/>
+              </a:rPr>
+              <a:t>@body(‘name’)</a:t>
+            </a:r>
+          </a:p>
+          <a:p>
+            <a:pPr lvl="2"/>
+            <a:r>
+              <a:rPr lang="en-US" dirty="0"/>
+              <a:t>Just give the name part inside the object</a:t>
+            </a:r>
+          </a:p>
+        </p:txBody>
+      </p:sp>
+      <p:sp>
+        <p:nvSpPr>
+          <p:cNvPr id="4" name="Footer Placeholder 3">
+            <a:extLst>
+              <a:ext uri="{FF2B5EF4-FFF2-40B4-BE49-F238E27FC236}">
+                <a16:creationId xmlns:a16="http://schemas.microsoft.com/office/drawing/2014/main" id="{9098D532-FEC5-45BE-A354-537E4EC986E0}"/>
+              </a:ext>
+            </a:extLst>
+          </p:cNvPr>
+          <p:cNvSpPr>
+            <a:spLocks noGrp="1"/>
+          </p:cNvSpPr>
+          <p:nvPr>
+            <p:ph type="ftr" sz="quarter" idx="11"/>
+          </p:nvPr>
+        </p:nvSpPr>
+        <p:spPr/>
+        <p:txBody>
+          <a:bodyPr/>
+          <a:lstStyle/>
+          <a:p>
+            <a:r>
+              <a:rPr lang="en-US"/>
+              <a:t>Nodejs Basics</a:t>
+            </a:r>
+            <a:endParaRPr lang="en-US" dirty="0"/>
+          </a:p>
+        </p:txBody>
+      </p:sp>
+      <p:sp>
+        <p:nvSpPr>
+          <p:cNvPr id="5" name="Slide Number Placeholder 4">
+            <a:extLst>
+              <a:ext uri="{FF2B5EF4-FFF2-40B4-BE49-F238E27FC236}">
+                <a16:creationId xmlns:a16="http://schemas.microsoft.com/office/drawing/2014/main" id="{074D11BA-0B08-4494-B99B-843BBCD29D81}"/>
+              </a:ext>
+            </a:extLst>
+          </p:cNvPr>
+          <p:cNvSpPr>
+            <a:spLocks noGrp="1"/>
+          </p:cNvSpPr>
+          <p:nvPr>
+            <p:ph type="sldNum" sz="quarter" idx="12"/>
+          </p:nvPr>
+        </p:nvSpPr>
+        <p:spPr/>
+        <p:txBody>
+          <a:bodyPr/>
+          <a:lstStyle/>
+          <a:p>
+            <a:fld id="{3A98EE3D-8CD1-4C3F-BD1C-C98C9596463C}" type="slidenum">
+              <a:rPr lang="en-US" smtClean="0"/>
+              <a:t>14</a:t>
+            </a:fld>
+            <a:endParaRPr lang="en-US" dirty="0"/>
+          </a:p>
+        </p:txBody>
+      </p:sp>
+    </p:spTree>
+    <p:extLst>
+      <p:ext uri="{BB962C8B-B14F-4D97-AF65-F5344CB8AC3E}">
+        <p14:creationId xmlns:p14="http://schemas.microsoft.com/office/powerpoint/2010/main" val="3170555902"/>
+      </p:ext>
+    </p:extLst>
+  </p:cSld>
+  <p:clrMapOvr>
+    <a:masterClrMapping/>
+  </p:clrMapOvr>
+</p:sld>
+</file>
+
+<file path=ppt/slides/slide15.xml><?xml version="1.0" encoding="utf-8"?>
+<p:sld xmlns:a="http://schemas.openxmlformats.org/drawingml/2006/main" xmlns:r="http://schemas.openxmlformats.org/officeDocument/2006/relationships" xmlns:p="http://schemas.openxmlformats.org/presentationml/2006/main">
+  <p:cSld>
+    <p:spTree>
+      <p:nvGrpSpPr>
+        <p:cNvPr id="1" name=""/>
+        <p:cNvGrpSpPr/>
+        <p:nvPr/>
+      </p:nvGrpSpPr>
+      <p:grpSpPr>
+        <a:xfrm>
+          <a:off x="0" y="0"/>
+          <a:ext cx="0" cy="0"/>
+          <a:chOff x="0" y="0"/>
+          <a:chExt cx="0" cy="0"/>
+        </a:xfrm>
+      </p:grpSpPr>
+      <p:sp>
+        <p:nvSpPr>
+          <p:cNvPr id="2" name="Title 1">
+            <a:extLst>
+              <a:ext uri="{FF2B5EF4-FFF2-40B4-BE49-F238E27FC236}">
+                <a16:creationId xmlns:a16="http://schemas.microsoft.com/office/drawing/2014/main" id="{D0010650-2FD6-41A0-B7EC-9AE811849CB1}"/>
+              </a:ext>
+            </a:extLst>
+          </p:cNvPr>
+          <p:cNvSpPr>
+            <a:spLocks noGrp="1"/>
+          </p:cNvSpPr>
+          <p:nvPr>
+            <p:ph type="title"/>
+          </p:nvPr>
+        </p:nvSpPr>
+        <p:spPr/>
+        <p:txBody>
+          <a:bodyPr/>
+          <a:lstStyle/>
+          <a:p>
+            <a:r>
+              <a:rPr lang="en-US" dirty="0"/>
+              <a:t>Demo</a:t>
+            </a:r>
+          </a:p>
+        </p:txBody>
+      </p:sp>
+      <p:sp>
+        <p:nvSpPr>
+          <p:cNvPr id="3" name="Content Placeholder 2">
+            <a:extLst>
+              <a:ext uri="{FF2B5EF4-FFF2-40B4-BE49-F238E27FC236}">
+                <a16:creationId xmlns:a16="http://schemas.microsoft.com/office/drawing/2014/main" id="{63DB3BC8-8D6D-4E05-AA49-EA3108924DD2}"/>
+              </a:ext>
+            </a:extLst>
+          </p:cNvPr>
+          <p:cNvSpPr>
+            <a:spLocks noGrp="1"/>
+          </p:cNvSpPr>
+          <p:nvPr>
+            <p:ph idx="1"/>
+          </p:nvPr>
+        </p:nvSpPr>
+        <p:spPr/>
+        <p:txBody>
+          <a:bodyPr/>
+          <a:lstStyle/>
+          <a:p>
+            <a:r>
+              <a:rPr lang="en-US" dirty="0"/>
+              <a:t>Response status codes</a:t>
+            </a:r>
+          </a:p>
+          <a:p>
+            <a:pPr lvl="1"/>
+            <a:r>
+              <a:rPr lang="en-US" sz="1800" dirty="0">
+                <a:latin typeface="Consolas" panose="020B0609020204030204" pitchFamily="49" charset="0"/>
+              </a:rPr>
+              <a:t>@HttpCode()</a:t>
+            </a:r>
+          </a:p>
+          <a:p>
+            <a:pPr lvl="2"/>
+            <a:r>
+              <a:rPr lang="en-US" dirty="0"/>
+              <a:t>Deprecate a route: </a:t>
+            </a:r>
+            <a:r>
+              <a:rPr lang="en-US" dirty="0" err="1">
+                <a:latin typeface="Consolas" panose="020B0609020204030204" pitchFamily="49" charset="0"/>
+              </a:rPr>
+              <a:t>HttpStatus.GONE</a:t>
+            </a:r>
+            <a:endParaRPr lang="en-US" dirty="0">
+              <a:latin typeface="Consolas" panose="020B0609020204030204" pitchFamily="49" charset="0"/>
+            </a:endParaRPr>
+          </a:p>
+          <a:p>
+            <a:pPr lvl="1"/>
+            <a:r>
+              <a:rPr lang="en-US" dirty="0"/>
+              <a:t>How to access the response object?</a:t>
+            </a:r>
+          </a:p>
+          <a:p>
+            <a:pPr lvl="2"/>
+            <a:r>
+              <a:rPr lang="en-US" dirty="0">
+                <a:latin typeface="Consolas" panose="020B0609020204030204" pitchFamily="49" charset="0"/>
+              </a:rPr>
+              <a:t>@Res()</a:t>
+            </a:r>
+          </a:p>
+          <a:p>
+            <a:pPr lvl="3"/>
+            <a:r>
+              <a:rPr lang="en-US" dirty="0"/>
+              <a:t>I recommend to not use this decorator</a:t>
+            </a:r>
+          </a:p>
+          <a:p>
+            <a:pPr lvl="3"/>
+            <a:endParaRPr lang="en-US" dirty="0"/>
+          </a:p>
+        </p:txBody>
+      </p:sp>
+      <p:sp>
+        <p:nvSpPr>
+          <p:cNvPr id="4" name="Footer Placeholder 3">
+            <a:extLst>
+              <a:ext uri="{FF2B5EF4-FFF2-40B4-BE49-F238E27FC236}">
+                <a16:creationId xmlns:a16="http://schemas.microsoft.com/office/drawing/2014/main" id="{F15A8AA8-3F7C-4048-BE86-0FB6429B9EFB}"/>
+              </a:ext>
+            </a:extLst>
+          </p:cNvPr>
+          <p:cNvSpPr>
+            <a:spLocks noGrp="1"/>
+          </p:cNvSpPr>
+          <p:nvPr>
+            <p:ph type="ftr" sz="quarter" idx="11"/>
+          </p:nvPr>
+        </p:nvSpPr>
+        <p:spPr/>
+        <p:txBody>
+          <a:bodyPr/>
+          <a:lstStyle/>
+          <a:p>
+            <a:r>
+              <a:rPr lang="en-US"/>
+              <a:t>Nodejs Basics</a:t>
+            </a:r>
+            <a:endParaRPr lang="en-US" dirty="0"/>
+          </a:p>
+        </p:txBody>
+      </p:sp>
+      <p:sp>
+        <p:nvSpPr>
+          <p:cNvPr id="5" name="Slide Number Placeholder 4">
+            <a:extLst>
+              <a:ext uri="{FF2B5EF4-FFF2-40B4-BE49-F238E27FC236}">
+                <a16:creationId xmlns:a16="http://schemas.microsoft.com/office/drawing/2014/main" id="{FDCD72A4-27B4-4D1D-A197-3642FB2142D3}"/>
+              </a:ext>
+            </a:extLst>
+          </p:cNvPr>
+          <p:cNvSpPr>
+            <a:spLocks noGrp="1"/>
+          </p:cNvSpPr>
+          <p:nvPr>
+            <p:ph type="sldNum" sz="quarter" idx="12"/>
+          </p:nvPr>
+        </p:nvSpPr>
+        <p:spPr/>
+        <p:txBody>
+          <a:bodyPr/>
+          <a:lstStyle/>
+          <a:p>
+            <a:fld id="{3A98EE3D-8CD1-4C3F-BD1C-C98C9596463C}" type="slidenum">
+              <a:rPr lang="en-US" smtClean="0"/>
+              <a:t>15</a:t>
+            </a:fld>
+            <a:endParaRPr lang="en-US" dirty="0"/>
+          </a:p>
+        </p:txBody>
+      </p:sp>
+    </p:spTree>
+    <p:extLst>
+      <p:ext uri="{BB962C8B-B14F-4D97-AF65-F5344CB8AC3E}">
+        <p14:creationId xmlns:p14="http://schemas.microsoft.com/office/powerpoint/2010/main" val="522304914"/>
+      </p:ext>
+    </p:extLst>
+  </p:cSld>
+  <p:clrMapOvr>
+    <a:masterClrMapping/>
+  </p:clrMapOvr>
+</p:sld>
+</file>
+
+<file path=ppt/slides/slide16.xml><?xml version="1.0" encoding="utf-8"?>
+<p:sld xmlns:a="http://schemas.openxmlformats.org/drawingml/2006/main" xmlns:r="http://schemas.openxmlformats.org/officeDocument/2006/relationships" xmlns:p="http://schemas.openxmlformats.org/presentationml/2006/main">
+  <p:cSld>
+    <p:spTree>
+      <p:nvGrpSpPr>
+        <p:cNvPr id="1" name=""/>
+        <p:cNvGrpSpPr/>
+        <p:nvPr/>
+      </p:nvGrpSpPr>
+      <p:grpSpPr>
+        <a:xfrm>
+          <a:off x="0" y="0"/>
+          <a:ext cx="0" cy="0"/>
+          <a:chOff x="0" y="0"/>
+          <a:chExt cx="0" cy="0"/>
+        </a:xfrm>
+      </p:grpSpPr>
+      <p:sp>
+        <p:nvSpPr>
+          <p:cNvPr id="2" name="Title 1">
+            <a:extLst>
+              <a:ext uri="{FF2B5EF4-FFF2-40B4-BE49-F238E27FC236}">
+                <a16:creationId xmlns:a16="http://schemas.microsoft.com/office/drawing/2014/main" id="{BB6EB3C9-17C7-4205-AE91-708270CC0CEB}"/>
+              </a:ext>
+            </a:extLst>
+          </p:cNvPr>
+          <p:cNvSpPr>
+            <a:spLocks noGrp="1"/>
+          </p:cNvSpPr>
+          <p:nvPr>
+            <p:ph type="title"/>
+          </p:nvPr>
+        </p:nvSpPr>
+        <p:spPr/>
+        <p:txBody>
+          <a:bodyPr/>
+          <a:lstStyle/>
+          <a:p>
+            <a:r>
+              <a:rPr lang="en-US" dirty="0"/>
+              <a:t>Demo</a:t>
+            </a:r>
+          </a:p>
+        </p:txBody>
+      </p:sp>
+      <p:sp>
+        <p:nvSpPr>
+          <p:cNvPr id="3" name="Content Placeholder 2">
+            <a:extLst>
+              <a:ext uri="{FF2B5EF4-FFF2-40B4-BE49-F238E27FC236}">
+                <a16:creationId xmlns:a16="http://schemas.microsoft.com/office/drawing/2014/main" id="{C52186A7-3F94-41C4-AB9E-B3717C5C912B}"/>
+              </a:ext>
+            </a:extLst>
+          </p:cNvPr>
+          <p:cNvSpPr>
+            <a:spLocks noGrp="1"/>
+          </p:cNvSpPr>
+          <p:nvPr>
+            <p:ph idx="1"/>
+          </p:nvPr>
+        </p:nvSpPr>
+        <p:spPr/>
+        <p:txBody>
+          <a:bodyPr/>
+          <a:lstStyle/>
+          <a:p>
+            <a:r>
+              <a:rPr lang="en-US" dirty="0"/>
+              <a:t>Update</a:t>
+            </a:r>
+          </a:p>
+          <a:p>
+            <a:pPr lvl="1"/>
+            <a:r>
+              <a:rPr lang="en-US" sz="1800" dirty="0">
+                <a:latin typeface="Consolas" panose="020B0609020204030204" pitchFamily="49" charset="0"/>
+              </a:rPr>
+              <a:t>@Put</a:t>
+            </a:r>
+          </a:p>
+          <a:p>
+            <a:pPr lvl="2"/>
+            <a:r>
+              <a:rPr lang="en-US" dirty="0"/>
+              <a:t>Modifies a resource completely</a:t>
+            </a:r>
+          </a:p>
+          <a:p>
+            <a:pPr lvl="1"/>
+            <a:r>
+              <a:rPr lang="en-US" sz="1800" dirty="0">
+                <a:latin typeface="Consolas" panose="020B0609020204030204" pitchFamily="49" charset="0"/>
+              </a:rPr>
+              <a:t>@Patch</a:t>
+            </a:r>
+          </a:p>
+          <a:p>
+            <a:pPr lvl="2"/>
+            <a:r>
+              <a:rPr lang="en-US" dirty="0"/>
+              <a:t>Only modifies a resource partially</a:t>
+            </a:r>
+          </a:p>
+          <a:p>
+            <a:r>
+              <a:rPr lang="en-US" dirty="0"/>
+              <a:t>Delete</a:t>
+            </a:r>
+          </a:p>
+          <a:p>
+            <a:pPr lvl="1"/>
+            <a:r>
+              <a:rPr lang="en-US" sz="1800" dirty="0">
+                <a:latin typeface="Consolas" panose="020B0609020204030204" pitchFamily="49" charset="0"/>
+              </a:rPr>
+              <a:t>@Delete</a:t>
+            </a:r>
+          </a:p>
+        </p:txBody>
+      </p:sp>
+      <p:sp>
+        <p:nvSpPr>
+          <p:cNvPr id="4" name="Footer Placeholder 3">
+            <a:extLst>
+              <a:ext uri="{FF2B5EF4-FFF2-40B4-BE49-F238E27FC236}">
+                <a16:creationId xmlns:a16="http://schemas.microsoft.com/office/drawing/2014/main" id="{8BAC3D62-82EC-4A1D-ACD3-F128F3F44320}"/>
+              </a:ext>
+            </a:extLst>
+          </p:cNvPr>
+          <p:cNvSpPr>
+            <a:spLocks noGrp="1"/>
+          </p:cNvSpPr>
+          <p:nvPr>
+            <p:ph type="ftr" sz="quarter" idx="11"/>
+          </p:nvPr>
+        </p:nvSpPr>
+        <p:spPr/>
+        <p:txBody>
+          <a:bodyPr/>
+          <a:lstStyle/>
+          <a:p>
+            <a:r>
+              <a:rPr lang="en-US"/>
+              <a:t>Nodejs Basics</a:t>
+            </a:r>
+            <a:endParaRPr lang="en-US" dirty="0"/>
+          </a:p>
+        </p:txBody>
+      </p:sp>
+      <p:sp>
+        <p:nvSpPr>
+          <p:cNvPr id="5" name="Slide Number Placeholder 4">
+            <a:extLst>
+              <a:ext uri="{FF2B5EF4-FFF2-40B4-BE49-F238E27FC236}">
+                <a16:creationId xmlns:a16="http://schemas.microsoft.com/office/drawing/2014/main" id="{5849439D-3F84-48F9-A4A7-7AB27C599BC8}"/>
+              </a:ext>
+            </a:extLst>
+          </p:cNvPr>
+          <p:cNvSpPr>
+            <a:spLocks noGrp="1"/>
+          </p:cNvSpPr>
+          <p:nvPr>
+            <p:ph type="sldNum" sz="quarter" idx="12"/>
+          </p:nvPr>
+        </p:nvSpPr>
+        <p:spPr/>
+        <p:txBody>
+          <a:bodyPr/>
+          <a:lstStyle/>
+          <a:p>
+            <a:fld id="{3A98EE3D-8CD1-4C3F-BD1C-C98C9596463C}" type="slidenum">
+              <a:rPr lang="en-US" smtClean="0"/>
+              <a:t>16</a:t>
+            </a:fld>
+            <a:endParaRPr lang="en-US" dirty="0"/>
+          </a:p>
+        </p:txBody>
+      </p:sp>
+    </p:spTree>
+    <p:extLst>
+      <p:ext uri="{BB962C8B-B14F-4D97-AF65-F5344CB8AC3E}">
+        <p14:creationId xmlns:p14="http://schemas.microsoft.com/office/powerpoint/2010/main" val="3935214686"/>
+      </p:ext>
+    </p:extLst>
+  </p:cSld>
+  <p:clrMapOvr>
+    <a:masterClrMapping/>
+  </p:clrMapOvr>
+</p:sld>
+</file>
+
+<file path=ppt/slides/slide17.xml><?xml version="1.0" encoding="utf-8"?>
+<p:sld xmlns:a="http://schemas.openxmlformats.org/drawingml/2006/main" xmlns:r="http://schemas.openxmlformats.org/officeDocument/2006/relationships" xmlns:p="http://schemas.openxmlformats.org/presentationml/2006/main">
+  <p:cSld>
+    <p:spTree>
+      <p:nvGrpSpPr>
+        <p:cNvPr id="1" name=""/>
+        <p:cNvGrpSpPr/>
+        <p:nvPr/>
+      </p:nvGrpSpPr>
+      <p:grpSpPr>
+        <a:xfrm>
+          <a:off x="0" y="0"/>
+          <a:ext cx="0" cy="0"/>
+          <a:chOff x="0" y="0"/>
+          <a:chExt cx="0" cy="0"/>
+        </a:xfrm>
+      </p:grpSpPr>
+      <p:sp>
+        <p:nvSpPr>
+          <p:cNvPr id="2" name="Title 1">
+            <a:extLst>
+              <a:ext uri="{FF2B5EF4-FFF2-40B4-BE49-F238E27FC236}">
+                <a16:creationId xmlns:a16="http://schemas.microsoft.com/office/drawing/2014/main" id="{E13FA3A9-026E-4D34-8D99-37B7E094E4E6}"/>
+              </a:ext>
+            </a:extLst>
+          </p:cNvPr>
+          <p:cNvSpPr>
+            <a:spLocks noGrp="1"/>
+          </p:cNvSpPr>
+          <p:nvPr>
+            <p:ph type="title"/>
+          </p:nvPr>
+        </p:nvSpPr>
+        <p:spPr/>
+        <p:txBody>
+          <a:bodyPr/>
+          <a:lstStyle/>
+          <a:p>
+            <a:r>
+              <a:rPr lang="en-US" dirty="0"/>
+              <a:t>Demo</a:t>
+            </a:r>
+          </a:p>
+        </p:txBody>
+      </p:sp>
+      <p:sp>
+        <p:nvSpPr>
+          <p:cNvPr id="3" name="Content Placeholder 2">
+            <a:extLst>
+              <a:ext uri="{FF2B5EF4-FFF2-40B4-BE49-F238E27FC236}">
+                <a16:creationId xmlns:a16="http://schemas.microsoft.com/office/drawing/2014/main" id="{0A48BD8A-8842-4BFD-ABB0-977479978DB9}"/>
+              </a:ext>
+            </a:extLst>
+          </p:cNvPr>
+          <p:cNvSpPr>
+            <a:spLocks noGrp="1"/>
+          </p:cNvSpPr>
+          <p:nvPr>
+            <p:ph idx="1"/>
+          </p:nvPr>
+        </p:nvSpPr>
+        <p:spPr/>
+        <p:txBody>
+          <a:bodyPr/>
+          <a:lstStyle/>
+          <a:p>
+            <a:r>
+              <a:rPr lang="en-US" dirty="0"/>
+              <a:t>Pagination</a:t>
+            </a:r>
+          </a:p>
+          <a:p>
+            <a:pPr lvl="1"/>
+            <a:r>
+              <a:rPr lang="en-US" dirty="0"/>
+              <a:t>Query params</a:t>
+            </a:r>
+          </a:p>
+          <a:p>
+            <a:pPr lvl="1"/>
+            <a:r>
+              <a:rPr lang="en-US" sz="1800" dirty="0">
+                <a:latin typeface="Consolas" panose="020B0609020204030204" pitchFamily="49" charset="0"/>
+              </a:rPr>
+              <a:t>@Query()</a:t>
+            </a:r>
+          </a:p>
+          <a:p>
+            <a:pPr lvl="2"/>
+            <a:r>
+              <a:rPr lang="en-US" dirty="0"/>
+              <a:t>All queries</a:t>
+            </a:r>
+          </a:p>
+        </p:txBody>
+      </p:sp>
+      <p:sp>
+        <p:nvSpPr>
+          <p:cNvPr id="4" name="Footer Placeholder 3">
+            <a:extLst>
+              <a:ext uri="{FF2B5EF4-FFF2-40B4-BE49-F238E27FC236}">
+                <a16:creationId xmlns:a16="http://schemas.microsoft.com/office/drawing/2014/main" id="{2C31924C-48A9-4C90-BB09-52FF4BAC5384}"/>
+              </a:ext>
+            </a:extLst>
+          </p:cNvPr>
+          <p:cNvSpPr>
+            <a:spLocks noGrp="1"/>
+          </p:cNvSpPr>
+          <p:nvPr>
+            <p:ph type="ftr" sz="quarter" idx="11"/>
+          </p:nvPr>
+        </p:nvSpPr>
+        <p:spPr/>
+        <p:txBody>
+          <a:bodyPr/>
+          <a:lstStyle/>
+          <a:p>
+            <a:r>
+              <a:rPr lang="en-US"/>
+              <a:t>Nodejs Basics</a:t>
+            </a:r>
+            <a:endParaRPr lang="en-US" dirty="0"/>
+          </a:p>
+        </p:txBody>
+      </p:sp>
+      <p:sp>
+        <p:nvSpPr>
+          <p:cNvPr id="5" name="Slide Number Placeholder 4">
+            <a:extLst>
+              <a:ext uri="{FF2B5EF4-FFF2-40B4-BE49-F238E27FC236}">
+                <a16:creationId xmlns:a16="http://schemas.microsoft.com/office/drawing/2014/main" id="{EA80F0CC-31CE-4420-AAE5-6E6145202269}"/>
+              </a:ext>
+            </a:extLst>
+          </p:cNvPr>
+          <p:cNvSpPr>
+            <a:spLocks noGrp="1"/>
+          </p:cNvSpPr>
+          <p:nvPr>
+            <p:ph type="sldNum" sz="quarter" idx="12"/>
+          </p:nvPr>
+        </p:nvSpPr>
+        <p:spPr/>
+        <p:txBody>
+          <a:bodyPr/>
+          <a:lstStyle/>
+          <a:p>
+            <a:fld id="{3A98EE3D-8CD1-4C3F-BD1C-C98C9596463C}" type="slidenum">
+              <a:rPr lang="en-US" smtClean="0"/>
+              <a:t>17</a:t>
+            </a:fld>
+            <a:endParaRPr lang="en-US" dirty="0"/>
+          </a:p>
+        </p:txBody>
+      </p:sp>
+    </p:spTree>
+    <p:extLst>
+      <p:ext uri="{BB962C8B-B14F-4D97-AF65-F5344CB8AC3E}">
+        <p14:creationId xmlns:p14="http://schemas.microsoft.com/office/powerpoint/2010/main" val="1071654379"/>
+      </p:ext>
+    </p:extLst>
+  </p:cSld>
+  <p:clrMapOvr>
+    <a:masterClrMapping/>
+  </p:clrMapOvr>
+</p:sld>
+</file>
+
+<file path=ppt/slides/slide18.xml><?xml version="1.0" encoding="utf-8"?>
+<p:sld xmlns:a="http://schemas.openxmlformats.org/drawingml/2006/main" xmlns:r="http://schemas.openxmlformats.org/officeDocument/2006/relationships" xmlns:p="http://schemas.openxmlformats.org/presentationml/2006/main">
+  <p:cSld>
+    <p:spTree>
+      <p:nvGrpSpPr>
+        <p:cNvPr id="1" name=""/>
+        <p:cNvGrpSpPr/>
+        <p:nvPr/>
+      </p:nvGrpSpPr>
+      <p:grpSpPr>
+        <a:xfrm>
+          <a:off x="0" y="0"/>
+          <a:ext cx="0" cy="0"/>
+          <a:chOff x="0" y="0"/>
+          <a:chExt cx="0" cy="0"/>
+        </a:xfrm>
+      </p:grpSpPr>
+      <p:sp>
+        <p:nvSpPr>
+          <p:cNvPr id="2" name="Title 1">
+            <a:extLst>
+              <a:ext uri="{FF2B5EF4-FFF2-40B4-BE49-F238E27FC236}">
+                <a16:creationId xmlns:a16="http://schemas.microsoft.com/office/drawing/2014/main" id="{696C7D0C-1A2B-4385-8C03-B09B84AA30E1}"/>
+              </a:ext>
+            </a:extLst>
+          </p:cNvPr>
+          <p:cNvSpPr>
+            <a:spLocks noGrp="1"/>
+          </p:cNvSpPr>
+          <p:nvPr>
+            <p:ph type="title"/>
+          </p:nvPr>
+        </p:nvSpPr>
+        <p:spPr/>
+        <p:txBody>
+          <a:bodyPr/>
+          <a:lstStyle/>
+          <a:p>
+            <a:r>
+              <a:rPr lang="en-US" dirty="0"/>
+              <a:t>Demo</a:t>
+            </a:r>
+          </a:p>
+        </p:txBody>
+      </p:sp>
+      <p:sp>
+        <p:nvSpPr>
+          <p:cNvPr id="3" name="Content Placeholder 2">
+            <a:extLst>
+              <a:ext uri="{FF2B5EF4-FFF2-40B4-BE49-F238E27FC236}">
+                <a16:creationId xmlns:a16="http://schemas.microsoft.com/office/drawing/2014/main" id="{A280DD74-CB2B-427D-806D-C49C83149B96}"/>
+              </a:ext>
+            </a:extLst>
+          </p:cNvPr>
+          <p:cNvSpPr>
+            <a:spLocks noGrp="1"/>
+          </p:cNvSpPr>
+          <p:nvPr>
+            <p:ph idx="1"/>
+          </p:nvPr>
+        </p:nvSpPr>
+        <p:spPr/>
+        <p:txBody>
+          <a:bodyPr>
+            <a:normAutofit fontScale="92500" lnSpcReduction="10000"/>
+          </a:bodyPr>
+          <a:lstStyle/>
+          <a:p>
+            <a:r>
+              <a:rPr lang="en-US" dirty="0"/>
+              <a:t>Services</a:t>
+            </a:r>
+          </a:p>
+          <a:p>
+            <a:pPr lvl="1"/>
+            <a:r>
+              <a:rPr lang="en-US" dirty="0"/>
+              <a:t>Separate our business logic from controllers</a:t>
+            </a:r>
+          </a:p>
+          <a:p>
+            <a:pPr lvl="1"/>
+            <a:r>
+              <a:rPr lang="en-US" dirty="0"/>
+              <a:t>So our services are reusable inside other controllers</a:t>
+            </a:r>
+          </a:p>
+          <a:p>
+            <a:pPr lvl="1"/>
+            <a:r>
+              <a:rPr lang="en-US" sz="1900" dirty="0">
+                <a:latin typeface="Consolas" panose="020B0609020204030204" pitchFamily="49" charset="0"/>
+              </a:rPr>
+              <a:t>nest generate service</a:t>
+            </a:r>
+          </a:p>
+          <a:p>
+            <a:pPr lvl="2"/>
+            <a:r>
+              <a:rPr lang="en-US" sz="1900" dirty="0">
+                <a:latin typeface="Consolas" panose="020B0609020204030204" pitchFamily="49" charset="0"/>
+              </a:rPr>
+              <a:t>--no-spec</a:t>
+            </a:r>
+          </a:p>
+          <a:p>
+            <a:pPr lvl="2"/>
+            <a:r>
+              <a:rPr lang="en-US" sz="1900" dirty="0">
+                <a:latin typeface="Consolas" panose="020B0609020204030204" pitchFamily="49" charset="0"/>
+              </a:rPr>
+              <a:t>--dry-run</a:t>
+            </a:r>
+          </a:p>
+          <a:p>
+            <a:pPr lvl="1"/>
+            <a:r>
+              <a:rPr lang="en-US" dirty="0"/>
+              <a:t>Providers?????</a:t>
+            </a:r>
+          </a:p>
+          <a:p>
+            <a:pPr lvl="2"/>
+            <a:r>
+              <a:rPr lang="en-US" dirty="0"/>
+              <a:t>Inject dependencies</a:t>
+            </a:r>
+          </a:p>
+          <a:p>
+            <a:pPr lvl="2"/>
+            <a:r>
+              <a:rPr lang="en-US" dirty="0"/>
+              <a:t>Nest runtime system will control the di</a:t>
+            </a:r>
+          </a:p>
+          <a:p>
+            <a:pPr lvl="2"/>
+            <a:r>
+              <a:rPr lang="en-US" sz="1900" dirty="0">
+                <a:latin typeface="Consolas" panose="020B0609020204030204" pitchFamily="49" charset="0"/>
+              </a:rPr>
+              <a:t>@Injectable</a:t>
+            </a:r>
+          </a:p>
+          <a:p>
+            <a:pPr lvl="2"/>
+            <a:r>
+              <a:rPr lang="en-US" dirty="0"/>
+              <a:t>Where to inject them? Through constructor</a:t>
+            </a:r>
+          </a:p>
+          <a:p>
+            <a:pPr lvl="2"/>
+            <a:r>
+              <a:rPr lang="en-US" dirty="0"/>
+              <a:t>It’s better to define the class in constructor as </a:t>
+            </a:r>
+            <a:r>
+              <a:rPr lang="en-US" sz="1900" dirty="0" err="1">
+                <a:latin typeface="Consolas" panose="020B0609020204030204" pitchFamily="49" charset="0"/>
+              </a:rPr>
+              <a:t>readonly</a:t>
+            </a:r>
+            <a:endParaRPr lang="en-US" sz="1900" dirty="0">
+              <a:latin typeface="Consolas" panose="020B0609020204030204" pitchFamily="49" charset="0"/>
+            </a:endParaRPr>
+          </a:p>
+        </p:txBody>
+      </p:sp>
+      <p:sp>
+        <p:nvSpPr>
+          <p:cNvPr id="4" name="Footer Placeholder 3">
+            <a:extLst>
+              <a:ext uri="{FF2B5EF4-FFF2-40B4-BE49-F238E27FC236}">
+                <a16:creationId xmlns:a16="http://schemas.microsoft.com/office/drawing/2014/main" id="{21021A81-D833-4D36-9013-D1276A794367}"/>
+              </a:ext>
+            </a:extLst>
+          </p:cNvPr>
+          <p:cNvSpPr>
+            <a:spLocks noGrp="1"/>
+          </p:cNvSpPr>
+          <p:nvPr>
+            <p:ph type="ftr" sz="quarter" idx="11"/>
+          </p:nvPr>
+        </p:nvSpPr>
+        <p:spPr/>
+        <p:txBody>
+          <a:bodyPr/>
+          <a:lstStyle/>
+          <a:p>
+            <a:r>
+              <a:rPr lang="en-US"/>
+              <a:t>Nodejs Basics</a:t>
+            </a:r>
+            <a:endParaRPr lang="en-US" dirty="0"/>
+          </a:p>
+        </p:txBody>
+      </p:sp>
+      <p:sp>
+        <p:nvSpPr>
+          <p:cNvPr id="5" name="Slide Number Placeholder 4">
+            <a:extLst>
+              <a:ext uri="{FF2B5EF4-FFF2-40B4-BE49-F238E27FC236}">
+                <a16:creationId xmlns:a16="http://schemas.microsoft.com/office/drawing/2014/main" id="{F44E8C7D-B212-4D3F-9E32-4EA48EA4D4AF}"/>
+              </a:ext>
+            </a:extLst>
+          </p:cNvPr>
+          <p:cNvSpPr>
+            <a:spLocks noGrp="1"/>
+          </p:cNvSpPr>
+          <p:nvPr>
+            <p:ph type="sldNum" sz="quarter" idx="12"/>
+          </p:nvPr>
+        </p:nvSpPr>
+        <p:spPr/>
+        <p:txBody>
+          <a:bodyPr/>
+          <a:lstStyle/>
+          <a:p>
+            <a:fld id="{3A98EE3D-8CD1-4C3F-BD1C-C98C9596463C}" type="slidenum">
+              <a:rPr lang="en-US" smtClean="0"/>
+              <a:t>18</a:t>
+            </a:fld>
+            <a:endParaRPr lang="en-US" dirty="0"/>
+          </a:p>
+        </p:txBody>
+      </p:sp>
+    </p:spTree>
+    <p:extLst>
+      <p:ext uri="{BB962C8B-B14F-4D97-AF65-F5344CB8AC3E}">
+        <p14:creationId xmlns:p14="http://schemas.microsoft.com/office/powerpoint/2010/main" val="2295524350"/>
+      </p:ext>
+    </p:extLst>
+  </p:cSld>
+  <p:clrMapOvr>
+    <a:masterClrMapping/>
+  </p:clrMapOvr>
+</p:sld>
+</file>
+
+<file path=ppt/slides/slide19.xml><?xml version="1.0" encoding="utf-8"?>
+<p:sld xmlns:a="http://schemas.openxmlformats.org/drawingml/2006/main" xmlns:r="http://schemas.openxmlformats.org/officeDocument/2006/relationships" xmlns:p="http://schemas.openxmlformats.org/presentationml/2006/main">
+  <p:cSld>
+    <p:spTree>
+      <p:nvGrpSpPr>
+        <p:cNvPr id="1" name=""/>
+        <p:cNvGrpSpPr/>
+        <p:nvPr/>
+      </p:nvGrpSpPr>
+      <p:grpSpPr>
+        <a:xfrm>
+          <a:off x="0" y="0"/>
+          <a:ext cx="0" cy="0"/>
+          <a:chOff x="0" y="0"/>
+          <a:chExt cx="0" cy="0"/>
+        </a:xfrm>
+      </p:grpSpPr>
+      <p:sp>
+        <p:nvSpPr>
+          <p:cNvPr id="2" name="Title 1">
+            <a:extLst>
+              <a:ext uri="{FF2B5EF4-FFF2-40B4-BE49-F238E27FC236}">
+                <a16:creationId xmlns:a16="http://schemas.microsoft.com/office/drawing/2014/main" id="{2C432CAA-DD76-4D33-9E94-8E6572BB5263}"/>
+              </a:ext>
+            </a:extLst>
+          </p:cNvPr>
+          <p:cNvSpPr>
+            <a:spLocks noGrp="1"/>
+          </p:cNvSpPr>
+          <p:nvPr>
+            <p:ph type="title"/>
+          </p:nvPr>
+        </p:nvSpPr>
+        <p:spPr/>
+        <p:txBody>
+          <a:bodyPr/>
+          <a:lstStyle/>
+          <a:p>
+            <a:r>
+              <a:rPr lang="en-US" dirty="0"/>
+              <a:t>Demo</a:t>
+            </a:r>
+          </a:p>
+        </p:txBody>
+      </p:sp>
+      <p:sp>
+        <p:nvSpPr>
+          <p:cNvPr id="3" name="Content Placeholder 2">
+            <a:extLst>
+              <a:ext uri="{FF2B5EF4-FFF2-40B4-BE49-F238E27FC236}">
+                <a16:creationId xmlns:a16="http://schemas.microsoft.com/office/drawing/2014/main" id="{F371EC95-B1F9-488E-9576-1365AAA3B43C}"/>
+              </a:ext>
+            </a:extLst>
+          </p:cNvPr>
+          <p:cNvSpPr>
+            <a:spLocks noGrp="1"/>
+          </p:cNvSpPr>
+          <p:nvPr>
+            <p:ph idx="1"/>
+          </p:nvPr>
+        </p:nvSpPr>
+        <p:spPr/>
+        <p:txBody>
+          <a:bodyPr>
+            <a:normAutofit lnSpcReduction="10000"/>
+          </a:bodyPr>
+          <a:lstStyle/>
+          <a:p>
+            <a:r>
+              <a:rPr lang="en-US" dirty="0"/>
+              <a:t>Resolving the service is through it’s class name</a:t>
+            </a:r>
+          </a:p>
+          <a:p>
+            <a:r>
+              <a:rPr lang="en-US" dirty="0"/>
+              <a:t>Services are handle the business logic through database</a:t>
+            </a:r>
+          </a:p>
+          <a:p>
+            <a:r>
+              <a:rPr lang="en-US" dirty="0"/>
+              <a:t>Use an array as our </a:t>
+            </a:r>
+            <a:r>
+              <a:rPr lang="en-US" dirty="0" err="1"/>
+              <a:t>db</a:t>
+            </a:r>
+            <a:endParaRPr lang="en-US" dirty="0"/>
+          </a:p>
+          <a:p>
+            <a:pPr lvl="1"/>
+            <a:r>
+              <a:rPr lang="en-US" dirty="0"/>
+              <a:t>Entities folder for the shape of our resource (like the </a:t>
+            </a:r>
+            <a:r>
+              <a:rPr lang="en-US" dirty="0" err="1"/>
+              <a:t>typeorm</a:t>
+            </a:r>
+            <a:r>
+              <a:rPr lang="en-US" dirty="0"/>
+              <a:t>)</a:t>
+            </a:r>
+          </a:p>
+          <a:p>
+            <a:r>
+              <a:rPr lang="en-US" dirty="0"/>
+              <a:t>Write CRUD operation inside the service</a:t>
+            </a:r>
+          </a:p>
+          <a:p>
+            <a:pPr lvl="1"/>
+            <a:r>
+              <a:rPr lang="en-US" sz="1800" dirty="0" err="1">
+                <a:latin typeface="Consolas" panose="020B0609020204030204" pitchFamily="49" charset="0"/>
+              </a:rPr>
+              <a:t>findAll</a:t>
+            </a:r>
+            <a:endParaRPr lang="en-US" sz="1800" dirty="0">
+              <a:latin typeface="Consolas" panose="020B0609020204030204" pitchFamily="49" charset="0"/>
+            </a:endParaRPr>
+          </a:p>
+          <a:p>
+            <a:pPr lvl="1"/>
+            <a:r>
+              <a:rPr lang="en-US" sz="1800" dirty="0" err="1">
+                <a:latin typeface="Consolas" panose="020B0609020204030204" pitchFamily="49" charset="0"/>
+              </a:rPr>
+              <a:t>findOne</a:t>
+            </a:r>
+            <a:endParaRPr lang="en-US" sz="1800" dirty="0">
+              <a:latin typeface="Consolas" panose="020B0609020204030204" pitchFamily="49" charset="0"/>
+            </a:endParaRPr>
+          </a:p>
+          <a:p>
+            <a:pPr lvl="1"/>
+            <a:r>
+              <a:rPr lang="en-US" sz="1800" dirty="0">
+                <a:latin typeface="Consolas" panose="020B0609020204030204" pitchFamily="49" charset="0"/>
+              </a:rPr>
+              <a:t>create</a:t>
+            </a:r>
+          </a:p>
+          <a:p>
+            <a:pPr lvl="1"/>
+            <a:r>
+              <a:rPr lang="en-US" sz="1800" dirty="0">
+                <a:latin typeface="Consolas" panose="020B0609020204030204" pitchFamily="49" charset="0"/>
+              </a:rPr>
+              <a:t>update</a:t>
+            </a:r>
+          </a:p>
+          <a:p>
+            <a:pPr lvl="1"/>
+            <a:r>
+              <a:rPr lang="en-US" sz="1800" dirty="0">
+                <a:latin typeface="Consolas" panose="020B0609020204030204" pitchFamily="49" charset="0"/>
+              </a:rPr>
+              <a:t>remove</a:t>
+            </a:r>
+          </a:p>
+          <a:p>
+            <a:pPr lvl="1"/>
+            <a:endParaRPr lang="en-US" dirty="0"/>
+          </a:p>
+        </p:txBody>
+      </p:sp>
+      <p:sp>
+        <p:nvSpPr>
+          <p:cNvPr id="4" name="Footer Placeholder 3">
+            <a:extLst>
+              <a:ext uri="{FF2B5EF4-FFF2-40B4-BE49-F238E27FC236}">
+                <a16:creationId xmlns:a16="http://schemas.microsoft.com/office/drawing/2014/main" id="{4E45B0E3-3D62-4273-9A43-4AE775052F9D}"/>
+              </a:ext>
+            </a:extLst>
+          </p:cNvPr>
+          <p:cNvSpPr>
+            <a:spLocks noGrp="1"/>
+          </p:cNvSpPr>
+          <p:nvPr>
+            <p:ph type="ftr" sz="quarter" idx="11"/>
+          </p:nvPr>
+        </p:nvSpPr>
+        <p:spPr/>
+        <p:txBody>
+          <a:bodyPr/>
+          <a:lstStyle/>
+          <a:p>
+            <a:r>
+              <a:rPr lang="en-US"/>
+              <a:t>Nodejs Basics</a:t>
+            </a:r>
+            <a:endParaRPr lang="en-US" dirty="0"/>
+          </a:p>
+        </p:txBody>
+      </p:sp>
+      <p:sp>
+        <p:nvSpPr>
+          <p:cNvPr id="5" name="Slide Number Placeholder 4">
+            <a:extLst>
+              <a:ext uri="{FF2B5EF4-FFF2-40B4-BE49-F238E27FC236}">
+                <a16:creationId xmlns:a16="http://schemas.microsoft.com/office/drawing/2014/main" id="{073C68FA-B843-450A-B42A-898838C14777}"/>
+              </a:ext>
+            </a:extLst>
+          </p:cNvPr>
+          <p:cNvSpPr>
+            <a:spLocks noGrp="1"/>
+          </p:cNvSpPr>
+          <p:nvPr>
+            <p:ph type="sldNum" sz="quarter" idx="12"/>
+          </p:nvPr>
+        </p:nvSpPr>
+        <p:spPr/>
+        <p:txBody>
+          <a:bodyPr/>
+          <a:lstStyle/>
+          <a:p>
+            <a:fld id="{3A98EE3D-8CD1-4C3F-BD1C-C98C9596463C}" type="slidenum">
+              <a:rPr lang="en-US" smtClean="0"/>
+              <a:t>19</a:t>
+            </a:fld>
+            <a:endParaRPr lang="en-US" dirty="0"/>
+          </a:p>
+        </p:txBody>
+      </p:sp>
+    </p:spTree>
+    <p:extLst>
+      <p:ext uri="{BB962C8B-B14F-4D97-AF65-F5344CB8AC3E}">
+        <p14:creationId xmlns:p14="http://schemas.microsoft.com/office/powerpoint/2010/main" val="2440722974"/>
+      </p:ext>
+    </p:extLst>
+  </p:cSld>
+  <p:clrMapOvr>
+    <a:masterClrMapping/>
+  </p:clrMapOvr>
+</p:sld>
+</file>
+
 <file path=ppt/slides/slide2.xml><?xml version="1.0" encoding="utf-8"?>
 <p:sld xmlns:a="http://schemas.openxmlformats.org/drawingml/2006/main" xmlns:r="http://schemas.openxmlformats.org/officeDocument/2006/relationships" xmlns:p="http://schemas.openxmlformats.org/presentationml/2006/main">
   <p:cSld>
@@ -6749,9 +8803,7 @@
             <a:r>
               <a:rPr lang="en-US" dirty="0">
                 <a:solidFill>
-                  <a:schemeClr val="tx1">
-                    <a:lumMod val="50000"/>
-                  </a:schemeClr>
+                  <a:schemeClr val="tx1"/>
                 </a:solidFill>
               </a:rPr>
               <a:t>Getting Started</a:t>
@@ -6762,9 +8814,7 @@
             <a:r>
               <a:rPr lang="en-US" dirty="0">
                 <a:solidFill>
-                  <a:schemeClr val="tx1">
-                    <a:lumMod val="50000"/>
-                  </a:schemeClr>
+                  <a:schemeClr val="tx1"/>
                 </a:solidFill>
               </a:rPr>
               <a:t>Intro</a:t>
@@ -6775,9 +8825,7 @@
             <a:r>
               <a:rPr lang="en-US" dirty="0">
                 <a:solidFill>
-                  <a:schemeClr val="tx1">
-                    <a:lumMod val="50000"/>
-                  </a:schemeClr>
+                  <a:schemeClr val="tx1"/>
                 </a:solidFill>
               </a:rPr>
               <a:t>Install NestJS CLI</a:t>
@@ -6788,9 +8836,7 @@
             <a:r>
               <a:rPr lang="en-US" dirty="0">
                 <a:solidFill>
-                  <a:schemeClr val="tx1">
-                    <a:lumMod val="50000"/>
-                  </a:schemeClr>
+                  <a:schemeClr val="tx1"/>
                 </a:solidFill>
               </a:rPr>
               <a:t>Generate our first NestJS Application</a:t>
@@ -6801,9 +8847,7 @@
             <a:r>
               <a:rPr lang="en-US" dirty="0">
                 <a:solidFill>
-                  <a:schemeClr val="tx1">
-                    <a:lumMod val="50000"/>
-                  </a:schemeClr>
+                  <a:schemeClr val="tx1"/>
                 </a:solidFill>
               </a:rPr>
               <a:t>What is inside a NestJS Application</a:t>
@@ -6813,9 +8857,7 @@
             <a:r>
               <a:rPr lang="en-US" dirty="0">
                 <a:solidFill>
-                  <a:schemeClr val="tx1">
-                    <a:lumMod val="50000"/>
-                  </a:schemeClr>
+                  <a:schemeClr val="tx1"/>
                 </a:solidFill>
               </a:rPr>
               <a:t>Create a REST API Application</a:t>
@@ -6826,9 +8868,7 @@
             <a:r>
               <a:rPr lang="en-US" dirty="0">
                 <a:solidFill>
-                  <a:schemeClr val="tx1">
-                    <a:lumMod val="50000"/>
-                  </a:schemeClr>
+                  <a:schemeClr val="tx1"/>
                 </a:solidFill>
               </a:rPr>
               <a:t>Run in dev mode</a:t>
@@ -6839,9 +8879,7 @@
             <a:r>
               <a:rPr lang="en-US" dirty="0">
                 <a:solidFill>
-                  <a:schemeClr val="tx1">
-                    <a:lumMod val="50000"/>
-                  </a:schemeClr>
+                  <a:schemeClr val="tx1"/>
                 </a:solidFill>
               </a:rPr>
               <a:t>Creating a basic controller</a:t>
@@ -6852,9 +8890,7 @@
             <a:r>
               <a:rPr lang="en-US" dirty="0">
                 <a:solidFill>
-                  <a:schemeClr val="tx1">
-                    <a:lumMod val="50000"/>
-                  </a:schemeClr>
+                  <a:schemeClr val="tx1"/>
                 </a:solidFill>
               </a:rPr>
               <a:t>Use Route Parameters</a:t>
@@ -6865,9 +8901,7 @@
             <a:r>
               <a:rPr lang="en-US" dirty="0">
                 <a:solidFill>
-                  <a:schemeClr val="tx1">
-                    <a:lumMod val="50000"/>
-                  </a:schemeClr>
+                  <a:schemeClr val="tx1"/>
                 </a:solidFill>
               </a:rPr>
               <a:t>Handling Request Body / Payload</a:t>
@@ -6878,9 +8912,7 @@
             <a:r>
               <a:rPr lang="en-US" dirty="0">
                 <a:solidFill>
-                  <a:schemeClr val="tx1">
-                    <a:lumMod val="50000"/>
-                  </a:schemeClr>
+                  <a:schemeClr val="tx1"/>
                 </a:solidFill>
               </a:rPr>
               <a:t>Response Status Codes</a:t>
@@ -6950,6 +8982,1667 @@
     <p:extLst>
       <p:ext uri="{BB962C8B-B14F-4D97-AF65-F5344CB8AC3E}">
         <p14:creationId xmlns:p14="http://schemas.microsoft.com/office/powerpoint/2010/main" val="1628682045"/>
+      </p:ext>
+    </p:extLst>
+  </p:cSld>
+  <p:clrMapOvr>
+    <a:masterClrMapping/>
+  </p:clrMapOvr>
+</p:sld>
+</file>
+
+<file path=ppt/slides/slide20.xml><?xml version="1.0" encoding="utf-8"?>
+<p:sld xmlns:a="http://schemas.openxmlformats.org/drawingml/2006/main" xmlns:r="http://schemas.openxmlformats.org/officeDocument/2006/relationships" xmlns:p="http://schemas.openxmlformats.org/presentationml/2006/main">
+  <p:cSld>
+    <p:spTree>
+      <p:nvGrpSpPr>
+        <p:cNvPr id="1" name=""/>
+        <p:cNvGrpSpPr/>
+        <p:nvPr/>
+      </p:nvGrpSpPr>
+      <p:grpSpPr>
+        <a:xfrm>
+          <a:off x="0" y="0"/>
+          <a:ext cx="0" cy="0"/>
+          <a:chOff x="0" y="0"/>
+          <a:chExt cx="0" cy="0"/>
+        </a:xfrm>
+      </p:grpSpPr>
+      <p:sp>
+        <p:nvSpPr>
+          <p:cNvPr id="2" name="Title 1">
+            <a:extLst>
+              <a:ext uri="{FF2B5EF4-FFF2-40B4-BE49-F238E27FC236}">
+                <a16:creationId xmlns:a16="http://schemas.microsoft.com/office/drawing/2014/main" id="{C31C6DA0-6B26-4036-9CCA-A4B324B62A37}"/>
+              </a:ext>
+            </a:extLst>
+          </p:cNvPr>
+          <p:cNvSpPr>
+            <a:spLocks noGrp="1"/>
+          </p:cNvSpPr>
+          <p:nvPr>
+            <p:ph type="title"/>
+          </p:nvPr>
+        </p:nvSpPr>
+        <p:spPr/>
+        <p:txBody>
+          <a:bodyPr/>
+          <a:lstStyle/>
+          <a:p>
+            <a:r>
+              <a:rPr lang="en-US" dirty="0"/>
+              <a:t>Demo</a:t>
+            </a:r>
+          </a:p>
+        </p:txBody>
+      </p:sp>
+      <p:sp>
+        <p:nvSpPr>
+          <p:cNvPr id="3" name="Content Placeholder 2">
+            <a:extLst>
+              <a:ext uri="{FF2B5EF4-FFF2-40B4-BE49-F238E27FC236}">
+                <a16:creationId xmlns:a16="http://schemas.microsoft.com/office/drawing/2014/main" id="{ECFA01C4-6426-4B10-8827-8F344A43252C}"/>
+              </a:ext>
+            </a:extLst>
+          </p:cNvPr>
+          <p:cNvSpPr>
+            <a:spLocks noGrp="1"/>
+          </p:cNvSpPr>
+          <p:nvPr>
+            <p:ph idx="1"/>
+          </p:nvPr>
+        </p:nvSpPr>
+        <p:spPr/>
+        <p:txBody>
+          <a:bodyPr/>
+          <a:lstStyle/>
+          <a:p>
+            <a:r>
+              <a:rPr lang="en-US" dirty="0"/>
+              <a:t>Application errors</a:t>
+            </a:r>
+          </a:p>
+          <a:p>
+            <a:pPr lvl="1"/>
+            <a:r>
+              <a:rPr lang="en-US" sz="1800" dirty="0" err="1">
+                <a:latin typeface="Consolas" panose="020B0609020204030204" pitchFamily="49" charset="0"/>
+              </a:rPr>
+              <a:t>HttpExceptions</a:t>
+            </a:r>
+            <a:endParaRPr lang="en-US" sz="1800" dirty="0">
+              <a:latin typeface="Consolas" panose="020B0609020204030204" pitchFamily="49" charset="0"/>
+            </a:endParaRPr>
+          </a:p>
+          <a:p>
+            <a:pPr lvl="2"/>
+            <a:r>
+              <a:rPr lang="en-US" dirty="0">
+                <a:latin typeface="Consolas" panose="020B0609020204030204" pitchFamily="49" charset="0"/>
+              </a:rPr>
+              <a:t>throw new </a:t>
+            </a:r>
+            <a:r>
+              <a:rPr lang="en-US" dirty="0" err="1">
+                <a:latin typeface="Consolas" panose="020B0609020204030204" pitchFamily="49" charset="0"/>
+              </a:rPr>
+              <a:t>HttpException</a:t>
+            </a:r>
+            <a:r>
+              <a:rPr lang="en-US" dirty="0">
+                <a:latin typeface="Consolas" panose="020B0609020204030204" pitchFamily="49" charset="0"/>
+              </a:rPr>
+              <a:t>(‘your message’, </a:t>
+            </a:r>
+            <a:r>
+              <a:rPr lang="en-US" dirty="0" err="1">
+                <a:latin typeface="Consolas" panose="020B0609020204030204" pitchFamily="49" charset="0"/>
+              </a:rPr>
+              <a:t>HttpStatus.NOT_FOUND</a:t>
+            </a:r>
+            <a:r>
+              <a:rPr lang="en-US" dirty="0">
+                <a:latin typeface="Consolas" panose="020B0609020204030204" pitchFamily="49" charset="0"/>
+              </a:rPr>
+              <a:t>);</a:t>
+            </a:r>
+          </a:p>
+          <a:p>
+            <a:pPr lvl="1"/>
+            <a:r>
+              <a:rPr lang="en-US" dirty="0"/>
+              <a:t>Helper classes:</a:t>
+            </a:r>
+          </a:p>
+          <a:p>
+            <a:pPr lvl="2"/>
+            <a:r>
+              <a:rPr lang="en-US" dirty="0" err="1">
+                <a:latin typeface="Consolas" panose="020B0609020204030204" pitchFamily="49" charset="0"/>
+              </a:rPr>
+              <a:t>NotFoundException</a:t>
+            </a:r>
+            <a:endParaRPr lang="en-US" dirty="0">
+              <a:latin typeface="Consolas" panose="020B0609020204030204" pitchFamily="49" charset="0"/>
+            </a:endParaRPr>
+          </a:p>
+          <a:p>
+            <a:pPr lvl="1"/>
+            <a:r>
+              <a:rPr lang="en-US" dirty="0"/>
+              <a:t>How about unhandled exception (like divide by zero?)</a:t>
+            </a:r>
+          </a:p>
+          <a:p>
+            <a:pPr lvl="2"/>
+            <a:r>
+              <a:rPr lang="en-US" dirty="0"/>
+              <a:t>It’s so useful</a:t>
+            </a:r>
+          </a:p>
+        </p:txBody>
+      </p:sp>
+      <p:sp>
+        <p:nvSpPr>
+          <p:cNvPr id="4" name="Footer Placeholder 3">
+            <a:extLst>
+              <a:ext uri="{FF2B5EF4-FFF2-40B4-BE49-F238E27FC236}">
+                <a16:creationId xmlns:a16="http://schemas.microsoft.com/office/drawing/2014/main" id="{301C97C4-30E5-4117-93A7-335DA92D39CB}"/>
+              </a:ext>
+            </a:extLst>
+          </p:cNvPr>
+          <p:cNvSpPr>
+            <a:spLocks noGrp="1"/>
+          </p:cNvSpPr>
+          <p:nvPr>
+            <p:ph type="ftr" sz="quarter" idx="11"/>
+          </p:nvPr>
+        </p:nvSpPr>
+        <p:spPr/>
+        <p:txBody>
+          <a:bodyPr/>
+          <a:lstStyle/>
+          <a:p>
+            <a:r>
+              <a:rPr lang="en-US"/>
+              <a:t>Nodejs Basics</a:t>
+            </a:r>
+            <a:endParaRPr lang="en-US" dirty="0"/>
+          </a:p>
+        </p:txBody>
+      </p:sp>
+      <p:sp>
+        <p:nvSpPr>
+          <p:cNvPr id="5" name="Slide Number Placeholder 4">
+            <a:extLst>
+              <a:ext uri="{FF2B5EF4-FFF2-40B4-BE49-F238E27FC236}">
+                <a16:creationId xmlns:a16="http://schemas.microsoft.com/office/drawing/2014/main" id="{189E45A0-98A6-4BBA-89FE-43189249B28E}"/>
+              </a:ext>
+            </a:extLst>
+          </p:cNvPr>
+          <p:cNvSpPr>
+            <a:spLocks noGrp="1"/>
+          </p:cNvSpPr>
+          <p:nvPr>
+            <p:ph type="sldNum" sz="quarter" idx="12"/>
+          </p:nvPr>
+        </p:nvSpPr>
+        <p:spPr/>
+        <p:txBody>
+          <a:bodyPr/>
+          <a:lstStyle/>
+          <a:p>
+            <a:fld id="{3A98EE3D-8CD1-4C3F-BD1C-C98C9596463C}" type="slidenum">
+              <a:rPr lang="en-US" smtClean="0"/>
+              <a:t>20</a:t>
+            </a:fld>
+            <a:endParaRPr lang="en-US" dirty="0"/>
+          </a:p>
+        </p:txBody>
+      </p:sp>
+    </p:spTree>
+    <p:extLst>
+      <p:ext uri="{BB962C8B-B14F-4D97-AF65-F5344CB8AC3E}">
+        <p14:creationId xmlns:p14="http://schemas.microsoft.com/office/powerpoint/2010/main" val="952088768"/>
+      </p:ext>
+    </p:extLst>
+  </p:cSld>
+  <p:clrMapOvr>
+    <a:masterClrMapping/>
+  </p:clrMapOvr>
+</p:sld>
+</file>
+
+<file path=ppt/slides/slide21.xml><?xml version="1.0" encoding="utf-8"?>
+<p:sld xmlns:a="http://schemas.openxmlformats.org/drawingml/2006/main" xmlns:r="http://schemas.openxmlformats.org/officeDocument/2006/relationships" xmlns:p="http://schemas.openxmlformats.org/presentationml/2006/main">
+  <p:cSld>
+    <p:spTree>
+      <p:nvGrpSpPr>
+        <p:cNvPr id="1" name=""/>
+        <p:cNvGrpSpPr/>
+        <p:nvPr/>
+      </p:nvGrpSpPr>
+      <p:grpSpPr>
+        <a:xfrm>
+          <a:off x="0" y="0"/>
+          <a:ext cx="0" cy="0"/>
+          <a:chOff x="0" y="0"/>
+          <a:chExt cx="0" cy="0"/>
+        </a:xfrm>
+      </p:grpSpPr>
+      <p:sp>
+        <p:nvSpPr>
+          <p:cNvPr id="2" name="Title 1">
+            <a:extLst>
+              <a:ext uri="{FF2B5EF4-FFF2-40B4-BE49-F238E27FC236}">
+                <a16:creationId xmlns:a16="http://schemas.microsoft.com/office/drawing/2014/main" id="{C405FEE0-0155-421D-B618-B3915D540F08}"/>
+              </a:ext>
+            </a:extLst>
+          </p:cNvPr>
+          <p:cNvSpPr>
+            <a:spLocks noGrp="1"/>
+          </p:cNvSpPr>
+          <p:nvPr>
+            <p:ph type="title"/>
+          </p:nvPr>
+        </p:nvSpPr>
+        <p:spPr/>
+        <p:txBody>
+          <a:bodyPr/>
+          <a:lstStyle/>
+          <a:p>
+            <a:r>
+              <a:rPr lang="en-US" dirty="0"/>
+              <a:t>Demo</a:t>
+            </a:r>
+          </a:p>
+        </p:txBody>
+      </p:sp>
+      <p:sp>
+        <p:nvSpPr>
+          <p:cNvPr id="3" name="Content Placeholder 2">
+            <a:extLst>
+              <a:ext uri="{FF2B5EF4-FFF2-40B4-BE49-F238E27FC236}">
+                <a16:creationId xmlns:a16="http://schemas.microsoft.com/office/drawing/2014/main" id="{E9934E6D-EEAD-4EE3-B581-0A17AD2B00E0}"/>
+              </a:ext>
+            </a:extLst>
+          </p:cNvPr>
+          <p:cNvSpPr>
+            <a:spLocks noGrp="1"/>
+          </p:cNvSpPr>
+          <p:nvPr>
+            <p:ph idx="1"/>
+          </p:nvPr>
+        </p:nvSpPr>
+        <p:spPr/>
+        <p:txBody>
+          <a:bodyPr>
+            <a:normAutofit fontScale="92500" lnSpcReduction="10000"/>
+          </a:bodyPr>
+          <a:lstStyle/>
+          <a:p>
+            <a:r>
+              <a:rPr lang="en-US" dirty="0"/>
+              <a:t>Group our business parts of our application inside modules</a:t>
+            </a:r>
+          </a:p>
+          <a:p>
+            <a:pPr lvl="1"/>
+            <a:r>
+              <a:rPr lang="en-US" sz="1900" dirty="0">
+                <a:latin typeface="Consolas" panose="020B0609020204030204" pitchFamily="49" charset="0"/>
+              </a:rPr>
+              <a:t>nest generate module &lt;name&gt;</a:t>
+            </a:r>
+          </a:p>
+          <a:p>
+            <a:pPr lvl="1"/>
+            <a:r>
+              <a:rPr lang="en-US" dirty="0"/>
+              <a:t>Nest will add it inside the closest module (import)</a:t>
+            </a:r>
+          </a:p>
+          <a:p>
+            <a:pPr lvl="1"/>
+            <a:r>
+              <a:rPr lang="en-US" sz="1900" dirty="0">
+                <a:latin typeface="Consolas" panose="020B0609020204030204" pitchFamily="49" charset="0"/>
+              </a:rPr>
+              <a:t>@Module</a:t>
+            </a:r>
+          </a:p>
+          <a:p>
+            <a:pPr lvl="2"/>
+            <a:r>
+              <a:rPr lang="en-US" sz="1900" dirty="0">
+                <a:latin typeface="Consolas" panose="020B0609020204030204" pitchFamily="49" charset="0"/>
+              </a:rPr>
+              <a:t>controllers</a:t>
+            </a:r>
+          </a:p>
+          <a:p>
+            <a:pPr lvl="3"/>
+            <a:r>
+              <a:rPr lang="en-US" dirty="0"/>
+              <a:t>routes</a:t>
+            </a:r>
+          </a:p>
+          <a:p>
+            <a:pPr lvl="2"/>
+            <a:r>
+              <a:rPr lang="en-US" sz="1900" dirty="0">
+                <a:latin typeface="Consolas" panose="020B0609020204030204" pitchFamily="49" charset="0"/>
+              </a:rPr>
+              <a:t>exports</a:t>
+            </a:r>
+          </a:p>
+          <a:p>
+            <a:pPr lvl="3"/>
+            <a:r>
+              <a:rPr lang="en-US" dirty="0"/>
+              <a:t>Available for other modules</a:t>
+            </a:r>
+          </a:p>
+          <a:p>
+            <a:pPr lvl="2"/>
+            <a:r>
+              <a:rPr lang="en-US" sz="1900" dirty="0">
+                <a:latin typeface="Consolas" panose="020B0609020204030204" pitchFamily="49" charset="0"/>
+              </a:rPr>
+              <a:t>Imports</a:t>
+            </a:r>
+          </a:p>
+          <a:p>
+            <a:pPr lvl="3"/>
+            <a:r>
+              <a:rPr lang="en-US" dirty="0"/>
+              <a:t>Other modules that this module required</a:t>
+            </a:r>
+          </a:p>
+          <a:p>
+            <a:pPr lvl="2"/>
+            <a:r>
+              <a:rPr lang="en-US" sz="1900" dirty="0">
+                <a:latin typeface="Consolas" panose="020B0609020204030204" pitchFamily="49" charset="0"/>
+              </a:rPr>
+              <a:t>Providers</a:t>
+            </a:r>
+          </a:p>
+          <a:p>
+            <a:pPr lvl="3"/>
+            <a:r>
+              <a:rPr lang="en-US" dirty="0"/>
+              <a:t>Register our token for di container</a:t>
+            </a:r>
+          </a:p>
+          <a:p>
+            <a:pPr lvl="1"/>
+            <a:endParaRPr lang="en-US" dirty="0"/>
+          </a:p>
+        </p:txBody>
+      </p:sp>
+      <p:sp>
+        <p:nvSpPr>
+          <p:cNvPr id="4" name="Footer Placeholder 3">
+            <a:extLst>
+              <a:ext uri="{FF2B5EF4-FFF2-40B4-BE49-F238E27FC236}">
+                <a16:creationId xmlns:a16="http://schemas.microsoft.com/office/drawing/2014/main" id="{90A2EAA4-36C6-46AF-8002-84409241559F}"/>
+              </a:ext>
+            </a:extLst>
+          </p:cNvPr>
+          <p:cNvSpPr>
+            <a:spLocks noGrp="1"/>
+          </p:cNvSpPr>
+          <p:nvPr>
+            <p:ph type="ftr" sz="quarter" idx="11"/>
+          </p:nvPr>
+        </p:nvSpPr>
+        <p:spPr/>
+        <p:txBody>
+          <a:bodyPr/>
+          <a:lstStyle/>
+          <a:p>
+            <a:r>
+              <a:rPr lang="en-US"/>
+              <a:t>Nodejs Basics</a:t>
+            </a:r>
+            <a:endParaRPr lang="en-US" dirty="0"/>
+          </a:p>
+        </p:txBody>
+      </p:sp>
+      <p:sp>
+        <p:nvSpPr>
+          <p:cNvPr id="5" name="Slide Number Placeholder 4">
+            <a:extLst>
+              <a:ext uri="{FF2B5EF4-FFF2-40B4-BE49-F238E27FC236}">
+                <a16:creationId xmlns:a16="http://schemas.microsoft.com/office/drawing/2014/main" id="{81C83A64-8772-4BCE-826C-583E4820A285}"/>
+              </a:ext>
+            </a:extLst>
+          </p:cNvPr>
+          <p:cNvSpPr>
+            <a:spLocks noGrp="1"/>
+          </p:cNvSpPr>
+          <p:nvPr>
+            <p:ph type="sldNum" sz="quarter" idx="12"/>
+          </p:nvPr>
+        </p:nvSpPr>
+        <p:spPr/>
+        <p:txBody>
+          <a:bodyPr/>
+          <a:lstStyle/>
+          <a:p>
+            <a:fld id="{3A98EE3D-8CD1-4C3F-BD1C-C98C9596463C}" type="slidenum">
+              <a:rPr lang="en-US" smtClean="0"/>
+              <a:t>21</a:t>
+            </a:fld>
+            <a:endParaRPr lang="en-US" dirty="0"/>
+          </a:p>
+        </p:txBody>
+      </p:sp>
+    </p:spTree>
+    <p:extLst>
+      <p:ext uri="{BB962C8B-B14F-4D97-AF65-F5344CB8AC3E}">
+        <p14:creationId xmlns:p14="http://schemas.microsoft.com/office/powerpoint/2010/main" val="4034341068"/>
+      </p:ext>
+    </p:extLst>
+  </p:cSld>
+  <p:clrMapOvr>
+    <a:masterClrMapping/>
+  </p:clrMapOvr>
+</p:sld>
+</file>
+
+<file path=ppt/slides/slide22.xml><?xml version="1.0" encoding="utf-8"?>
+<p:sld xmlns:a="http://schemas.openxmlformats.org/drawingml/2006/main" xmlns:r="http://schemas.openxmlformats.org/officeDocument/2006/relationships" xmlns:p="http://schemas.openxmlformats.org/presentationml/2006/main">
+  <p:cSld>
+    <p:spTree>
+      <p:nvGrpSpPr>
+        <p:cNvPr id="1" name=""/>
+        <p:cNvGrpSpPr/>
+        <p:nvPr/>
+      </p:nvGrpSpPr>
+      <p:grpSpPr>
+        <a:xfrm>
+          <a:off x="0" y="0"/>
+          <a:ext cx="0" cy="0"/>
+          <a:chOff x="0" y="0"/>
+          <a:chExt cx="0" cy="0"/>
+        </a:xfrm>
+      </p:grpSpPr>
+      <p:sp>
+        <p:nvSpPr>
+          <p:cNvPr id="2" name="Title 1">
+            <a:extLst>
+              <a:ext uri="{FF2B5EF4-FFF2-40B4-BE49-F238E27FC236}">
+                <a16:creationId xmlns:a16="http://schemas.microsoft.com/office/drawing/2014/main" id="{7D09EE00-5879-400E-8932-6F3362FE8C46}"/>
+              </a:ext>
+            </a:extLst>
+          </p:cNvPr>
+          <p:cNvSpPr>
+            <a:spLocks noGrp="1"/>
+          </p:cNvSpPr>
+          <p:nvPr>
+            <p:ph type="title"/>
+          </p:nvPr>
+        </p:nvSpPr>
+        <p:spPr/>
+        <p:txBody>
+          <a:bodyPr/>
+          <a:lstStyle/>
+          <a:p>
+            <a:r>
+              <a:rPr lang="en-US" dirty="0"/>
+              <a:t>Demo</a:t>
+            </a:r>
+          </a:p>
+        </p:txBody>
+      </p:sp>
+      <p:sp>
+        <p:nvSpPr>
+          <p:cNvPr id="3" name="Content Placeholder 2">
+            <a:extLst>
+              <a:ext uri="{FF2B5EF4-FFF2-40B4-BE49-F238E27FC236}">
+                <a16:creationId xmlns:a16="http://schemas.microsoft.com/office/drawing/2014/main" id="{E42FC247-65E1-4935-9474-6AA268C4A92E}"/>
+              </a:ext>
+            </a:extLst>
+          </p:cNvPr>
+          <p:cNvSpPr>
+            <a:spLocks noGrp="1"/>
+          </p:cNvSpPr>
+          <p:nvPr>
+            <p:ph idx="1"/>
+          </p:nvPr>
+        </p:nvSpPr>
+        <p:spPr/>
+        <p:txBody>
+          <a:bodyPr/>
+          <a:lstStyle/>
+          <a:p>
+            <a:r>
+              <a:rPr lang="en-US" dirty="0"/>
+              <a:t>DTOs</a:t>
+            </a:r>
+          </a:p>
+          <a:p>
+            <a:pPr lvl="1"/>
+            <a:r>
+              <a:rPr lang="en-US" dirty="0"/>
+              <a:t>Define interfaces for our input and outputs</a:t>
+            </a:r>
+          </a:p>
+          <a:p>
+            <a:pPr lvl="1"/>
+            <a:r>
+              <a:rPr lang="en-US" dirty="0"/>
+              <a:t>They are simply classes</a:t>
+            </a:r>
+          </a:p>
+          <a:p>
+            <a:pPr lvl="1"/>
+            <a:r>
+              <a:rPr lang="en-US" dirty="0">
+                <a:latin typeface="Consolas" panose="020B0609020204030204" pitchFamily="49" charset="0"/>
+              </a:rPr>
+              <a:t>nest g class &lt;path&gt;</a:t>
+            </a:r>
+          </a:p>
+          <a:p>
+            <a:pPr lvl="2"/>
+            <a:r>
+              <a:rPr lang="en-US" sz="2100" dirty="0">
+                <a:latin typeface="Consolas" panose="020B0609020204030204" pitchFamily="49" charset="0"/>
+              </a:rPr>
+              <a:t>--no-spec</a:t>
+            </a:r>
+          </a:p>
+          <a:p>
+            <a:pPr lvl="2"/>
+            <a:r>
+              <a:rPr lang="en-US" dirty="0"/>
+              <a:t>Remember to add .</a:t>
+            </a:r>
+            <a:r>
+              <a:rPr lang="en-US" dirty="0" err="1"/>
+              <a:t>dto</a:t>
+            </a:r>
+            <a:r>
+              <a:rPr lang="en-US" dirty="0"/>
+              <a:t> extension</a:t>
+            </a:r>
+          </a:p>
+        </p:txBody>
+      </p:sp>
+      <p:sp>
+        <p:nvSpPr>
+          <p:cNvPr id="4" name="Footer Placeholder 3">
+            <a:extLst>
+              <a:ext uri="{FF2B5EF4-FFF2-40B4-BE49-F238E27FC236}">
+                <a16:creationId xmlns:a16="http://schemas.microsoft.com/office/drawing/2014/main" id="{37402953-79B9-4785-94DF-36E43BCC925A}"/>
+              </a:ext>
+            </a:extLst>
+          </p:cNvPr>
+          <p:cNvSpPr>
+            <a:spLocks noGrp="1"/>
+          </p:cNvSpPr>
+          <p:nvPr>
+            <p:ph type="ftr" sz="quarter" idx="11"/>
+          </p:nvPr>
+        </p:nvSpPr>
+        <p:spPr/>
+        <p:txBody>
+          <a:bodyPr/>
+          <a:lstStyle/>
+          <a:p>
+            <a:r>
+              <a:rPr lang="en-US"/>
+              <a:t>Nodejs Basics</a:t>
+            </a:r>
+            <a:endParaRPr lang="en-US" dirty="0"/>
+          </a:p>
+        </p:txBody>
+      </p:sp>
+      <p:sp>
+        <p:nvSpPr>
+          <p:cNvPr id="5" name="Slide Number Placeholder 4">
+            <a:extLst>
+              <a:ext uri="{FF2B5EF4-FFF2-40B4-BE49-F238E27FC236}">
+                <a16:creationId xmlns:a16="http://schemas.microsoft.com/office/drawing/2014/main" id="{CB29DE84-BE67-4AE5-B141-809685F03695}"/>
+              </a:ext>
+            </a:extLst>
+          </p:cNvPr>
+          <p:cNvSpPr>
+            <a:spLocks noGrp="1"/>
+          </p:cNvSpPr>
+          <p:nvPr>
+            <p:ph type="sldNum" sz="quarter" idx="12"/>
+          </p:nvPr>
+        </p:nvSpPr>
+        <p:spPr/>
+        <p:txBody>
+          <a:bodyPr/>
+          <a:lstStyle/>
+          <a:p>
+            <a:fld id="{3A98EE3D-8CD1-4C3F-BD1C-C98C9596463C}" type="slidenum">
+              <a:rPr lang="en-US" smtClean="0"/>
+              <a:t>22</a:t>
+            </a:fld>
+            <a:endParaRPr lang="en-US" dirty="0"/>
+          </a:p>
+        </p:txBody>
+      </p:sp>
+    </p:spTree>
+    <p:extLst>
+      <p:ext uri="{BB962C8B-B14F-4D97-AF65-F5344CB8AC3E}">
+        <p14:creationId xmlns:p14="http://schemas.microsoft.com/office/powerpoint/2010/main" val="1952706763"/>
+      </p:ext>
+    </p:extLst>
+  </p:cSld>
+  <p:clrMapOvr>
+    <a:masterClrMapping/>
+  </p:clrMapOvr>
+</p:sld>
+</file>
+
+<file path=ppt/slides/slide23.xml><?xml version="1.0" encoding="utf-8"?>
+<p:sld xmlns:a="http://schemas.openxmlformats.org/drawingml/2006/main" xmlns:r="http://schemas.openxmlformats.org/officeDocument/2006/relationships" xmlns:p="http://schemas.openxmlformats.org/presentationml/2006/main">
+  <p:cSld>
+    <p:spTree>
+      <p:nvGrpSpPr>
+        <p:cNvPr id="1" name=""/>
+        <p:cNvGrpSpPr/>
+        <p:nvPr/>
+      </p:nvGrpSpPr>
+      <p:grpSpPr>
+        <a:xfrm>
+          <a:off x="0" y="0"/>
+          <a:ext cx="0" cy="0"/>
+          <a:chOff x="0" y="0"/>
+          <a:chExt cx="0" cy="0"/>
+        </a:xfrm>
+      </p:grpSpPr>
+      <p:sp>
+        <p:nvSpPr>
+          <p:cNvPr id="2" name="Title 1">
+            <a:extLst>
+              <a:ext uri="{FF2B5EF4-FFF2-40B4-BE49-F238E27FC236}">
+                <a16:creationId xmlns:a16="http://schemas.microsoft.com/office/drawing/2014/main" id="{43114C8B-F053-42BA-BE54-D5F7503E0BE8}"/>
+              </a:ext>
+            </a:extLst>
+          </p:cNvPr>
+          <p:cNvSpPr>
+            <a:spLocks noGrp="1"/>
+          </p:cNvSpPr>
+          <p:nvPr>
+            <p:ph type="title"/>
+          </p:nvPr>
+        </p:nvSpPr>
+        <p:spPr/>
+        <p:txBody>
+          <a:bodyPr/>
+          <a:lstStyle/>
+          <a:p>
+            <a:r>
+              <a:rPr lang="en-US" dirty="0"/>
+              <a:t>Demo</a:t>
+            </a:r>
+          </a:p>
+        </p:txBody>
+      </p:sp>
+      <p:sp>
+        <p:nvSpPr>
+          <p:cNvPr id="3" name="Content Placeholder 2">
+            <a:extLst>
+              <a:ext uri="{FF2B5EF4-FFF2-40B4-BE49-F238E27FC236}">
+                <a16:creationId xmlns:a16="http://schemas.microsoft.com/office/drawing/2014/main" id="{D3DB6E9E-12A5-403D-9514-0AF1025D193A}"/>
+              </a:ext>
+            </a:extLst>
+          </p:cNvPr>
+          <p:cNvSpPr>
+            <a:spLocks noGrp="1"/>
+          </p:cNvSpPr>
+          <p:nvPr>
+            <p:ph idx="1"/>
+          </p:nvPr>
+        </p:nvSpPr>
+        <p:spPr/>
+        <p:txBody>
+          <a:bodyPr/>
+          <a:lstStyle/>
+          <a:p>
+            <a:r>
+              <a:rPr lang="en-US" dirty="0"/>
+              <a:t>Validating input data with DTOs</a:t>
+            </a:r>
+          </a:p>
+          <a:p>
+            <a:pPr lvl="1"/>
+            <a:r>
+              <a:rPr lang="en-US" dirty="0"/>
+              <a:t>Validation pipes</a:t>
+            </a:r>
+          </a:p>
+          <a:p>
+            <a:pPr lvl="1"/>
+            <a:r>
+              <a:rPr lang="en-US" dirty="0" err="1">
+                <a:latin typeface="Consolas" panose="020B0609020204030204" pitchFamily="49" charset="0"/>
+              </a:rPr>
+              <a:t>main.ts</a:t>
+            </a:r>
+            <a:endParaRPr lang="en-US" dirty="0">
+              <a:latin typeface="Consolas" panose="020B0609020204030204" pitchFamily="49" charset="0"/>
+            </a:endParaRPr>
+          </a:p>
+          <a:p>
+            <a:pPr lvl="2"/>
+            <a:r>
+              <a:rPr lang="en-US" sz="2100" dirty="0" err="1">
+                <a:latin typeface="Consolas" panose="020B0609020204030204" pitchFamily="49" charset="0"/>
+              </a:rPr>
+              <a:t>app.useGlobalPipes</a:t>
+            </a:r>
+            <a:r>
+              <a:rPr lang="en-US" sz="2100" dirty="0">
+                <a:latin typeface="Consolas" panose="020B0609020204030204" pitchFamily="49" charset="0"/>
+              </a:rPr>
+              <a:t>(new </a:t>
+            </a:r>
+            <a:r>
+              <a:rPr lang="en-US" sz="2100" dirty="0" err="1">
+                <a:latin typeface="Consolas" panose="020B0609020204030204" pitchFamily="49" charset="0"/>
+              </a:rPr>
+              <a:t>ValidationPipe</a:t>
+            </a:r>
+            <a:r>
+              <a:rPr lang="en-US" sz="2100" dirty="0">
+                <a:latin typeface="Consolas" panose="020B0609020204030204" pitchFamily="49" charset="0"/>
+              </a:rPr>
+              <a:t>());</a:t>
+            </a:r>
+          </a:p>
+          <a:p>
+            <a:pPr lvl="1"/>
+            <a:r>
+              <a:rPr lang="en-US" dirty="0" err="1">
+                <a:latin typeface="Consolas" panose="020B0609020204030204" pitchFamily="49" charset="0"/>
+              </a:rPr>
+              <a:t>npm</a:t>
+            </a:r>
+            <a:r>
+              <a:rPr lang="en-US" dirty="0">
+                <a:latin typeface="Consolas" panose="020B0609020204030204" pitchFamily="49" charset="0"/>
+              </a:rPr>
+              <a:t> install class-validator class-transformer</a:t>
+            </a:r>
+          </a:p>
+          <a:p>
+            <a:pPr lvl="1"/>
+            <a:r>
+              <a:rPr lang="en-US" dirty="0">
+                <a:latin typeface="Consolas" panose="020B0609020204030204" pitchFamily="49" charset="0"/>
+              </a:rPr>
+              <a:t>@IsString</a:t>
+            </a:r>
+          </a:p>
+          <a:p>
+            <a:pPr lvl="2"/>
+            <a:r>
+              <a:rPr lang="en-US" sz="2100" dirty="0">
+                <a:latin typeface="Consolas" panose="020B0609020204030204" pitchFamily="49" charset="0"/>
+              </a:rPr>
+              <a:t>class-validator</a:t>
+            </a:r>
+          </a:p>
+          <a:p>
+            <a:pPr lvl="2"/>
+            <a:r>
+              <a:rPr lang="en-US" sz="2100" dirty="0">
+                <a:latin typeface="Consolas" panose="020B0609020204030204" pitchFamily="49" charset="0"/>
+              </a:rPr>
+              <a:t>each: true</a:t>
+            </a:r>
+          </a:p>
+          <a:p>
+            <a:pPr lvl="1"/>
+            <a:r>
+              <a:rPr lang="en-US" dirty="0"/>
+              <a:t>Automatically throw bad request exception </a:t>
+            </a:r>
+          </a:p>
+          <a:p>
+            <a:pPr lvl="1"/>
+            <a:endParaRPr lang="en-US" dirty="0"/>
+          </a:p>
+        </p:txBody>
+      </p:sp>
+      <p:sp>
+        <p:nvSpPr>
+          <p:cNvPr id="4" name="Footer Placeholder 3">
+            <a:extLst>
+              <a:ext uri="{FF2B5EF4-FFF2-40B4-BE49-F238E27FC236}">
+                <a16:creationId xmlns:a16="http://schemas.microsoft.com/office/drawing/2014/main" id="{84A2B1E1-22CE-49A8-A097-C445AB8656E9}"/>
+              </a:ext>
+            </a:extLst>
+          </p:cNvPr>
+          <p:cNvSpPr>
+            <a:spLocks noGrp="1"/>
+          </p:cNvSpPr>
+          <p:nvPr>
+            <p:ph type="ftr" sz="quarter" idx="11"/>
+          </p:nvPr>
+        </p:nvSpPr>
+        <p:spPr/>
+        <p:txBody>
+          <a:bodyPr/>
+          <a:lstStyle/>
+          <a:p>
+            <a:r>
+              <a:rPr lang="en-US"/>
+              <a:t>Nodejs Basics</a:t>
+            </a:r>
+            <a:endParaRPr lang="en-US" dirty="0"/>
+          </a:p>
+        </p:txBody>
+      </p:sp>
+      <p:sp>
+        <p:nvSpPr>
+          <p:cNvPr id="5" name="Slide Number Placeholder 4">
+            <a:extLst>
+              <a:ext uri="{FF2B5EF4-FFF2-40B4-BE49-F238E27FC236}">
+                <a16:creationId xmlns:a16="http://schemas.microsoft.com/office/drawing/2014/main" id="{EA2658C2-4437-4F05-B372-B6058E43C7F9}"/>
+              </a:ext>
+            </a:extLst>
+          </p:cNvPr>
+          <p:cNvSpPr>
+            <a:spLocks noGrp="1"/>
+          </p:cNvSpPr>
+          <p:nvPr>
+            <p:ph type="sldNum" sz="quarter" idx="12"/>
+          </p:nvPr>
+        </p:nvSpPr>
+        <p:spPr/>
+        <p:txBody>
+          <a:bodyPr/>
+          <a:lstStyle/>
+          <a:p>
+            <a:fld id="{3A98EE3D-8CD1-4C3F-BD1C-C98C9596463C}" type="slidenum">
+              <a:rPr lang="en-US" smtClean="0"/>
+              <a:t>23</a:t>
+            </a:fld>
+            <a:endParaRPr lang="en-US" dirty="0"/>
+          </a:p>
+        </p:txBody>
+      </p:sp>
+    </p:spTree>
+    <p:extLst>
+      <p:ext uri="{BB962C8B-B14F-4D97-AF65-F5344CB8AC3E}">
+        <p14:creationId xmlns:p14="http://schemas.microsoft.com/office/powerpoint/2010/main" val="3771157013"/>
+      </p:ext>
+    </p:extLst>
+  </p:cSld>
+  <p:clrMapOvr>
+    <a:masterClrMapping/>
+  </p:clrMapOvr>
+</p:sld>
+</file>
+
+<file path=ppt/slides/slide24.xml><?xml version="1.0" encoding="utf-8"?>
+<p:sld xmlns:a="http://schemas.openxmlformats.org/drawingml/2006/main" xmlns:r="http://schemas.openxmlformats.org/officeDocument/2006/relationships" xmlns:p="http://schemas.openxmlformats.org/presentationml/2006/main">
+  <p:cSld>
+    <p:spTree>
+      <p:nvGrpSpPr>
+        <p:cNvPr id="1" name=""/>
+        <p:cNvGrpSpPr/>
+        <p:nvPr/>
+      </p:nvGrpSpPr>
+      <p:grpSpPr>
+        <a:xfrm>
+          <a:off x="0" y="0"/>
+          <a:ext cx="0" cy="0"/>
+          <a:chOff x="0" y="0"/>
+          <a:chExt cx="0" cy="0"/>
+        </a:xfrm>
+      </p:grpSpPr>
+      <p:sp>
+        <p:nvSpPr>
+          <p:cNvPr id="2" name="Title 1">
+            <a:extLst>
+              <a:ext uri="{FF2B5EF4-FFF2-40B4-BE49-F238E27FC236}">
+                <a16:creationId xmlns:a16="http://schemas.microsoft.com/office/drawing/2014/main" id="{D2E85F1B-B7C2-4467-81CD-7B4BFEC9DF62}"/>
+              </a:ext>
+            </a:extLst>
+          </p:cNvPr>
+          <p:cNvSpPr>
+            <a:spLocks noGrp="1"/>
+          </p:cNvSpPr>
+          <p:nvPr>
+            <p:ph type="title"/>
+          </p:nvPr>
+        </p:nvSpPr>
+        <p:spPr/>
+        <p:txBody>
+          <a:bodyPr/>
+          <a:lstStyle/>
+          <a:p>
+            <a:endParaRPr lang="en-US"/>
+          </a:p>
+        </p:txBody>
+      </p:sp>
+      <p:sp>
+        <p:nvSpPr>
+          <p:cNvPr id="3" name="Content Placeholder 2">
+            <a:extLst>
+              <a:ext uri="{FF2B5EF4-FFF2-40B4-BE49-F238E27FC236}">
+                <a16:creationId xmlns:a16="http://schemas.microsoft.com/office/drawing/2014/main" id="{23FDC552-A847-4F62-9ADE-EADE55B678F5}"/>
+              </a:ext>
+            </a:extLst>
+          </p:cNvPr>
+          <p:cNvSpPr>
+            <a:spLocks noGrp="1"/>
+          </p:cNvSpPr>
+          <p:nvPr>
+            <p:ph idx="1"/>
+          </p:nvPr>
+        </p:nvSpPr>
+        <p:spPr/>
+        <p:txBody>
+          <a:bodyPr/>
+          <a:lstStyle/>
+          <a:p>
+            <a:r>
+              <a:rPr lang="en-US" dirty="0"/>
+              <a:t>Transforming</a:t>
+            </a:r>
+          </a:p>
+          <a:p>
+            <a:pPr lvl="1"/>
+            <a:r>
+              <a:rPr lang="en-US" dirty="0" err="1">
+                <a:latin typeface="Consolas" panose="020B0609020204030204" pitchFamily="49" charset="0"/>
+              </a:rPr>
+              <a:t>npm</a:t>
+            </a:r>
+            <a:r>
+              <a:rPr lang="en-US" dirty="0">
+                <a:latin typeface="Consolas" panose="020B0609020204030204" pitchFamily="49" charset="0"/>
+              </a:rPr>
+              <a:t> install @nestjs/mapped-types</a:t>
+            </a:r>
+          </a:p>
+          <a:p>
+            <a:pPr lvl="1"/>
+            <a:r>
+              <a:rPr lang="en-US" dirty="0">
+                <a:latin typeface="Consolas" panose="020B0609020204030204" pitchFamily="49" charset="0"/>
+              </a:rPr>
+              <a:t>extends </a:t>
+            </a:r>
+            <a:r>
+              <a:rPr lang="en-US" dirty="0" err="1">
+                <a:latin typeface="Consolas" panose="020B0609020204030204" pitchFamily="49" charset="0"/>
+              </a:rPr>
+              <a:t>PartialType</a:t>
+            </a:r>
+            <a:r>
+              <a:rPr lang="en-US" dirty="0">
+                <a:latin typeface="Consolas" panose="020B0609020204030204" pitchFamily="49" charset="0"/>
+              </a:rPr>
+              <a:t>(class)</a:t>
+            </a:r>
+          </a:p>
+          <a:p>
+            <a:pPr lvl="2"/>
+            <a:r>
+              <a:rPr lang="en-US" dirty="0"/>
+              <a:t>With all validations</a:t>
+            </a:r>
+          </a:p>
+          <a:p>
+            <a:pPr lvl="2"/>
+            <a:endParaRPr lang="en-US" dirty="0"/>
+          </a:p>
+        </p:txBody>
+      </p:sp>
+      <p:sp>
+        <p:nvSpPr>
+          <p:cNvPr id="4" name="Footer Placeholder 3">
+            <a:extLst>
+              <a:ext uri="{FF2B5EF4-FFF2-40B4-BE49-F238E27FC236}">
+                <a16:creationId xmlns:a16="http://schemas.microsoft.com/office/drawing/2014/main" id="{33330AC0-DD5D-414B-B5F3-E5376E06E73A}"/>
+              </a:ext>
+            </a:extLst>
+          </p:cNvPr>
+          <p:cNvSpPr>
+            <a:spLocks noGrp="1"/>
+          </p:cNvSpPr>
+          <p:nvPr>
+            <p:ph type="ftr" sz="quarter" idx="11"/>
+          </p:nvPr>
+        </p:nvSpPr>
+        <p:spPr/>
+        <p:txBody>
+          <a:bodyPr/>
+          <a:lstStyle/>
+          <a:p>
+            <a:r>
+              <a:rPr lang="en-US"/>
+              <a:t>Nodejs Basics</a:t>
+            </a:r>
+            <a:endParaRPr lang="en-US" dirty="0"/>
+          </a:p>
+        </p:txBody>
+      </p:sp>
+      <p:sp>
+        <p:nvSpPr>
+          <p:cNvPr id="5" name="Slide Number Placeholder 4">
+            <a:extLst>
+              <a:ext uri="{FF2B5EF4-FFF2-40B4-BE49-F238E27FC236}">
+                <a16:creationId xmlns:a16="http://schemas.microsoft.com/office/drawing/2014/main" id="{9A595E8B-E7FD-492B-95FA-4F8FF232267B}"/>
+              </a:ext>
+            </a:extLst>
+          </p:cNvPr>
+          <p:cNvSpPr>
+            <a:spLocks noGrp="1"/>
+          </p:cNvSpPr>
+          <p:nvPr>
+            <p:ph type="sldNum" sz="quarter" idx="12"/>
+          </p:nvPr>
+        </p:nvSpPr>
+        <p:spPr/>
+        <p:txBody>
+          <a:bodyPr/>
+          <a:lstStyle/>
+          <a:p>
+            <a:fld id="{3A98EE3D-8CD1-4C3F-BD1C-C98C9596463C}" type="slidenum">
+              <a:rPr lang="en-US" smtClean="0"/>
+              <a:t>24</a:t>
+            </a:fld>
+            <a:endParaRPr lang="en-US" dirty="0"/>
+          </a:p>
+        </p:txBody>
+      </p:sp>
+    </p:spTree>
+    <p:extLst>
+      <p:ext uri="{BB962C8B-B14F-4D97-AF65-F5344CB8AC3E}">
+        <p14:creationId xmlns:p14="http://schemas.microsoft.com/office/powerpoint/2010/main" val="3512331457"/>
+      </p:ext>
+    </p:extLst>
+  </p:cSld>
+  <p:clrMapOvr>
+    <a:masterClrMapping/>
+  </p:clrMapOvr>
+</p:sld>
+</file>
+
+<file path=ppt/slides/slide25.xml><?xml version="1.0" encoding="utf-8"?>
+<p:sld xmlns:a="http://schemas.openxmlformats.org/drawingml/2006/main" xmlns:r="http://schemas.openxmlformats.org/officeDocument/2006/relationships" xmlns:p="http://schemas.openxmlformats.org/presentationml/2006/main">
+  <p:cSld>
+    <p:spTree>
+      <p:nvGrpSpPr>
+        <p:cNvPr id="1" name=""/>
+        <p:cNvGrpSpPr/>
+        <p:nvPr/>
+      </p:nvGrpSpPr>
+      <p:grpSpPr>
+        <a:xfrm>
+          <a:off x="0" y="0"/>
+          <a:ext cx="0" cy="0"/>
+          <a:chOff x="0" y="0"/>
+          <a:chExt cx="0" cy="0"/>
+        </a:xfrm>
+      </p:grpSpPr>
+      <p:sp>
+        <p:nvSpPr>
+          <p:cNvPr id="2" name="Title 1">
+            <a:extLst>
+              <a:ext uri="{FF2B5EF4-FFF2-40B4-BE49-F238E27FC236}">
+                <a16:creationId xmlns:a16="http://schemas.microsoft.com/office/drawing/2014/main" id="{A2212392-47D1-45BF-80D6-DF125188D6F7}"/>
+              </a:ext>
+            </a:extLst>
+          </p:cNvPr>
+          <p:cNvSpPr>
+            <a:spLocks noGrp="1"/>
+          </p:cNvSpPr>
+          <p:nvPr>
+            <p:ph type="title"/>
+          </p:nvPr>
+        </p:nvSpPr>
+        <p:spPr/>
+        <p:txBody>
+          <a:bodyPr/>
+          <a:lstStyle/>
+          <a:p>
+            <a:r>
+              <a:rPr lang="en-US" dirty="0"/>
+              <a:t>Demo</a:t>
+            </a:r>
+          </a:p>
+        </p:txBody>
+      </p:sp>
+      <p:sp>
+        <p:nvSpPr>
+          <p:cNvPr id="3" name="Content Placeholder 2">
+            <a:extLst>
+              <a:ext uri="{FF2B5EF4-FFF2-40B4-BE49-F238E27FC236}">
+                <a16:creationId xmlns:a16="http://schemas.microsoft.com/office/drawing/2014/main" id="{96FEF173-664E-45DD-AD11-D89B2DCF7601}"/>
+              </a:ext>
+            </a:extLst>
+          </p:cNvPr>
+          <p:cNvSpPr>
+            <a:spLocks noGrp="1"/>
+          </p:cNvSpPr>
+          <p:nvPr>
+            <p:ph idx="1"/>
+          </p:nvPr>
+        </p:nvSpPr>
+        <p:spPr/>
+        <p:txBody>
+          <a:bodyPr/>
+          <a:lstStyle/>
+          <a:p>
+            <a:r>
+              <a:rPr lang="en-US" dirty="0"/>
+              <a:t>What about Malicious </a:t>
+            </a:r>
+            <a:r>
+              <a:rPr lang="en-US" dirty="0" err="1"/>
+              <a:t>datas</a:t>
+            </a:r>
+            <a:r>
+              <a:rPr lang="en-US" dirty="0"/>
+              <a:t>?</a:t>
+            </a:r>
+          </a:p>
+          <a:p>
+            <a:pPr lvl="1"/>
+            <a:r>
+              <a:rPr lang="en-US" dirty="0">
+                <a:latin typeface="Consolas" panose="020B0609020204030204" pitchFamily="49" charset="0"/>
+              </a:rPr>
+              <a:t>whitelist: true</a:t>
+            </a:r>
+          </a:p>
+          <a:p>
+            <a:pPr lvl="2"/>
+            <a:r>
+              <a:rPr lang="en-US" dirty="0"/>
+              <a:t>Avoid users to pass unwanted data</a:t>
+            </a:r>
+          </a:p>
+          <a:p>
+            <a:pPr lvl="1"/>
+            <a:r>
+              <a:rPr lang="en-US" dirty="0" err="1">
+                <a:latin typeface="Consolas" panose="020B0609020204030204" pitchFamily="49" charset="0"/>
+              </a:rPr>
+              <a:t>forbidNonWhitelited</a:t>
+            </a:r>
+            <a:r>
+              <a:rPr lang="en-US" dirty="0">
+                <a:latin typeface="Consolas" panose="020B0609020204030204" pitchFamily="49" charset="0"/>
+              </a:rPr>
+              <a:t>: true</a:t>
+            </a:r>
+          </a:p>
+          <a:p>
+            <a:pPr lvl="2"/>
+            <a:r>
+              <a:rPr lang="en-US" dirty="0"/>
+              <a:t>Throw error (Bad Request)</a:t>
+            </a:r>
+          </a:p>
+          <a:p>
+            <a:pPr lvl="1"/>
+            <a:endParaRPr lang="en-US" dirty="0"/>
+          </a:p>
+        </p:txBody>
+      </p:sp>
+      <p:sp>
+        <p:nvSpPr>
+          <p:cNvPr id="4" name="Footer Placeholder 3">
+            <a:extLst>
+              <a:ext uri="{FF2B5EF4-FFF2-40B4-BE49-F238E27FC236}">
+                <a16:creationId xmlns:a16="http://schemas.microsoft.com/office/drawing/2014/main" id="{650ABAD5-E216-406C-80D2-89A91C76CBB7}"/>
+              </a:ext>
+            </a:extLst>
+          </p:cNvPr>
+          <p:cNvSpPr>
+            <a:spLocks noGrp="1"/>
+          </p:cNvSpPr>
+          <p:nvPr>
+            <p:ph type="ftr" sz="quarter" idx="11"/>
+          </p:nvPr>
+        </p:nvSpPr>
+        <p:spPr/>
+        <p:txBody>
+          <a:bodyPr/>
+          <a:lstStyle/>
+          <a:p>
+            <a:r>
+              <a:rPr lang="en-US"/>
+              <a:t>Nodejs Basics</a:t>
+            </a:r>
+            <a:endParaRPr lang="en-US" dirty="0"/>
+          </a:p>
+        </p:txBody>
+      </p:sp>
+      <p:sp>
+        <p:nvSpPr>
+          <p:cNvPr id="5" name="Slide Number Placeholder 4">
+            <a:extLst>
+              <a:ext uri="{FF2B5EF4-FFF2-40B4-BE49-F238E27FC236}">
+                <a16:creationId xmlns:a16="http://schemas.microsoft.com/office/drawing/2014/main" id="{02FC62D3-2857-4769-9991-19891424A136}"/>
+              </a:ext>
+            </a:extLst>
+          </p:cNvPr>
+          <p:cNvSpPr>
+            <a:spLocks noGrp="1"/>
+          </p:cNvSpPr>
+          <p:nvPr>
+            <p:ph type="sldNum" sz="quarter" idx="12"/>
+          </p:nvPr>
+        </p:nvSpPr>
+        <p:spPr/>
+        <p:txBody>
+          <a:bodyPr/>
+          <a:lstStyle/>
+          <a:p>
+            <a:fld id="{3A98EE3D-8CD1-4C3F-BD1C-C98C9596463C}" type="slidenum">
+              <a:rPr lang="en-US" smtClean="0"/>
+              <a:t>25</a:t>
+            </a:fld>
+            <a:endParaRPr lang="en-US" dirty="0"/>
+          </a:p>
+        </p:txBody>
+      </p:sp>
+    </p:spTree>
+    <p:extLst>
+      <p:ext uri="{BB962C8B-B14F-4D97-AF65-F5344CB8AC3E}">
+        <p14:creationId xmlns:p14="http://schemas.microsoft.com/office/powerpoint/2010/main" val="569254341"/>
+      </p:ext>
+    </p:extLst>
+  </p:cSld>
+  <p:clrMapOvr>
+    <a:masterClrMapping/>
+  </p:clrMapOvr>
+</p:sld>
+</file>
+
+<file path=ppt/slides/slide26.xml><?xml version="1.0" encoding="utf-8"?>
+<p:sld xmlns:a="http://schemas.openxmlformats.org/drawingml/2006/main" xmlns:r="http://schemas.openxmlformats.org/officeDocument/2006/relationships" xmlns:p="http://schemas.openxmlformats.org/presentationml/2006/main">
+  <p:cSld>
+    <p:spTree>
+      <p:nvGrpSpPr>
+        <p:cNvPr id="1" name=""/>
+        <p:cNvGrpSpPr/>
+        <p:nvPr/>
+      </p:nvGrpSpPr>
+      <p:grpSpPr>
+        <a:xfrm>
+          <a:off x="0" y="0"/>
+          <a:ext cx="0" cy="0"/>
+          <a:chOff x="0" y="0"/>
+          <a:chExt cx="0" cy="0"/>
+        </a:xfrm>
+      </p:grpSpPr>
+      <p:sp>
+        <p:nvSpPr>
+          <p:cNvPr id="2" name="Title 1">
+            <a:extLst>
+              <a:ext uri="{FF2B5EF4-FFF2-40B4-BE49-F238E27FC236}">
+                <a16:creationId xmlns:a16="http://schemas.microsoft.com/office/drawing/2014/main" id="{4B7B2541-47BC-4B1B-9EA3-47F3951037C4}"/>
+              </a:ext>
+            </a:extLst>
+          </p:cNvPr>
+          <p:cNvSpPr>
+            <a:spLocks noGrp="1"/>
+          </p:cNvSpPr>
+          <p:nvPr>
+            <p:ph type="title"/>
+          </p:nvPr>
+        </p:nvSpPr>
+        <p:spPr/>
+        <p:txBody>
+          <a:bodyPr/>
+          <a:lstStyle/>
+          <a:p>
+            <a:r>
+              <a:rPr lang="en-US" dirty="0"/>
+              <a:t>Demo</a:t>
+            </a:r>
+          </a:p>
+        </p:txBody>
+      </p:sp>
+      <p:sp>
+        <p:nvSpPr>
+          <p:cNvPr id="3" name="Content Placeholder 2">
+            <a:extLst>
+              <a:ext uri="{FF2B5EF4-FFF2-40B4-BE49-F238E27FC236}">
+                <a16:creationId xmlns:a16="http://schemas.microsoft.com/office/drawing/2014/main" id="{CC019233-64DB-48EE-819B-7A49C8B7AB1C}"/>
+              </a:ext>
+            </a:extLst>
+          </p:cNvPr>
+          <p:cNvSpPr>
+            <a:spLocks noGrp="1"/>
+          </p:cNvSpPr>
+          <p:nvPr>
+            <p:ph idx="1"/>
+          </p:nvPr>
+        </p:nvSpPr>
+        <p:spPr/>
+        <p:txBody>
+          <a:bodyPr/>
+          <a:lstStyle/>
+          <a:p>
+            <a:r>
+              <a:rPr lang="en-US" dirty="0"/>
+              <a:t>Payload type transforming</a:t>
+            </a:r>
+          </a:p>
+          <a:p>
+            <a:pPr lvl="1"/>
+            <a:r>
+              <a:rPr lang="en-US" dirty="0" err="1">
+                <a:latin typeface="Consolas" panose="020B0609020204030204" pitchFamily="49" charset="0"/>
+              </a:rPr>
+              <a:t>instanceof</a:t>
+            </a:r>
+            <a:r>
+              <a:rPr lang="en-US" dirty="0"/>
+              <a:t> ?</a:t>
+            </a:r>
+          </a:p>
+          <a:p>
+            <a:pPr lvl="2"/>
+            <a:r>
+              <a:rPr lang="en-US" dirty="0"/>
+              <a:t>Payloads are not the class itself</a:t>
+            </a:r>
+          </a:p>
+          <a:p>
+            <a:pPr lvl="1"/>
+            <a:r>
+              <a:rPr lang="en-US" dirty="0">
+                <a:latin typeface="Consolas" panose="020B0609020204030204" pitchFamily="49" charset="0"/>
+              </a:rPr>
+              <a:t>transform: true</a:t>
+            </a:r>
+          </a:p>
+          <a:p>
+            <a:pPr lvl="2"/>
+            <a:r>
+              <a:rPr lang="en-US" dirty="0"/>
+              <a:t>Now try </a:t>
+            </a:r>
+            <a:r>
+              <a:rPr lang="en-US" sz="2100" dirty="0" err="1">
+                <a:latin typeface="Consolas" panose="020B0609020204030204" pitchFamily="49" charset="0"/>
+              </a:rPr>
+              <a:t>instanceof</a:t>
+            </a:r>
+            <a:r>
+              <a:rPr lang="en-US" dirty="0"/>
+              <a:t> again</a:t>
+            </a:r>
+          </a:p>
+          <a:p>
+            <a:pPr lvl="1"/>
+            <a:r>
+              <a:rPr lang="en-US" dirty="0"/>
+              <a:t>Every query or path params are strings</a:t>
+            </a:r>
+          </a:p>
+          <a:p>
+            <a:pPr lvl="2"/>
+            <a:r>
+              <a:rPr lang="en-US" dirty="0"/>
+              <a:t>Use </a:t>
+            </a:r>
+            <a:r>
+              <a:rPr lang="en-US" sz="2100" dirty="0" err="1">
+                <a:latin typeface="Consolas" panose="020B0609020204030204" pitchFamily="49" charset="0"/>
+              </a:rPr>
+              <a:t>typeof</a:t>
+            </a:r>
+            <a:r>
+              <a:rPr lang="en-US" dirty="0"/>
+              <a:t> to test</a:t>
+            </a:r>
+          </a:p>
+        </p:txBody>
+      </p:sp>
+      <p:sp>
+        <p:nvSpPr>
+          <p:cNvPr id="4" name="Footer Placeholder 3">
+            <a:extLst>
+              <a:ext uri="{FF2B5EF4-FFF2-40B4-BE49-F238E27FC236}">
+                <a16:creationId xmlns:a16="http://schemas.microsoft.com/office/drawing/2014/main" id="{AD2E8C46-98AF-4B5E-9274-906B9FAC185C}"/>
+              </a:ext>
+            </a:extLst>
+          </p:cNvPr>
+          <p:cNvSpPr>
+            <a:spLocks noGrp="1"/>
+          </p:cNvSpPr>
+          <p:nvPr>
+            <p:ph type="ftr" sz="quarter" idx="11"/>
+          </p:nvPr>
+        </p:nvSpPr>
+        <p:spPr/>
+        <p:txBody>
+          <a:bodyPr/>
+          <a:lstStyle/>
+          <a:p>
+            <a:r>
+              <a:rPr lang="en-US"/>
+              <a:t>Nodejs Basics</a:t>
+            </a:r>
+            <a:endParaRPr lang="en-US" dirty="0"/>
+          </a:p>
+        </p:txBody>
+      </p:sp>
+      <p:sp>
+        <p:nvSpPr>
+          <p:cNvPr id="5" name="Slide Number Placeholder 4">
+            <a:extLst>
+              <a:ext uri="{FF2B5EF4-FFF2-40B4-BE49-F238E27FC236}">
+                <a16:creationId xmlns:a16="http://schemas.microsoft.com/office/drawing/2014/main" id="{13635DE3-31CF-4BFD-9170-467EF32A5B04}"/>
+              </a:ext>
+            </a:extLst>
+          </p:cNvPr>
+          <p:cNvSpPr>
+            <a:spLocks noGrp="1"/>
+          </p:cNvSpPr>
+          <p:nvPr>
+            <p:ph type="sldNum" sz="quarter" idx="12"/>
+          </p:nvPr>
+        </p:nvSpPr>
+        <p:spPr/>
+        <p:txBody>
+          <a:bodyPr/>
+          <a:lstStyle/>
+          <a:p>
+            <a:fld id="{3A98EE3D-8CD1-4C3F-BD1C-C98C9596463C}" type="slidenum">
+              <a:rPr lang="en-US" smtClean="0"/>
+              <a:t>26</a:t>
+            </a:fld>
+            <a:endParaRPr lang="en-US" dirty="0"/>
+          </a:p>
+        </p:txBody>
+      </p:sp>
+    </p:spTree>
+    <p:extLst>
+      <p:ext uri="{BB962C8B-B14F-4D97-AF65-F5344CB8AC3E}">
+        <p14:creationId xmlns:p14="http://schemas.microsoft.com/office/powerpoint/2010/main" val="2322070702"/>
+      </p:ext>
+    </p:extLst>
+  </p:cSld>
+  <p:clrMapOvr>
+    <a:masterClrMapping/>
+  </p:clrMapOvr>
+</p:sld>
+</file>
+
+<file path=ppt/slides/slide27.xml><?xml version="1.0" encoding="utf-8"?>
+<p:sld xmlns:a="http://schemas.openxmlformats.org/drawingml/2006/main" xmlns:r="http://schemas.openxmlformats.org/officeDocument/2006/relationships" xmlns:p="http://schemas.openxmlformats.org/presentationml/2006/main">
+  <p:cSld>
+    <p:spTree>
+      <p:nvGrpSpPr>
+        <p:cNvPr id="1" name=""/>
+        <p:cNvGrpSpPr/>
+        <p:nvPr/>
+      </p:nvGrpSpPr>
+      <p:grpSpPr>
+        <a:xfrm>
+          <a:off x="0" y="0"/>
+          <a:ext cx="0" cy="0"/>
+          <a:chOff x="0" y="0"/>
+          <a:chExt cx="0" cy="0"/>
+        </a:xfrm>
+      </p:grpSpPr>
+      <p:sp>
+        <p:nvSpPr>
+          <p:cNvPr id="2" name="Title 1">
+            <a:extLst>
+              <a:ext uri="{FF2B5EF4-FFF2-40B4-BE49-F238E27FC236}">
+                <a16:creationId xmlns:a16="http://schemas.microsoft.com/office/drawing/2014/main" id="{6B1A0672-14A7-4501-900C-A98EBCCF7AFE}"/>
+              </a:ext>
+            </a:extLst>
+          </p:cNvPr>
+          <p:cNvSpPr>
+            <a:spLocks noGrp="1"/>
+          </p:cNvSpPr>
+          <p:nvPr>
+            <p:ph type="title"/>
+          </p:nvPr>
+        </p:nvSpPr>
+        <p:spPr/>
+        <p:txBody>
+          <a:bodyPr/>
+          <a:lstStyle/>
+          <a:p>
+            <a:r>
+              <a:rPr lang="en-US" dirty="0" err="1"/>
+              <a:t>Excercise</a:t>
+            </a:r>
+            <a:endParaRPr lang="en-US" dirty="0"/>
+          </a:p>
+        </p:txBody>
+      </p:sp>
+      <p:sp>
+        <p:nvSpPr>
+          <p:cNvPr id="3" name="Content Placeholder 2">
+            <a:extLst>
+              <a:ext uri="{FF2B5EF4-FFF2-40B4-BE49-F238E27FC236}">
+                <a16:creationId xmlns:a16="http://schemas.microsoft.com/office/drawing/2014/main" id="{2AEB1BE9-8435-42BF-A4F1-2F148FA9187A}"/>
+              </a:ext>
+            </a:extLst>
+          </p:cNvPr>
+          <p:cNvSpPr>
+            <a:spLocks noGrp="1"/>
+          </p:cNvSpPr>
+          <p:nvPr>
+            <p:ph idx="1"/>
+          </p:nvPr>
+        </p:nvSpPr>
+        <p:spPr/>
+        <p:txBody>
+          <a:bodyPr/>
+          <a:lstStyle/>
+          <a:p>
+            <a:r>
+              <a:rPr lang="en-US" dirty="0"/>
+              <a:t>Required:</a:t>
+            </a:r>
+          </a:p>
+          <a:p>
+            <a:pPr lvl="1"/>
+            <a:r>
+              <a:rPr lang="en-US" dirty="0"/>
+              <a:t>Install nest.js and practice all we speak in this session</a:t>
+            </a:r>
+          </a:p>
+          <a:p>
+            <a:r>
+              <a:rPr lang="en-US" dirty="0"/>
+              <a:t>Optional:</a:t>
+            </a:r>
+          </a:p>
+          <a:p>
+            <a:pPr lvl="1"/>
+            <a:r>
+              <a:rPr lang="en-US" dirty="0"/>
+              <a:t>Create a validator to check if the string length is more than 3 character </a:t>
+            </a:r>
+            <a:r>
+              <a:rPr lang="en-US"/>
+              <a:t>or not</a:t>
+            </a:r>
+            <a:endParaRPr lang="en-US" dirty="0"/>
+          </a:p>
+        </p:txBody>
+      </p:sp>
+      <p:sp>
+        <p:nvSpPr>
+          <p:cNvPr id="4" name="Footer Placeholder 3">
+            <a:extLst>
+              <a:ext uri="{FF2B5EF4-FFF2-40B4-BE49-F238E27FC236}">
+                <a16:creationId xmlns:a16="http://schemas.microsoft.com/office/drawing/2014/main" id="{E3C0E9F9-B143-43AD-BD5C-508C3E46FF7B}"/>
+              </a:ext>
+            </a:extLst>
+          </p:cNvPr>
+          <p:cNvSpPr>
+            <a:spLocks noGrp="1"/>
+          </p:cNvSpPr>
+          <p:nvPr>
+            <p:ph type="ftr" sz="quarter" idx="11"/>
+          </p:nvPr>
+        </p:nvSpPr>
+        <p:spPr/>
+        <p:txBody>
+          <a:bodyPr/>
+          <a:lstStyle/>
+          <a:p>
+            <a:r>
+              <a:rPr lang="en-US"/>
+              <a:t>Nodejs Basics</a:t>
+            </a:r>
+            <a:endParaRPr lang="en-US" dirty="0"/>
+          </a:p>
+        </p:txBody>
+      </p:sp>
+      <p:sp>
+        <p:nvSpPr>
+          <p:cNvPr id="5" name="Slide Number Placeholder 4">
+            <a:extLst>
+              <a:ext uri="{FF2B5EF4-FFF2-40B4-BE49-F238E27FC236}">
+                <a16:creationId xmlns:a16="http://schemas.microsoft.com/office/drawing/2014/main" id="{1B95C015-BA9F-40C7-A04C-3B835E7354AB}"/>
+              </a:ext>
+            </a:extLst>
+          </p:cNvPr>
+          <p:cNvSpPr>
+            <a:spLocks noGrp="1"/>
+          </p:cNvSpPr>
+          <p:nvPr>
+            <p:ph type="sldNum" sz="quarter" idx="12"/>
+          </p:nvPr>
+        </p:nvSpPr>
+        <p:spPr/>
+        <p:txBody>
+          <a:bodyPr/>
+          <a:lstStyle/>
+          <a:p>
+            <a:fld id="{3A98EE3D-8CD1-4C3F-BD1C-C98C9596463C}" type="slidenum">
+              <a:rPr lang="en-US" smtClean="0"/>
+              <a:t>27</a:t>
+            </a:fld>
+            <a:endParaRPr lang="en-US" dirty="0"/>
+          </a:p>
+        </p:txBody>
+      </p:sp>
+    </p:spTree>
+    <p:extLst>
+      <p:ext uri="{BB962C8B-B14F-4D97-AF65-F5344CB8AC3E}">
+        <p14:creationId xmlns:p14="http://schemas.microsoft.com/office/powerpoint/2010/main" val="817859998"/>
       </p:ext>
     </p:extLst>
   </p:cSld>
@@ -7030,9 +10723,7 @@
             <a:r>
               <a:rPr lang="en-US" dirty="0">
                 <a:solidFill>
-                  <a:schemeClr val="tx1">
-                    <a:lumMod val="50000"/>
-                  </a:schemeClr>
+                  <a:schemeClr val="tx1"/>
                 </a:solidFill>
               </a:rPr>
               <a:t>Create a REST API Application (continue)</a:t>
@@ -7043,9 +10734,7 @@
             <a:r>
               <a:rPr lang="en-US" dirty="0">
                 <a:solidFill>
-                  <a:schemeClr val="tx1">
-                    <a:lumMod val="50000"/>
-                  </a:schemeClr>
+                  <a:schemeClr val="tx1"/>
                 </a:solidFill>
               </a:rPr>
               <a:t>Handling Update and Delete requests</a:t>
@@ -7056,9 +10745,7 @@
             <a:r>
               <a:rPr lang="en-US" dirty="0">
                 <a:solidFill>
-                  <a:schemeClr val="tx1">
-                    <a:lumMod val="50000"/>
-                  </a:schemeClr>
+                  <a:schemeClr val="tx1"/>
                 </a:solidFill>
               </a:rPr>
               <a:t>Implement Pagination with Query Params</a:t>
@@ -7069,9 +10756,7 @@
             <a:r>
               <a:rPr lang="en-US" dirty="0">
                 <a:solidFill>
-                  <a:schemeClr val="tx1">
-                    <a:lumMod val="50000"/>
-                  </a:schemeClr>
+                  <a:schemeClr val="tx1"/>
                 </a:solidFill>
               </a:rPr>
               <a:t>Creating a basic service</a:t>
@@ -7082,9 +10767,7 @@
             <a:r>
               <a:rPr lang="en-US" dirty="0">
                 <a:solidFill>
-                  <a:schemeClr val="tx1">
-                    <a:lumMod val="50000"/>
-                  </a:schemeClr>
+                  <a:schemeClr val="tx1"/>
                 </a:solidFill>
               </a:rPr>
               <a:t>Send User-friendly Error Messages</a:t>
@@ -7095,9 +10778,7 @@
             <a:r>
               <a:rPr lang="en-US" dirty="0">
                 <a:solidFill>
-                  <a:schemeClr val="tx1">
-                    <a:lumMod val="50000"/>
-                  </a:schemeClr>
+                  <a:schemeClr val="tx1"/>
                 </a:solidFill>
               </a:rPr>
               <a:t>Encompass business-Domain in Modules</a:t>
@@ -7108,9 +10789,7 @@
             <a:r>
               <a:rPr lang="en-US" dirty="0">
                 <a:solidFill>
-                  <a:schemeClr val="tx1">
-                    <a:lumMod val="50000"/>
-                  </a:schemeClr>
+                  <a:schemeClr val="tx1"/>
                 </a:solidFill>
               </a:rPr>
               <a:t>Introduction to Data Transfer Objects (DTOs)</a:t>
@@ -7121,9 +10800,7 @@
             <a:r>
               <a:rPr lang="en-US" dirty="0">
                 <a:solidFill>
-                  <a:schemeClr val="tx1">
-                    <a:lumMod val="50000"/>
-                  </a:schemeClr>
+                  <a:schemeClr val="tx1"/>
                 </a:solidFill>
               </a:rPr>
               <a:t>Validate Input Data with DTO</a:t>
@@ -7134,9 +10811,7 @@
             <a:r>
               <a:rPr lang="en-US" dirty="0">
                 <a:solidFill>
-                  <a:schemeClr val="tx1">
-                    <a:lumMod val="50000"/>
-                  </a:schemeClr>
+                  <a:schemeClr val="tx1"/>
                 </a:solidFill>
               </a:rPr>
               <a:t>Handling Malicious Request Data</a:t>
@@ -7147,9 +10822,7 @@
             <a:r>
               <a:rPr lang="en-US" dirty="0">
                 <a:solidFill>
-                  <a:schemeClr val="tx1">
-                    <a:lumMod val="50000"/>
-                  </a:schemeClr>
+                  <a:schemeClr val="tx1"/>
                 </a:solidFill>
               </a:rPr>
               <a:t>Auto-transform Payloads to DTO instances</a:t>

</xml_diff>

<commit_message>
session 02 nestjs added
</commit_message>
<xml_diff>
--- a/nestjs/nestjs-01.pptx
+++ b/nestjs/nestjs-01.pptx
@@ -5,7 +5,7 @@
     <p:sldMasterId id="2147483705" r:id="rId1"/>
   </p:sldMasterIdLst>
   <p:notesMasterIdLst>
-    <p:notesMasterId r:id="rId29"/>
+    <p:notesMasterId r:id="rId19"/>
   </p:notesMasterIdLst>
   <p:sldIdLst>
     <p:sldId id="259" r:id="rId2"/>
@@ -25,16 +25,6 @@
     <p:sldId id="308" r:id="rId16"/>
     <p:sldId id="309" r:id="rId17"/>
     <p:sldId id="310" r:id="rId18"/>
-    <p:sldId id="311" r:id="rId19"/>
-    <p:sldId id="312" r:id="rId20"/>
-    <p:sldId id="313" r:id="rId21"/>
-    <p:sldId id="314" r:id="rId22"/>
-    <p:sldId id="315" r:id="rId23"/>
-    <p:sldId id="316" r:id="rId24"/>
-    <p:sldId id="317" r:id="rId25"/>
-    <p:sldId id="318" r:id="rId26"/>
-    <p:sldId id="319" r:id="rId27"/>
-    <p:sldId id="320" r:id="rId28"/>
   </p:sldIdLst>
   <p:sldSz cx="12192000" cy="6858000"/>
   <p:notesSz cx="6858000" cy="9144000"/>
@@ -223,7 +213,7 @@
           <a:p>
             <a:fld id="{9B9ECB28-6A22-4037-9487-F3F739F744D6}" type="datetimeFigureOut">
               <a:rPr lang="en-US" smtClean="0"/>
-              <a:t>1/17/2022</a:t>
+              <a:t>1/22/2022</a:t>
             </a:fld>
             <a:endParaRPr lang="en-US"/>
           </a:p>
@@ -674,7 +664,7 @@
           <a:p>
             <a:fld id="{19B6F524-99F3-4BEA-ACD7-976EF4D36657}" type="datetime1">
               <a:rPr lang="en-US" smtClean="0"/>
-              <a:t>1/17/2022</a:t>
+              <a:t>1/22/2022</a:t>
             </a:fld>
             <a:endParaRPr lang="en-US" dirty="0"/>
           </a:p>
@@ -983,7 +973,7 @@
           <a:p>
             <a:fld id="{2145C3A9-05D9-428D-9788-A7F14838F6F9}" type="datetime1">
               <a:rPr lang="en-US" smtClean="0"/>
-              <a:t>1/17/2022</a:t>
+              <a:t>1/22/2022</a:t>
             </a:fld>
             <a:endParaRPr lang="en-US" dirty="0"/>
           </a:p>
@@ -1181,7 +1171,7 @@
           <a:p>
             <a:fld id="{82C701FB-B03E-4981-A9F8-99B474DD173A}" type="datetime1">
               <a:rPr lang="en-US" smtClean="0"/>
-              <a:t>1/17/2022</a:t>
+              <a:t>1/22/2022</a:t>
             </a:fld>
             <a:endParaRPr lang="en-US" dirty="0"/>
           </a:p>
@@ -1448,7 +1438,7 @@
           <a:p>
             <a:fld id="{7A7E8EF3-CBF7-4EB9-B6E5-3754574E3433}" type="datetime1">
               <a:rPr lang="en-US" smtClean="0"/>
-              <a:t>1/17/2022</a:t>
+              <a:t>1/22/2022</a:t>
             </a:fld>
             <a:endParaRPr lang="en-US" dirty="0"/>
           </a:p>
@@ -1888,7 +1878,7 @@
           <a:p>
             <a:fld id="{DA8A4A96-31AC-487C-9F15-1822D58542B7}" type="datetime1">
               <a:rPr lang="en-US" smtClean="0"/>
-              <a:t>1/17/2022</a:t>
+              <a:t>1/22/2022</a:t>
             </a:fld>
             <a:endParaRPr lang="en-US" dirty="0"/>
           </a:p>
@@ -2429,7 +2419,7 @@
           <a:p>
             <a:fld id="{FBBF9546-09C4-4F24-A284-5B81FF8659B4}" type="datetime1">
               <a:rPr lang="en-US" smtClean="0"/>
-              <a:t>1/17/2022</a:t>
+              <a:t>1/22/2022</a:t>
             </a:fld>
             <a:endParaRPr lang="en-US" dirty="0"/>
           </a:p>
@@ -3315,7 +3305,7 @@
           <a:p>
             <a:fld id="{5BF4405D-15A5-450B-B053-484859B9C8F7}" type="datetime1">
               <a:rPr lang="en-US" smtClean="0"/>
-              <a:t>1/17/2022</a:t>
+              <a:t>1/22/2022</a:t>
             </a:fld>
             <a:endParaRPr lang="en-US" dirty="0"/>
           </a:p>
@@ -3489,7 +3479,7 @@
           <a:p>
             <a:fld id="{E0366559-EC21-40C1-8A65-9A3B4EA78391}" type="datetime1">
               <a:rPr lang="en-US" smtClean="0"/>
-              <a:t>1/17/2022</a:t>
+              <a:t>1/22/2022</a:t>
             </a:fld>
             <a:endParaRPr lang="en-US" dirty="0"/>
           </a:p>
@@ -3677,7 +3667,7 @@
           <a:p>
             <a:fld id="{4F09CA92-695C-4FFA-8E37-4D2C288BCC04}" type="datetime1">
               <a:rPr lang="en-US" smtClean="0"/>
-              <a:t>1/17/2022</a:t>
+              <a:t>1/22/2022</a:t>
             </a:fld>
             <a:endParaRPr lang="en-US" dirty="0"/>
           </a:p>
@@ -3851,7 +3841,7 @@
           <a:p>
             <a:fld id="{CA551262-FC07-4FE4-9221-F72F7D4F209A}" type="datetime1">
               <a:rPr lang="en-US" smtClean="0"/>
-              <a:t>1/17/2022</a:t>
+              <a:t>1/22/2022</a:t>
             </a:fld>
             <a:endParaRPr lang="en-US" dirty="0"/>
           </a:p>
@@ -4099,7 +4089,7 @@
           <a:p>
             <a:fld id="{46A321E4-8899-4F7D-BEB1-BD52626ABD8D}" type="datetime1">
               <a:rPr lang="en-US" smtClean="0"/>
-              <a:t>1/17/2022</a:t>
+              <a:t>1/22/2022</a:t>
             </a:fld>
             <a:endParaRPr lang="en-US" dirty="0"/>
           </a:p>
@@ -4345,7 +4335,7 @@
           <a:p>
             <a:fld id="{B53F6DFA-8A0E-4513-867D-18B9AA66B23C}" type="datetime1">
               <a:rPr lang="en-US" smtClean="0"/>
-              <a:t>1/17/2022</a:t>
+              <a:t>1/22/2022</a:t>
             </a:fld>
             <a:endParaRPr lang="en-US" dirty="0"/>
           </a:p>
@@ -4832,7 +4822,7 @@
           <a:p>
             <a:fld id="{154283A7-B9AC-454B-A468-44B75A398B49}" type="datetime1">
               <a:rPr lang="en-US" smtClean="0"/>
-              <a:t>1/17/2022</a:t>
+              <a:t>1/22/2022</a:t>
             </a:fld>
             <a:endParaRPr lang="en-US" dirty="0"/>
           </a:p>
@@ -4954,7 +4944,7 @@
           <a:p>
             <a:fld id="{A3F8184D-DEDD-48A0-9ACA-5F6ED9EFE5B8}" type="datetime1">
               <a:rPr lang="en-US" smtClean="0"/>
-              <a:t>1/17/2022</a:t>
+              <a:t>1/22/2022</a:t>
             </a:fld>
             <a:endParaRPr lang="en-US" dirty="0"/>
           </a:p>
@@ -5053,7 +5043,7 @@
           <a:p>
             <a:fld id="{BF38AC0E-F520-48F3-BA14-8BAB82D735FB}" type="datetime1">
               <a:rPr lang="en-US" smtClean="0"/>
-              <a:t>1/17/2022</a:t>
+              <a:t>1/22/2022</a:t>
             </a:fld>
             <a:endParaRPr lang="en-US" dirty="0"/>
           </a:p>
@@ -5312,7 +5302,7 @@
           <a:p>
             <a:fld id="{317D0F2A-2724-4AD4-BF4C-A7B1910D9412}" type="datetime1">
               <a:rPr lang="en-US" smtClean="0"/>
-              <a:t>1/17/2022</a:t>
+              <a:t>1/22/2022</a:t>
             </a:fld>
             <a:endParaRPr lang="en-US" dirty="0"/>
           </a:p>
@@ -5623,7 +5613,7 @@
           <a:p>
             <a:fld id="{9A0B82A5-4A21-4F82-91DB-989CE997E82E}" type="datetime1">
               <a:rPr lang="en-US" smtClean="0"/>
-              <a:t>1/17/2022</a:t>
+              <a:t>1/22/2022</a:t>
             </a:fld>
             <a:endParaRPr lang="en-US" dirty="0"/>
           </a:p>
@@ -5860,7 +5850,7 @@
           <a:p>
             <a:fld id="{01BFEF8A-AE08-4951-B923-589F814B0C31}" type="datetime1">
               <a:rPr lang="en-US" smtClean="0"/>
-              <a:t>1/17/2022</a:t>
+              <a:t>1/22/2022</a:t>
             </a:fld>
             <a:endParaRPr lang="en-US" dirty="0"/>
           </a:p>
@@ -8253,485 +8243,6 @@
 </p:sld>
 </file>
 
-<file path=ppt/slides/slide18.xml><?xml version="1.0" encoding="utf-8"?>
-<p:sld xmlns:a="http://schemas.openxmlformats.org/drawingml/2006/main" xmlns:r="http://schemas.openxmlformats.org/officeDocument/2006/relationships" xmlns:p="http://schemas.openxmlformats.org/presentationml/2006/main">
-  <p:cSld>
-    <p:spTree>
-      <p:nvGrpSpPr>
-        <p:cNvPr id="1" name=""/>
-        <p:cNvGrpSpPr/>
-        <p:nvPr/>
-      </p:nvGrpSpPr>
-      <p:grpSpPr>
-        <a:xfrm>
-          <a:off x="0" y="0"/>
-          <a:ext cx="0" cy="0"/>
-          <a:chOff x="0" y="0"/>
-          <a:chExt cx="0" cy="0"/>
-        </a:xfrm>
-      </p:grpSpPr>
-      <p:sp>
-        <p:nvSpPr>
-          <p:cNvPr id="2" name="Title 1">
-            <a:extLst>
-              <a:ext uri="{FF2B5EF4-FFF2-40B4-BE49-F238E27FC236}">
-                <a16:creationId xmlns:a16="http://schemas.microsoft.com/office/drawing/2014/main" id="{696C7D0C-1A2B-4385-8C03-B09B84AA30E1}"/>
-              </a:ext>
-            </a:extLst>
-          </p:cNvPr>
-          <p:cNvSpPr>
-            <a:spLocks noGrp="1"/>
-          </p:cNvSpPr>
-          <p:nvPr>
-            <p:ph type="title"/>
-          </p:nvPr>
-        </p:nvSpPr>
-        <p:spPr/>
-        <p:txBody>
-          <a:bodyPr/>
-          <a:lstStyle/>
-          <a:p>
-            <a:r>
-              <a:rPr lang="en-US" dirty="0"/>
-              <a:t>Demo</a:t>
-            </a:r>
-          </a:p>
-        </p:txBody>
-      </p:sp>
-      <p:sp>
-        <p:nvSpPr>
-          <p:cNvPr id="3" name="Content Placeholder 2">
-            <a:extLst>
-              <a:ext uri="{FF2B5EF4-FFF2-40B4-BE49-F238E27FC236}">
-                <a16:creationId xmlns:a16="http://schemas.microsoft.com/office/drawing/2014/main" id="{A280DD74-CB2B-427D-806D-C49C83149B96}"/>
-              </a:ext>
-            </a:extLst>
-          </p:cNvPr>
-          <p:cNvSpPr>
-            <a:spLocks noGrp="1"/>
-          </p:cNvSpPr>
-          <p:nvPr>
-            <p:ph idx="1"/>
-          </p:nvPr>
-        </p:nvSpPr>
-        <p:spPr/>
-        <p:txBody>
-          <a:bodyPr>
-            <a:normAutofit fontScale="92500" lnSpcReduction="10000"/>
-          </a:bodyPr>
-          <a:lstStyle/>
-          <a:p>
-            <a:r>
-              <a:rPr lang="en-US" dirty="0"/>
-              <a:t>Services</a:t>
-            </a:r>
-          </a:p>
-          <a:p>
-            <a:pPr lvl="1"/>
-            <a:r>
-              <a:rPr lang="en-US" dirty="0"/>
-              <a:t>Separate our business logic from controllers</a:t>
-            </a:r>
-          </a:p>
-          <a:p>
-            <a:pPr lvl="1"/>
-            <a:r>
-              <a:rPr lang="en-US" dirty="0"/>
-              <a:t>So our services are reusable inside other controllers</a:t>
-            </a:r>
-          </a:p>
-          <a:p>
-            <a:pPr lvl="1"/>
-            <a:r>
-              <a:rPr lang="en-US" sz="1900" dirty="0">
-                <a:latin typeface="Consolas" panose="020B0609020204030204" pitchFamily="49" charset="0"/>
-              </a:rPr>
-              <a:t>nest generate service</a:t>
-            </a:r>
-          </a:p>
-          <a:p>
-            <a:pPr lvl="2"/>
-            <a:r>
-              <a:rPr lang="en-US" sz="1900" dirty="0">
-                <a:latin typeface="Consolas" panose="020B0609020204030204" pitchFamily="49" charset="0"/>
-              </a:rPr>
-              <a:t>--no-spec</a:t>
-            </a:r>
-          </a:p>
-          <a:p>
-            <a:pPr lvl="2"/>
-            <a:r>
-              <a:rPr lang="en-US" sz="1900" dirty="0">
-                <a:latin typeface="Consolas" panose="020B0609020204030204" pitchFamily="49" charset="0"/>
-              </a:rPr>
-              <a:t>--dry-run</a:t>
-            </a:r>
-          </a:p>
-          <a:p>
-            <a:pPr lvl="1"/>
-            <a:r>
-              <a:rPr lang="en-US" dirty="0"/>
-              <a:t>Providers?????</a:t>
-            </a:r>
-          </a:p>
-          <a:p>
-            <a:pPr lvl="2"/>
-            <a:r>
-              <a:rPr lang="en-US" dirty="0"/>
-              <a:t>Inject dependencies</a:t>
-            </a:r>
-          </a:p>
-          <a:p>
-            <a:pPr lvl="2"/>
-            <a:r>
-              <a:rPr lang="en-US" dirty="0"/>
-              <a:t>Nest runtime system will control the di</a:t>
-            </a:r>
-          </a:p>
-          <a:p>
-            <a:pPr lvl="2"/>
-            <a:r>
-              <a:rPr lang="en-US" sz="1900" dirty="0">
-                <a:latin typeface="Consolas" panose="020B0609020204030204" pitchFamily="49" charset="0"/>
-              </a:rPr>
-              <a:t>@Injectable</a:t>
-            </a:r>
-          </a:p>
-          <a:p>
-            <a:pPr lvl="2"/>
-            <a:r>
-              <a:rPr lang="en-US" dirty="0"/>
-              <a:t>Where to inject them? Through constructor</a:t>
-            </a:r>
-          </a:p>
-          <a:p>
-            <a:pPr lvl="2"/>
-            <a:r>
-              <a:rPr lang="en-US" dirty="0"/>
-              <a:t>It’s better to define the class in constructor as </a:t>
-            </a:r>
-            <a:r>
-              <a:rPr lang="en-US" sz="1900" dirty="0" err="1">
-                <a:latin typeface="Consolas" panose="020B0609020204030204" pitchFamily="49" charset="0"/>
-              </a:rPr>
-              <a:t>readonly</a:t>
-            </a:r>
-            <a:endParaRPr lang="en-US" sz="1900" dirty="0">
-              <a:latin typeface="Consolas" panose="020B0609020204030204" pitchFamily="49" charset="0"/>
-            </a:endParaRPr>
-          </a:p>
-        </p:txBody>
-      </p:sp>
-      <p:sp>
-        <p:nvSpPr>
-          <p:cNvPr id="4" name="Footer Placeholder 3">
-            <a:extLst>
-              <a:ext uri="{FF2B5EF4-FFF2-40B4-BE49-F238E27FC236}">
-                <a16:creationId xmlns:a16="http://schemas.microsoft.com/office/drawing/2014/main" id="{21021A81-D833-4D36-9013-D1276A794367}"/>
-              </a:ext>
-            </a:extLst>
-          </p:cNvPr>
-          <p:cNvSpPr>
-            <a:spLocks noGrp="1"/>
-          </p:cNvSpPr>
-          <p:nvPr>
-            <p:ph type="ftr" sz="quarter" idx="11"/>
-          </p:nvPr>
-        </p:nvSpPr>
-        <p:spPr/>
-        <p:txBody>
-          <a:bodyPr/>
-          <a:lstStyle/>
-          <a:p>
-            <a:r>
-              <a:rPr lang="en-US"/>
-              <a:t>Nodejs Basics</a:t>
-            </a:r>
-            <a:endParaRPr lang="en-US" dirty="0"/>
-          </a:p>
-        </p:txBody>
-      </p:sp>
-      <p:sp>
-        <p:nvSpPr>
-          <p:cNvPr id="5" name="Slide Number Placeholder 4">
-            <a:extLst>
-              <a:ext uri="{FF2B5EF4-FFF2-40B4-BE49-F238E27FC236}">
-                <a16:creationId xmlns:a16="http://schemas.microsoft.com/office/drawing/2014/main" id="{F44E8C7D-B212-4D3F-9E32-4EA48EA4D4AF}"/>
-              </a:ext>
-            </a:extLst>
-          </p:cNvPr>
-          <p:cNvSpPr>
-            <a:spLocks noGrp="1"/>
-          </p:cNvSpPr>
-          <p:nvPr>
-            <p:ph type="sldNum" sz="quarter" idx="12"/>
-          </p:nvPr>
-        </p:nvSpPr>
-        <p:spPr/>
-        <p:txBody>
-          <a:bodyPr/>
-          <a:lstStyle/>
-          <a:p>
-            <a:fld id="{3A98EE3D-8CD1-4C3F-BD1C-C98C9596463C}" type="slidenum">
-              <a:rPr lang="en-US" smtClean="0"/>
-              <a:t>18</a:t>
-            </a:fld>
-            <a:endParaRPr lang="en-US" dirty="0"/>
-          </a:p>
-        </p:txBody>
-      </p:sp>
-    </p:spTree>
-    <p:extLst>
-      <p:ext uri="{BB962C8B-B14F-4D97-AF65-F5344CB8AC3E}">
-        <p14:creationId xmlns:p14="http://schemas.microsoft.com/office/powerpoint/2010/main" val="2295524350"/>
-      </p:ext>
-    </p:extLst>
-  </p:cSld>
-  <p:clrMapOvr>
-    <a:masterClrMapping/>
-  </p:clrMapOvr>
-</p:sld>
-</file>
-
-<file path=ppt/slides/slide19.xml><?xml version="1.0" encoding="utf-8"?>
-<p:sld xmlns:a="http://schemas.openxmlformats.org/drawingml/2006/main" xmlns:r="http://schemas.openxmlformats.org/officeDocument/2006/relationships" xmlns:p="http://schemas.openxmlformats.org/presentationml/2006/main">
-  <p:cSld>
-    <p:spTree>
-      <p:nvGrpSpPr>
-        <p:cNvPr id="1" name=""/>
-        <p:cNvGrpSpPr/>
-        <p:nvPr/>
-      </p:nvGrpSpPr>
-      <p:grpSpPr>
-        <a:xfrm>
-          <a:off x="0" y="0"/>
-          <a:ext cx="0" cy="0"/>
-          <a:chOff x="0" y="0"/>
-          <a:chExt cx="0" cy="0"/>
-        </a:xfrm>
-      </p:grpSpPr>
-      <p:sp>
-        <p:nvSpPr>
-          <p:cNvPr id="2" name="Title 1">
-            <a:extLst>
-              <a:ext uri="{FF2B5EF4-FFF2-40B4-BE49-F238E27FC236}">
-                <a16:creationId xmlns:a16="http://schemas.microsoft.com/office/drawing/2014/main" id="{2C432CAA-DD76-4D33-9E94-8E6572BB5263}"/>
-              </a:ext>
-            </a:extLst>
-          </p:cNvPr>
-          <p:cNvSpPr>
-            <a:spLocks noGrp="1"/>
-          </p:cNvSpPr>
-          <p:nvPr>
-            <p:ph type="title"/>
-          </p:nvPr>
-        </p:nvSpPr>
-        <p:spPr/>
-        <p:txBody>
-          <a:bodyPr/>
-          <a:lstStyle/>
-          <a:p>
-            <a:r>
-              <a:rPr lang="en-US" dirty="0"/>
-              <a:t>Demo</a:t>
-            </a:r>
-          </a:p>
-        </p:txBody>
-      </p:sp>
-      <p:sp>
-        <p:nvSpPr>
-          <p:cNvPr id="3" name="Content Placeholder 2">
-            <a:extLst>
-              <a:ext uri="{FF2B5EF4-FFF2-40B4-BE49-F238E27FC236}">
-                <a16:creationId xmlns:a16="http://schemas.microsoft.com/office/drawing/2014/main" id="{F371EC95-B1F9-488E-9576-1365AAA3B43C}"/>
-              </a:ext>
-            </a:extLst>
-          </p:cNvPr>
-          <p:cNvSpPr>
-            <a:spLocks noGrp="1"/>
-          </p:cNvSpPr>
-          <p:nvPr>
-            <p:ph idx="1"/>
-          </p:nvPr>
-        </p:nvSpPr>
-        <p:spPr/>
-        <p:txBody>
-          <a:bodyPr>
-            <a:normAutofit lnSpcReduction="10000"/>
-          </a:bodyPr>
-          <a:lstStyle/>
-          <a:p>
-            <a:r>
-              <a:rPr lang="en-US" dirty="0"/>
-              <a:t>Resolving the service is through it’s class name</a:t>
-            </a:r>
-          </a:p>
-          <a:p>
-            <a:r>
-              <a:rPr lang="en-US" dirty="0"/>
-              <a:t>Services are handle the business logic through database</a:t>
-            </a:r>
-          </a:p>
-          <a:p>
-            <a:r>
-              <a:rPr lang="en-US" dirty="0"/>
-              <a:t>Use an array as our </a:t>
-            </a:r>
-            <a:r>
-              <a:rPr lang="en-US" dirty="0" err="1"/>
-              <a:t>db</a:t>
-            </a:r>
-            <a:endParaRPr lang="en-US" dirty="0"/>
-          </a:p>
-          <a:p>
-            <a:pPr lvl="1"/>
-            <a:r>
-              <a:rPr lang="en-US" dirty="0"/>
-              <a:t>Entities folder for the shape of our resource (like the </a:t>
-            </a:r>
-            <a:r>
-              <a:rPr lang="en-US" dirty="0" err="1"/>
-              <a:t>typeorm</a:t>
-            </a:r>
-            <a:r>
-              <a:rPr lang="en-US" dirty="0"/>
-              <a:t>)</a:t>
-            </a:r>
-          </a:p>
-          <a:p>
-            <a:r>
-              <a:rPr lang="en-US" dirty="0"/>
-              <a:t>Write CRUD operation inside the service</a:t>
-            </a:r>
-          </a:p>
-          <a:p>
-            <a:pPr lvl="1"/>
-            <a:r>
-              <a:rPr lang="en-US" sz="1800" dirty="0" err="1">
-                <a:latin typeface="Consolas" panose="020B0609020204030204" pitchFamily="49" charset="0"/>
-              </a:rPr>
-              <a:t>findAll</a:t>
-            </a:r>
-            <a:endParaRPr lang="en-US" sz="1800" dirty="0">
-              <a:latin typeface="Consolas" panose="020B0609020204030204" pitchFamily="49" charset="0"/>
-            </a:endParaRPr>
-          </a:p>
-          <a:p>
-            <a:pPr lvl="1"/>
-            <a:r>
-              <a:rPr lang="en-US" sz="1800" dirty="0" err="1">
-                <a:latin typeface="Consolas" panose="020B0609020204030204" pitchFamily="49" charset="0"/>
-              </a:rPr>
-              <a:t>findOne</a:t>
-            </a:r>
-            <a:endParaRPr lang="en-US" sz="1800" dirty="0">
-              <a:latin typeface="Consolas" panose="020B0609020204030204" pitchFamily="49" charset="0"/>
-            </a:endParaRPr>
-          </a:p>
-          <a:p>
-            <a:pPr lvl="1"/>
-            <a:r>
-              <a:rPr lang="en-US" sz="1800" dirty="0">
-                <a:latin typeface="Consolas" panose="020B0609020204030204" pitchFamily="49" charset="0"/>
-              </a:rPr>
-              <a:t>create</a:t>
-            </a:r>
-          </a:p>
-          <a:p>
-            <a:pPr lvl="1"/>
-            <a:r>
-              <a:rPr lang="en-US" sz="1800" dirty="0">
-                <a:latin typeface="Consolas" panose="020B0609020204030204" pitchFamily="49" charset="0"/>
-              </a:rPr>
-              <a:t>update</a:t>
-            </a:r>
-          </a:p>
-          <a:p>
-            <a:pPr lvl="1"/>
-            <a:r>
-              <a:rPr lang="en-US" sz="1800" dirty="0">
-                <a:latin typeface="Consolas" panose="020B0609020204030204" pitchFamily="49" charset="0"/>
-              </a:rPr>
-              <a:t>remove</a:t>
-            </a:r>
-          </a:p>
-          <a:p>
-            <a:pPr lvl="1"/>
-            <a:endParaRPr lang="en-US" dirty="0"/>
-          </a:p>
-        </p:txBody>
-      </p:sp>
-      <p:sp>
-        <p:nvSpPr>
-          <p:cNvPr id="4" name="Footer Placeholder 3">
-            <a:extLst>
-              <a:ext uri="{FF2B5EF4-FFF2-40B4-BE49-F238E27FC236}">
-                <a16:creationId xmlns:a16="http://schemas.microsoft.com/office/drawing/2014/main" id="{4E45B0E3-3D62-4273-9A43-4AE775052F9D}"/>
-              </a:ext>
-            </a:extLst>
-          </p:cNvPr>
-          <p:cNvSpPr>
-            <a:spLocks noGrp="1"/>
-          </p:cNvSpPr>
-          <p:nvPr>
-            <p:ph type="ftr" sz="quarter" idx="11"/>
-          </p:nvPr>
-        </p:nvSpPr>
-        <p:spPr/>
-        <p:txBody>
-          <a:bodyPr/>
-          <a:lstStyle/>
-          <a:p>
-            <a:r>
-              <a:rPr lang="en-US"/>
-              <a:t>Nodejs Basics</a:t>
-            </a:r>
-            <a:endParaRPr lang="en-US" dirty="0"/>
-          </a:p>
-        </p:txBody>
-      </p:sp>
-      <p:sp>
-        <p:nvSpPr>
-          <p:cNvPr id="5" name="Slide Number Placeholder 4">
-            <a:extLst>
-              <a:ext uri="{FF2B5EF4-FFF2-40B4-BE49-F238E27FC236}">
-                <a16:creationId xmlns:a16="http://schemas.microsoft.com/office/drawing/2014/main" id="{073C68FA-B843-450A-B42A-898838C14777}"/>
-              </a:ext>
-            </a:extLst>
-          </p:cNvPr>
-          <p:cNvSpPr>
-            <a:spLocks noGrp="1"/>
-          </p:cNvSpPr>
-          <p:nvPr>
-            <p:ph type="sldNum" sz="quarter" idx="12"/>
-          </p:nvPr>
-        </p:nvSpPr>
-        <p:spPr/>
-        <p:txBody>
-          <a:bodyPr/>
-          <a:lstStyle/>
-          <a:p>
-            <a:fld id="{3A98EE3D-8CD1-4C3F-BD1C-C98C9596463C}" type="slidenum">
-              <a:rPr lang="en-US" smtClean="0"/>
-              <a:t>19</a:t>
-            </a:fld>
-            <a:endParaRPr lang="en-US" dirty="0"/>
-          </a:p>
-        </p:txBody>
-      </p:sp>
-    </p:spTree>
-    <p:extLst>
-      <p:ext uri="{BB962C8B-B14F-4D97-AF65-F5344CB8AC3E}">
-        <p14:creationId xmlns:p14="http://schemas.microsoft.com/office/powerpoint/2010/main" val="2440722974"/>
-      </p:ext>
-    </p:extLst>
-  </p:cSld>
-  <p:clrMapOvr>
-    <a:masterClrMapping/>
-  </p:clrMapOvr>
-</p:sld>
-</file>
-
 <file path=ppt/slides/slide2.xml><?xml version="1.0" encoding="utf-8"?>
 <p:sld xmlns:a="http://schemas.openxmlformats.org/drawingml/2006/main" xmlns:r="http://schemas.openxmlformats.org/officeDocument/2006/relationships" xmlns:p="http://schemas.openxmlformats.org/presentationml/2006/main">
   <p:cSld>
@@ -8982,1667 +8493,6 @@
     <p:extLst>
       <p:ext uri="{BB962C8B-B14F-4D97-AF65-F5344CB8AC3E}">
         <p14:creationId xmlns:p14="http://schemas.microsoft.com/office/powerpoint/2010/main" val="1628682045"/>
-      </p:ext>
-    </p:extLst>
-  </p:cSld>
-  <p:clrMapOvr>
-    <a:masterClrMapping/>
-  </p:clrMapOvr>
-</p:sld>
-</file>
-
-<file path=ppt/slides/slide20.xml><?xml version="1.0" encoding="utf-8"?>
-<p:sld xmlns:a="http://schemas.openxmlformats.org/drawingml/2006/main" xmlns:r="http://schemas.openxmlformats.org/officeDocument/2006/relationships" xmlns:p="http://schemas.openxmlformats.org/presentationml/2006/main">
-  <p:cSld>
-    <p:spTree>
-      <p:nvGrpSpPr>
-        <p:cNvPr id="1" name=""/>
-        <p:cNvGrpSpPr/>
-        <p:nvPr/>
-      </p:nvGrpSpPr>
-      <p:grpSpPr>
-        <a:xfrm>
-          <a:off x="0" y="0"/>
-          <a:ext cx="0" cy="0"/>
-          <a:chOff x="0" y="0"/>
-          <a:chExt cx="0" cy="0"/>
-        </a:xfrm>
-      </p:grpSpPr>
-      <p:sp>
-        <p:nvSpPr>
-          <p:cNvPr id="2" name="Title 1">
-            <a:extLst>
-              <a:ext uri="{FF2B5EF4-FFF2-40B4-BE49-F238E27FC236}">
-                <a16:creationId xmlns:a16="http://schemas.microsoft.com/office/drawing/2014/main" id="{C31C6DA0-6B26-4036-9CCA-A4B324B62A37}"/>
-              </a:ext>
-            </a:extLst>
-          </p:cNvPr>
-          <p:cNvSpPr>
-            <a:spLocks noGrp="1"/>
-          </p:cNvSpPr>
-          <p:nvPr>
-            <p:ph type="title"/>
-          </p:nvPr>
-        </p:nvSpPr>
-        <p:spPr/>
-        <p:txBody>
-          <a:bodyPr/>
-          <a:lstStyle/>
-          <a:p>
-            <a:r>
-              <a:rPr lang="en-US" dirty="0"/>
-              <a:t>Demo</a:t>
-            </a:r>
-          </a:p>
-        </p:txBody>
-      </p:sp>
-      <p:sp>
-        <p:nvSpPr>
-          <p:cNvPr id="3" name="Content Placeholder 2">
-            <a:extLst>
-              <a:ext uri="{FF2B5EF4-FFF2-40B4-BE49-F238E27FC236}">
-                <a16:creationId xmlns:a16="http://schemas.microsoft.com/office/drawing/2014/main" id="{ECFA01C4-6426-4B10-8827-8F344A43252C}"/>
-              </a:ext>
-            </a:extLst>
-          </p:cNvPr>
-          <p:cNvSpPr>
-            <a:spLocks noGrp="1"/>
-          </p:cNvSpPr>
-          <p:nvPr>
-            <p:ph idx="1"/>
-          </p:nvPr>
-        </p:nvSpPr>
-        <p:spPr/>
-        <p:txBody>
-          <a:bodyPr/>
-          <a:lstStyle/>
-          <a:p>
-            <a:r>
-              <a:rPr lang="en-US" dirty="0"/>
-              <a:t>Application errors</a:t>
-            </a:r>
-          </a:p>
-          <a:p>
-            <a:pPr lvl="1"/>
-            <a:r>
-              <a:rPr lang="en-US" sz="1800" dirty="0" err="1">
-                <a:latin typeface="Consolas" panose="020B0609020204030204" pitchFamily="49" charset="0"/>
-              </a:rPr>
-              <a:t>HttpExceptions</a:t>
-            </a:r>
-            <a:endParaRPr lang="en-US" sz="1800" dirty="0">
-              <a:latin typeface="Consolas" panose="020B0609020204030204" pitchFamily="49" charset="0"/>
-            </a:endParaRPr>
-          </a:p>
-          <a:p>
-            <a:pPr lvl="2"/>
-            <a:r>
-              <a:rPr lang="en-US" dirty="0">
-                <a:latin typeface="Consolas" panose="020B0609020204030204" pitchFamily="49" charset="0"/>
-              </a:rPr>
-              <a:t>throw new </a:t>
-            </a:r>
-            <a:r>
-              <a:rPr lang="en-US" dirty="0" err="1">
-                <a:latin typeface="Consolas" panose="020B0609020204030204" pitchFamily="49" charset="0"/>
-              </a:rPr>
-              <a:t>HttpException</a:t>
-            </a:r>
-            <a:r>
-              <a:rPr lang="en-US" dirty="0">
-                <a:latin typeface="Consolas" panose="020B0609020204030204" pitchFamily="49" charset="0"/>
-              </a:rPr>
-              <a:t>(‘your message’, </a:t>
-            </a:r>
-            <a:r>
-              <a:rPr lang="en-US" dirty="0" err="1">
-                <a:latin typeface="Consolas" panose="020B0609020204030204" pitchFamily="49" charset="0"/>
-              </a:rPr>
-              <a:t>HttpStatus.NOT_FOUND</a:t>
-            </a:r>
-            <a:r>
-              <a:rPr lang="en-US" dirty="0">
-                <a:latin typeface="Consolas" panose="020B0609020204030204" pitchFamily="49" charset="0"/>
-              </a:rPr>
-              <a:t>);</a:t>
-            </a:r>
-          </a:p>
-          <a:p>
-            <a:pPr lvl="1"/>
-            <a:r>
-              <a:rPr lang="en-US" dirty="0"/>
-              <a:t>Helper classes:</a:t>
-            </a:r>
-          </a:p>
-          <a:p>
-            <a:pPr lvl="2"/>
-            <a:r>
-              <a:rPr lang="en-US" dirty="0" err="1">
-                <a:latin typeface="Consolas" panose="020B0609020204030204" pitchFamily="49" charset="0"/>
-              </a:rPr>
-              <a:t>NotFoundException</a:t>
-            </a:r>
-            <a:endParaRPr lang="en-US" dirty="0">
-              <a:latin typeface="Consolas" panose="020B0609020204030204" pitchFamily="49" charset="0"/>
-            </a:endParaRPr>
-          </a:p>
-          <a:p>
-            <a:pPr lvl="1"/>
-            <a:r>
-              <a:rPr lang="en-US" dirty="0"/>
-              <a:t>How about unhandled exception (like divide by zero?)</a:t>
-            </a:r>
-          </a:p>
-          <a:p>
-            <a:pPr lvl="2"/>
-            <a:r>
-              <a:rPr lang="en-US" dirty="0"/>
-              <a:t>It’s so useful</a:t>
-            </a:r>
-          </a:p>
-        </p:txBody>
-      </p:sp>
-      <p:sp>
-        <p:nvSpPr>
-          <p:cNvPr id="4" name="Footer Placeholder 3">
-            <a:extLst>
-              <a:ext uri="{FF2B5EF4-FFF2-40B4-BE49-F238E27FC236}">
-                <a16:creationId xmlns:a16="http://schemas.microsoft.com/office/drawing/2014/main" id="{301C97C4-30E5-4117-93A7-335DA92D39CB}"/>
-              </a:ext>
-            </a:extLst>
-          </p:cNvPr>
-          <p:cNvSpPr>
-            <a:spLocks noGrp="1"/>
-          </p:cNvSpPr>
-          <p:nvPr>
-            <p:ph type="ftr" sz="quarter" idx="11"/>
-          </p:nvPr>
-        </p:nvSpPr>
-        <p:spPr/>
-        <p:txBody>
-          <a:bodyPr/>
-          <a:lstStyle/>
-          <a:p>
-            <a:r>
-              <a:rPr lang="en-US"/>
-              <a:t>Nodejs Basics</a:t>
-            </a:r>
-            <a:endParaRPr lang="en-US" dirty="0"/>
-          </a:p>
-        </p:txBody>
-      </p:sp>
-      <p:sp>
-        <p:nvSpPr>
-          <p:cNvPr id="5" name="Slide Number Placeholder 4">
-            <a:extLst>
-              <a:ext uri="{FF2B5EF4-FFF2-40B4-BE49-F238E27FC236}">
-                <a16:creationId xmlns:a16="http://schemas.microsoft.com/office/drawing/2014/main" id="{189E45A0-98A6-4BBA-89FE-43189249B28E}"/>
-              </a:ext>
-            </a:extLst>
-          </p:cNvPr>
-          <p:cNvSpPr>
-            <a:spLocks noGrp="1"/>
-          </p:cNvSpPr>
-          <p:nvPr>
-            <p:ph type="sldNum" sz="quarter" idx="12"/>
-          </p:nvPr>
-        </p:nvSpPr>
-        <p:spPr/>
-        <p:txBody>
-          <a:bodyPr/>
-          <a:lstStyle/>
-          <a:p>
-            <a:fld id="{3A98EE3D-8CD1-4C3F-BD1C-C98C9596463C}" type="slidenum">
-              <a:rPr lang="en-US" smtClean="0"/>
-              <a:t>20</a:t>
-            </a:fld>
-            <a:endParaRPr lang="en-US" dirty="0"/>
-          </a:p>
-        </p:txBody>
-      </p:sp>
-    </p:spTree>
-    <p:extLst>
-      <p:ext uri="{BB962C8B-B14F-4D97-AF65-F5344CB8AC3E}">
-        <p14:creationId xmlns:p14="http://schemas.microsoft.com/office/powerpoint/2010/main" val="952088768"/>
-      </p:ext>
-    </p:extLst>
-  </p:cSld>
-  <p:clrMapOvr>
-    <a:masterClrMapping/>
-  </p:clrMapOvr>
-</p:sld>
-</file>
-
-<file path=ppt/slides/slide21.xml><?xml version="1.0" encoding="utf-8"?>
-<p:sld xmlns:a="http://schemas.openxmlformats.org/drawingml/2006/main" xmlns:r="http://schemas.openxmlformats.org/officeDocument/2006/relationships" xmlns:p="http://schemas.openxmlformats.org/presentationml/2006/main">
-  <p:cSld>
-    <p:spTree>
-      <p:nvGrpSpPr>
-        <p:cNvPr id="1" name=""/>
-        <p:cNvGrpSpPr/>
-        <p:nvPr/>
-      </p:nvGrpSpPr>
-      <p:grpSpPr>
-        <a:xfrm>
-          <a:off x="0" y="0"/>
-          <a:ext cx="0" cy="0"/>
-          <a:chOff x="0" y="0"/>
-          <a:chExt cx="0" cy="0"/>
-        </a:xfrm>
-      </p:grpSpPr>
-      <p:sp>
-        <p:nvSpPr>
-          <p:cNvPr id="2" name="Title 1">
-            <a:extLst>
-              <a:ext uri="{FF2B5EF4-FFF2-40B4-BE49-F238E27FC236}">
-                <a16:creationId xmlns:a16="http://schemas.microsoft.com/office/drawing/2014/main" id="{C405FEE0-0155-421D-B618-B3915D540F08}"/>
-              </a:ext>
-            </a:extLst>
-          </p:cNvPr>
-          <p:cNvSpPr>
-            <a:spLocks noGrp="1"/>
-          </p:cNvSpPr>
-          <p:nvPr>
-            <p:ph type="title"/>
-          </p:nvPr>
-        </p:nvSpPr>
-        <p:spPr/>
-        <p:txBody>
-          <a:bodyPr/>
-          <a:lstStyle/>
-          <a:p>
-            <a:r>
-              <a:rPr lang="en-US" dirty="0"/>
-              <a:t>Demo</a:t>
-            </a:r>
-          </a:p>
-        </p:txBody>
-      </p:sp>
-      <p:sp>
-        <p:nvSpPr>
-          <p:cNvPr id="3" name="Content Placeholder 2">
-            <a:extLst>
-              <a:ext uri="{FF2B5EF4-FFF2-40B4-BE49-F238E27FC236}">
-                <a16:creationId xmlns:a16="http://schemas.microsoft.com/office/drawing/2014/main" id="{E9934E6D-EEAD-4EE3-B581-0A17AD2B00E0}"/>
-              </a:ext>
-            </a:extLst>
-          </p:cNvPr>
-          <p:cNvSpPr>
-            <a:spLocks noGrp="1"/>
-          </p:cNvSpPr>
-          <p:nvPr>
-            <p:ph idx="1"/>
-          </p:nvPr>
-        </p:nvSpPr>
-        <p:spPr/>
-        <p:txBody>
-          <a:bodyPr>
-            <a:normAutofit fontScale="92500" lnSpcReduction="10000"/>
-          </a:bodyPr>
-          <a:lstStyle/>
-          <a:p>
-            <a:r>
-              <a:rPr lang="en-US" dirty="0"/>
-              <a:t>Group our business parts of our application inside modules</a:t>
-            </a:r>
-          </a:p>
-          <a:p>
-            <a:pPr lvl="1"/>
-            <a:r>
-              <a:rPr lang="en-US" sz="1900" dirty="0">
-                <a:latin typeface="Consolas" panose="020B0609020204030204" pitchFamily="49" charset="0"/>
-              </a:rPr>
-              <a:t>nest generate module &lt;name&gt;</a:t>
-            </a:r>
-          </a:p>
-          <a:p>
-            <a:pPr lvl="1"/>
-            <a:r>
-              <a:rPr lang="en-US" dirty="0"/>
-              <a:t>Nest will add it inside the closest module (import)</a:t>
-            </a:r>
-          </a:p>
-          <a:p>
-            <a:pPr lvl="1"/>
-            <a:r>
-              <a:rPr lang="en-US" sz="1900" dirty="0">
-                <a:latin typeface="Consolas" panose="020B0609020204030204" pitchFamily="49" charset="0"/>
-              </a:rPr>
-              <a:t>@Module</a:t>
-            </a:r>
-          </a:p>
-          <a:p>
-            <a:pPr lvl="2"/>
-            <a:r>
-              <a:rPr lang="en-US" sz="1900" dirty="0">
-                <a:latin typeface="Consolas" panose="020B0609020204030204" pitchFamily="49" charset="0"/>
-              </a:rPr>
-              <a:t>controllers</a:t>
-            </a:r>
-          </a:p>
-          <a:p>
-            <a:pPr lvl="3"/>
-            <a:r>
-              <a:rPr lang="en-US" dirty="0"/>
-              <a:t>routes</a:t>
-            </a:r>
-          </a:p>
-          <a:p>
-            <a:pPr lvl="2"/>
-            <a:r>
-              <a:rPr lang="en-US" sz="1900" dirty="0">
-                <a:latin typeface="Consolas" panose="020B0609020204030204" pitchFamily="49" charset="0"/>
-              </a:rPr>
-              <a:t>exports</a:t>
-            </a:r>
-          </a:p>
-          <a:p>
-            <a:pPr lvl="3"/>
-            <a:r>
-              <a:rPr lang="en-US" dirty="0"/>
-              <a:t>Available for other modules</a:t>
-            </a:r>
-          </a:p>
-          <a:p>
-            <a:pPr lvl="2"/>
-            <a:r>
-              <a:rPr lang="en-US" sz="1900" dirty="0">
-                <a:latin typeface="Consolas" panose="020B0609020204030204" pitchFamily="49" charset="0"/>
-              </a:rPr>
-              <a:t>Imports</a:t>
-            </a:r>
-          </a:p>
-          <a:p>
-            <a:pPr lvl="3"/>
-            <a:r>
-              <a:rPr lang="en-US" dirty="0"/>
-              <a:t>Other modules that this module required</a:t>
-            </a:r>
-          </a:p>
-          <a:p>
-            <a:pPr lvl="2"/>
-            <a:r>
-              <a:rPr lang="en-US" sz="1900" dirty="0">
-                <a:latin typeface="Consolas" panose="020B0609020204030204" pitchFamily="49" charset="0"/>
-              </a:rPr>
-              <a:t>Providers</a:t>
-            </a:r>
-          </a:p>
-          <a:p>
-            <a:pPr lvl="3"/>
-            <a:r>
-              <a:rPr lang="en-US" dirty="0"/>
-              <a:t>Register our token for di container</a:t>
-            </a:r>
-          </a:p>
-          <a:p>
-            <a:pPr lvl="1"/>
-            <a:endParaRPr lang="en-US" dirty="0"/>
-          </a:p>
-        </p:txBody>
-      </p:sp>
-      <p:sp>
-        <p:nvSpPr>
-          <p:cNvPr id="4" name="Footer Placeholder 3">
-            <a:extLst>
-              <a:ext uri="{FF2B5EF4-FFF2-40B4-BE49-F238E27FC236}">
-                <a16:creationId xmlns:a16="http://schemas.microsoft.com/office/drawing/2014/main" id="{90A2EAA4-36C6-46AF-8002-84409241559F}"/>
-              </a:ext>
-            </a:extLst>
-          </p:cNvPr>
-          <p:cNvSpPr>
-            <a:spLocks noGrp="1"/>
-          </p:cNvSpPr>
-          <p:nvPr>
-            <p:ph type="ftr" sz="quarter" idx="11"/>
-          </p:nvPr>
-        </p:nvSpPr>
-        <p:spPr/>
-        <p:txBody>
-          <a:bodyPr/>
-          <a:lstStyle/>
-          <a:p>
-            <a:r>
-              <a:rPr lang="en-US"/>
-              <a:t>Nodejs Basics</a:t>
-            </a:r>
-            <a:endParaRPr lang="en-US" dirty="0"/>
-          </a:p>
-        </p:txBody>
-      </p:sp>
-      <p:sp>
-        <p:nvSpPr>
-          <p:cNvPr id="5" name="Slide Number Placeholder 4">
-            <a:extLst>
-              <a:ext uri="{FF2B5EF4-FFF2-40B4-BE49-F238E27FC236}">
-                <a16:creationId xmlns:a16="http://schemas.microsoft.com/office/drawing/2014/main" id="{81C83A64-8772-4BCE-826C-583E4820A285}"/>
-              </a:ext>
-            </a:extLst>
-          </p:cNvPr>
-          <p:cNvSpPr>
-            <a:spLocks noGrp="1"/>
-          </p:cNvSpPr>
-          <p:nvPr>
-            <p:ph type="sldNum" sz="quarter" idx="12"/>
-          </p:nvPr>
-        </p:nvSpPr>
-        <p:spPr/>
-        <p:txBody>
-          <a:bodyPr/>
-          <a:lstStyle/>
-          <a:p>
-            <a:fld id="{3A98EE3D-8CD1-4C3F-BD1C-C98C9596463C}" type="slidenum">
-              <a:rPr lang="en-US" smtClean="0"/>
-              <a:t>21</a:t>
-            </a:fld>
-            <a:endParaRPr lang="en-US" dirty="0"/>
-          </a:p>
-        </p:txBody>
-      </p:sp>
-    </p:spTree>
-    <p:extLst>
-      <p:ext uri="{BB962C8B-B14F-4D97-AF65-F5344CB8AC3E}">
-        <p14:creationId xmlns:p14="http://schemas.microsoft.com/office/powerpoint/2010/main" val="4034341068"/>
-      </p:ext>
-    </p:extLst>
-  </p:cSld>
-  <p:clrMapOvr>
-    <a:masterClrMapping/>
-  </p:clrMapOvr>
-</p:sld>
-</file>
-
-<file path=ppt/slides/slide22.xml><?xml version="1.0" encoding="utf-8"?>
-<p:sld xmlns:a="http://schemas.openxmlformats.org/drawingml/2006/main" xmlns:r="http://schemas.openxmlformats.org/officeDocument/2006/relationships" xmlns:p="http://schemas.openxmlformats.org/presentationml/2006/main">
-  <p:cSld>
-    <p:spTree>
-      <p:nvGrpSpPr>
-        <p:cNvPr id="1" name=""/>
-        <p:cNvGrpSpPr/>
-        <p:nvPr/>
-      </p:nvGrpSpPr>
-      <p:grpSpPr>
-        <a:xfrm>
-          <a:off x="0" y="0"/>
-          <a:ext cx="0" cy="0"/>
-          <a:chOff x="0" y="0"/>
-          <a:chExt cx="0" cy="0"/>
-        </a:xfrm>
-      </p:grpSpPr>
-      <p:sp>
-        <p:nvSpPr>
-          <p:cNvPr id="2" name="Title 1">
-            <a:extLst>
-              <a:ext uri="{FF2B5EF4-FFF2-40B4-BE49-F238E27FC236}">
-                <a16:creationId xmlns:a16="http://schemas.microsoft.com/office/drawing/2014/main" id="{7D09EE00-5879-400E-8932-6F3362FE8C46}"/>
-              </a:ext>
-            </a:extLst>
-          </p:cNvPr>
-          <p:cNvSpPr>
-            <a:spLocks noGrp="1"/>
-          </p:cNvSpPr>
-          <p:nvPr>
-            <p:ph type="title"/>
-          </p:nvPr>
-        </p:nvSpPr>
-        <p:spPr/>
-        <p:txBody>
-          <a:bodyPr/>
-          <a:lstStyle/>
-          <a:p>
-            <a:r>
-              <a:rPr lang="en-US" dirty="0"/>
-              <a:t>Demo</a:t>
-            </a:r>
-          </a:p>
-        </p:txBody>
-      </p:sp>
-      <p:sp>
-        <p:nvSpPr>
-          <p:cNvPr id="3" name="Content Placeholder 2">
-            <a:extLst>
-              <a:ext uri="{FF2B5EF4-FFF2-40B4-BE49-F238E27FC236}">
-                <a16:creationId xmlns:a16="http://schemas.microsoft.com/office/drawing/2014/main" id="{E42FC247-65E1-4935-9474-6AA268C4A92E}"/>
-              </a:ext>
-            </a:extLst>
-          </p:cNvPr>
-          <p:cNvSpPr>
-            <a:spLocks noGrp="1"/>
-          </p:cNvSpPr>
-          <p:nvPr>
-            <p:ph idx="1"/>
-          </p:nvPr>
-        </p:nvSpPr>
-        <p:spPr/>
-        <p:txBody>
-          <a:bodyPr/>
-          <a:lstStyle/>
-          <a:p>
-            <a:r>
-              <a:rPr lang="en-US" dirty="0"/>
-              <a:t>DTOs</a:t>
-            </a:r>
-          </a:p>
-          <a:p>
-            <a:pPr lvl="1"/>
-            <a:r>
-              <a:rPr lang="en-US" dirty="0"/>
-              <a:t>Define interfaces for our input and outputs</a:t>
-            </a:r>
-          </a:p>
-          <a:p>
-            <a:pPr lvl="1"/>
-            <a:r>
-              <a:rPr lang="en-US" dirty="0"/>
-              <a:t>They are simply classes</a:t>
-            </a:r>
-          </a:p>
-          <a:p>
-            <a:pPr lvl="1"/>
-            <a:r>
-              <a:rPr lang="en-US" dirty="0">
-                <a:latin typeface="Consolas" panose="020B0609020204030204" pitchFamily="49" charset="0"/>
-              </a:rPr>
-              <a:t>nest g class &lt;path&gt;</a:t>
-            </a:r>
-          </a:p>
-          <a:p>
-            <a:pPr lvl="2"/>
-            <a:r>
-              <a:rPr lang="en-US" sz="2100" dirty="0">
-                <a:latin typeface="Consolas" panose="020B0609020204030204" pitchFamily="49" charset="0"/>
-              </a:rPr>
-              <a:t>--no-spec</a:t>
-            </a:r>
-          </a:p>
-          <a:p>
-            <a:pPr lvl="2"/>
-            <a:r>
-              <a:rPr lang="en-US" dirty="0"/>
-              <a:t>Remember to add .</a:t>
-            </a:r>
-            <a:r>
-              <a:rPr lang="en-US" dirty="0" err="1"/>
-              <a:t>dto</a:t>
-            </a:r>
-            <a:r>
-              <a:rPr lang="en-US" dirty="0"/>
-              <a:t> extension</a:t>
-            </a:r>
-          </a:p>
-        </p:txBody>
-      </p:sp>
-      <p:sp>
-        <p:nvSpPr>
-          <p:cNvPr id="4" name="Footer Placeholder 3">
-            <a:extLst>
-              <a:ext uri="{FF2B5EF4-FFF2-40B4-BE49-F238E27FC236}">
-                <a16:creationId xmlns:a16="http://schemas.microsoft.com/office/drawing/2014/main" id="{37402953-79B9-4785-94DF-36E43BCC925A}"/>
-              </a:ext>
-            </a:extLst>
-          </p:cNvPr>
-          <p:cNvSpPr>
-            <a:spLocks noGrp="1"/>
-          </p:cNvSpPr>
-          <p:nvPr>
-            <p:ph type="ftr" sz="quarter" idx="11"/>
-          </p:nvPr>
-        </p:nvSpPr>
-        <p:spPr/>
-        <p:txBody>
-          <a:bodyPr/>
-          <a:lstStyle/>
-          <a:p>
-            <a:r>
-              <a:rPr lang="en-US"/>
-              <a:t>Nodejs Basics</a:t>
-            </a:r>
-            <a:endParaRPr lang="en-US" dirty="0"/>
-          </a:p>
-        </p:txBody>
-      </p:sp>
-      <p:sp>
-        <p:nvSpPr>
-          <p:cNvPr id="5" name="Slide Number Placeholder 4">
-            <a:extLst>
-              <a:ext uri="{FF2B5EF4-FFF2-40B4-BE49-F238E27FC236}">
-                <a16:creationId xmlns:a16="http://schemas.microsoft.com/office/drawing/2014/main" id="{CB29DE84-BE67-4AE5-B141-809685F03695}"/>
-              </a:ext>
-            </a:extLst>
-          </p:cNvPr>
-          <p:cNvSpPr>
-            <a:spLocks noGrp="1"/>
-          </p:cNvSpPr>
-          <p:nvPr>
-            <p:ph type="sldNum" sz="quarter" idx="12"/>
-          </p:nvPr>
-        </p:nvSpPr>
-        <p:spPr/>
-        <p:txBody>
-          <a:bodyPr/>
-          <a:lstStyle/>
-          <a:p>
-            <a:fld id="{3A98EE3D-8CD1-4C3F-BD1C-C98C9596463C}" type="slidenum">
-              <a:rPr lang="en-US" smtClean="0"/>
-              <a:t>22</a:t>
-            </a:fld>
-            <a:endParaRPr lang="en-US" dirty="0"/>
-          </a:p>
-        </p:txBody>
-      </p:sp>
-    </p:spTree>
-    <p:extLst>
-      <p:ext uri="{BB962C8B-B14F-4D97-AF65-F5344CB8AC3E}">
-        <p14:creationId xmlns:p14="http://schemas.microsoft.com/office/powerpoint/2010/main" val="1952706763"/>
-      </p:ext>
-    </p:extLst>
-  </p:cSld>
-  <p:clrMapOvr>
-    <a:masterClrMapping/>
-  </p:clrMapOvr>
-</p:sld>
-</file>
-
-<file path=ppt/slides/slide23.xml><?xml version="1.0" encoding="utf-8"?>
-<p:sld xmlns:a="http://schemas.openxmlformats.org/drawingml/2006/main" xmlns:r="http://schemas.openxmlformats.org/officeDocument/2006/relationships" xmlns:p="http://schemas.openxmlformats.org/presentationml/2006/main">
-  <p:cSld>
-    <p:spTree>
-      <p:nvGrpSpPr>
-        <p:cNvPr id="1" name=""/>
-        <p:cNvGrpSpPr/>
-        <p:nvPr/>
-      </p:nvGrpSpPr>
-      <p:grpSpPr>
-        <a:xfrm>
-          <a:off x="0" y="0"/>
-          <a:ext cx="0" cy="0"/>
-          <a:chOff x="0" y="0"/>
-          <a:chExt cx="0" cy="0"/>
-        </a:xfrm>
-      </p:grpSpPr>
-      <p:sp>
-        <p:nvSpPr>
-          <p:cNvPr id="2" name="Title 1">
-            <a:extLst>
-              <a:ext uri="{FF2B5EF4-FFF2-40B4-BE49-F238E27FC236}">
-                <a16:creationId xmlns:a16="http://schemas.microsoft.com/office/drawing/2014/main" id="{43114C8B-F053-42BA-BE54-D5F7503E0BE8}"/>
-              </a:ext>
-            </a:extLst>
-          </p:cNvPr>
-          <p:cNvSpPr>
-            <a:spLocks noGrp="1"/>
-          </p:cNvSpPr>
-          <p:nvPr>
-            <p:ph type="title"/>
-          </p:nvPr>
-        </p:nvSpPr>
-        <p:spPr/>
-        <p:txBody>
-          <a:bodyPr/>
-          <a:lstStyle/>
-          <a:p>
-            <a:r>
-              <a:rPr lang="en-US" dirty="0"/>
-              <a:t>Demo</a:t>
-            </a:r>
-          </a:p>
-        </p:txBody>
-      </p:sp>
-      <p:sp>
-        <p:nvSpPr>
-          <p:cNvPr id="3" name="Content Placeholder 2">
-            <a:extLst>
-              <a:ext uri="{FF2B5EF4-FFF2-40B4-BE49-F238E27FC236}">
-                <a16:creationId xmlns:a16="http://schemas.microsoft.com/office/drawing/2014/main" id="{D3DB6E9E-12A5-403D-9514-0AF1025D193A}"/>
-              </a:ext>
-            </a:extLst>
-          </p:cNvPr>
-          <p:cNvSpPr>
-            <a:spLocks noGrp="1"/>
-          </p:cNvSpPr>
-          <p:nvPr>
-            <p:ph idx="1"/>
-          </p:nvPr>
-        </p:nvSpPr>
-        <p:spPr/>
-        <p:txBody>
-          <a:bodyPr/>
-          <a:lstStyle/>
-          <a:p>
-            <a:r>
-              <a:rPr lang="en-US" dirty="0"/>
-              <a:t>Validating input data with DTOs</a:t>
-            </a:r>
-          </a:p>
-          <a:p>
-            <a:pPr lvl="1"/>
-            <a:r>
-              <a:rPr lang="en-US" dirty="0"/>
-              <a:t>Validation pipes</a:t>
-            </a:r>
-          </a:p>
-          <a:p>
-            <a:pPr lvl="1"/>
-            <a:r>
-              <a:rPr lang="en-US" dirty="0" err="1">
-                <a:latin typeface="Consolas" panose="020B0609020204030204" pitchFamily="49" charset="0"/>
-              </a:rPr>
-              <a:t>main.ts</a:t>
-            </a:r>
-            <a:endParaRPr lang="en-US" dirty="0">
-              <a:latin typeface="Consolas" panose="020B0609020204030204" pitchFamily="49" charset="0"/>
-            </a:endParaRPr>
-          </a:p>
-          <a:p>
-            <a:pPr lvl="2"/>
-            <a:r>
-              <a:rPr lang="en-US" sz="2100" dirty="0" err="1">
-                <a:latin typeface="Consolas" panose="020B0609020204030204" pitchFamily="49" charset="0"/>
-              </a:rPr>
-              <a:t>app.useGlobalPipes</a:t>
-            </a:r>
-            <a:r>
-              <a:rPr lang="en-US" sz="2100" dirty="0">
-                <a:latin typeface="Consolas" panose="020B0609020204030204" pitchFamily="49" charset="0"/>
-              </a:rPr>
-              <a:t>(new </a:t>
-            </a:r>
-            <a:r>
-              <a:rPr lang="en-US" sz="2100" dirty="0" err="1">
-                <a:latin typeface="Consolas" panose="020B0609020204030204" pitchFamily="49" charset="0"/>
-              </a:rPr>
-              <a:t>ValidationPipe</a:t>
-            </a:r>
-            <a:r>
-              <a:rPr lang="en-US" sz="2100" dirty="0">
-                <a:latin typeface="Consolas" panose="020B0609020204030204" pitchFamily="49" charset="0"/>
-              </a:rPr>
-              <a:t>());</a:t>
-            </a:r>
-          </a:p>
-          <a:p>
-            <a:pPr lvl="1"/>
-            <a:r>
-              <a:rPr lang="en-US" dirty="0" err="1">
-                <a:latin typeface="Consolas" panose="020B0609020204030204" pitchFamily="49" charset="0"/>
-              </a:rPr>
-              <a:t>npm</a:t>
-            </a:r>
-            <a:r>
-              <a:rPr lang="en-US" dirty="0">
-                <a:latin typeface="Consolas" panose="020B0609020204030204" pitchFamily="49" charset="0"/>
-              </a:rPr>
-              <a:t> install class-validator class-transformer</a:t>
-            </a:r>
-          </a:p>
-          <a:p>
-            <a:pPr lvl="1"/>
-            <a:r>
-              <a:rPr lang="en-US" dirty="0">
-                <a:latin typeface="Consolas" panose="020B0609020204030204" pitchFamily="49" charset="0"/>
-              </a:rPr>
-              <a:t>@IsString</a:t>
-            </a:r>
-          </a:p>
-          <a:p>
-            <a:pPr lvl="2"/>
-            <a:r>
-              <a:rPr lang="en-US" sz="2100" dirty="0">
-                <a:latin typeface="Consolas" panose="020B0609020204030204" pitchFamily="49" charset="0"/>
-              </a:rPr>
-              <a:t>class-validator</a:t>
-            </a:r>
-          </a:p>
-          <a:p>
-            <a:pPr lvl="2"/>
-            <a:r>
-              <a:rPr lang="en-US" sz="2100" dirty="0">
-                <a:latin typeface="Consolas" panose="020B0609020204030204" pitchFamily="49" charset="0"/>
-              </a:rPr>
-              <a:t>each: true</a:t>
-            </a:r>
-          </a:p>
-          <a:p>
-            <a:pPr lvl="1"/>
-            <a:r>
-              <a:rPr lang="en-US" dirty="0"/>
-              <a:t>Automatically throw bad request exception </a:t>
-            </a:r>
-          </a:p>
-          <a:p>
-            <a:pPr lvl="1"/>
-            <a:endParaRPr lang="en-US" dirty="0"/>
-          </a:p>
-        </p:txBody>
-      </p:sp>
-      <p:sp>
-        <p:nvSpPr>
-          <p:cNvPr id="4" name="Footer Placeholder 3">
-            <a:extLst>
-              <a:ext uri="{FF2B5EF4-FFF2-40B4-BE49-F238E27FC236}">
-                <a16:creationId xmlns:a16="http://schemas.microsoft.com/office/drawing/2014/main" id="{84A2B1E1-22CE-49A8-A097-C445AB8656E9}"/>
-              </a:ext>
-            </a:extLst>
-          </p:cNvPr>
-          <p:cNvSpPr>
-            <a:spLocks noGrp="1"/>
-          </p:cNvSpPr>
-          <p:nvPr>
-            <p:ph type="ftr" sz="quarter" idx="11"/>
-          </p:nvPr>
-        </p:nvSpPr>
-        <p:spPr/>
-        <p:txBody>
-          <a:bodyPr/>
-          <a:lstStyle/>
-          <a:p>
-            <a:r>
-              <a:rPr lang="en-US"/>
-              <a:t>Nodejs Basics</a:t>
-            </a:r>
-            <a:endParaRPr lang="en-US" dirty="0"/>
-          </a:p>
-        </p:txBody>
-      </p:sp>
-      <p:sp>
-        <p:nvSpPr>
-          <p:cNvPr id="5" name="Slide Number Placeholder 4">
-            <a:extLst>
-              <a:ext uri="{FF2B5EF4-FFF2-40B4-BE49-F238E27FC236}">
-                <a16:creationId xmlns:a16="http://schemas.microsoft.com/office/drawing/2014/main" id="{EA2658C2-4437-4F05-B372-B6058E43C7F9}"/>
-              </a:ext>
-            </a:extLst>
-          </p:cNvPr>
-          <p:cNvSpPr>
-            <a:spLocks noGrp="1"/>
-          </p:cNvSpPr>
-          <p:nvPr>
-            <p:ph type="sldNum" sz="quarter" idx="12"/>
-          </p:nvPr>
-        </p:nvSpPr>
-        <p:spPr/>
-        <p:txBody>
-          <a:bodyPr/>
-          <a:lstStyle/>
-          <a:p>
-            <a:fld id="{3A98EE3D-8CD1-4C3F-BD1C-C98C9596463C}" type="slidenum">
-              <a:rPr lang="en-US" smtClean="0"/>
-              <a:t>23</a:t>
-            </a:fld>
-            <a:endParaRPr lang="en-US" dirty="0"/>
-          </a:p>
-        </p:txBody>
-      </p:sp>
-    </p:spTree>
-    <p:extLst>
-      <p:ext uri="{BB962C8B-B14F-4D97-AF65-F5344CB8AC3E}">
-        <p14:creationId xmlns:p14="http://schemas.microsoft.com/office/powerpoint/2010/main" val="3771157013"/>
-      </p:ext>
-    </p:extLst>
-  </p:cSld>
-  <p:clrMapOvr>
-    <a:masterClrMapping/>
-  </p:clrMapOvr>
-</p:sld>
-</file>
-
-<file path=ppt/slides/slide24.xml><?xml version="1.0" encoding="utf-8"?>
-<p:sld xmlns:a="http://schemas.openxmlformats.org/drawingml/2006/main" xmlns:r="http://schemas.openxmlformats.org/officeDocument/2006/relationships" xmlns:p="http://schemas.openxmlformats.org/presentationml/2006/main">
-  <p:cSld>
-    <p:spTree>
-      <p:nvGrpSpPr>
-        <p:cNvPr id="1" name=""/>
-        <p:cNvGrpSpPr/>
-        <p:nvPr/>
-      </p:nvGrpSpPr>
-      <p:grpSpPr>
-        <a:xfrm>
-          <a:off x="0" y="0"/>
-          <a:ext cx="0" cy="0"/>
-          <a:chOff x="0" y="0"/>
-          <a:chExt cx="0" cy="0"/>
-        </a:xfrm>
-      </p:grpSpPr>
-      <p:sp>
-        <p:nvSpPr>
-          <p:cNvPr id="2" name="Title 1">
-            <a:extLst>
-              <a:ext uri="{FF2B5EF4-FFF2-40B4-BE49-F238E27FC236}">
-                <a16:creationId xmlns:a16="http://schemas.microsoft.com/office/drawing/2014/main" id="{D2E85F1B-B7C2-4467-81CD-7B4BFEC9DF62}"/>
-              </a:ext>
-            </a:extLst>
-          </p:cNvPr>
-          <p:cNvSpPr>
-            <a:spLocks noGrp="1"/>
-          </p:cNvSpPr>
-          <p:nvPr>
-            <p:ph type="title"/>
-          </p:nvPr>
-        </p:nvSpPr>
-        <p:spPr/>
-        <p:txBody>
-          <a:bodyPr/>
-          <a:lstStyle/>
-          <a:p>
-            <a:endParaRPr lang="en-US"/>
-          </a:p>
-        </p:txBody>
-      </p:sp>
-      <p:sp>
-        <p:nvSpPr>
-          <p:cNvPr id="3" name="Content Placeholder 2">
-            <a:extLst>
-              <a:ext uri="{FF2B5EF4-FFF2-40B4-BE49-F238E27FC236}">
-                <a16:creationId xmlns:a16="http://schemas.microsoft.com/office/drawing/2014/main" id="{23FDC552-A847-4F62-9ADE-EADE55B678F5}"/>
-              </a:ext>
-            </a:extLst>
-          </p:cNvPr>
-          <p:cNvSpPr>
-            <a:spLocks noGrp="1"/>
-          </p:cNvSpPr>
-          <p:nvPr>
-            <p:ph idx="1"/>
-          </p:nvPr>
-        </p:nvSpPr>
-        <p:spPr/>
-        <p:txBody>
-          <a:bodyPr/>
-          <a:lstStyle/>
-          <a:p>
-            <a:r>
-              <a:rPr lang="en-US" dirty="0"/>
-              <a:t>Transforming</a:t>
-            </a:r>
-          </a:p>
-          <a:p>
-            <a:pPr lvl="1"/>
-            <a:r>
-              <a:rPr lang="en-US" dirty="0" err="1">
-                <a:latin typeface="Consolas" panose="020B0609020204030204" pitchFamily="49" charset="0"/>
-              </a:rPr>
-              <a:t>npm</a:t>
-            </a:r>
-            <a:r>
-              <a:rPr lang="en-US" dirty="0">
-                <a:latin typeface="Consolas" panose="020B0609020204030204" pitchFamily="49" charset="0"/>
-              </a:rPr>
-              <a:t> install @nestjs/mapped-types</a:t>
-            </a:r>
-          </a:p>
-          <a:p>
-            <a:pPr lvl="1"/>
-            <a:r>
-              <a:rPr lang="en-US" dirty="0">
-                <a:latin typeface="Consolas" panose="020B0609020204030204" pitchFamily="49" charset="0"/>
-              </a:rPr>
-              <a:t>extends </a:t>
-            </a:r>
-            <a:r>
-              <a:rPr lang="en-US" dirty="0" err="1">
-                <a:latin typeface="Consolas" panose="020B0609020204030204" pitchFamily="49" charset="0"/>
-              </a:rPr>
-              <a:t>PartialType</a:t>
-            </a:r>
-            <a:r>
-              <a:rPr lang="en-US" dirty="0">
-                <a:latin typeface="Consolas" panose="020B0609020204030204" pitchFamily="49" charset="0"/>
-              </a:rPr>
-              <a:t>(class)</a:t>
-            </a:r>
-          </a:p>
-          <a:p>
-            <a:pPr lvl="2"/>
-            <a:r>
-              <a:rPr lang="en-US" dirty="0"/>
-              <a:t>With all validations</a:t>
-            </a:r>
-          </a:p>
-          <a:p>
-            <a:pPr lvl="2"/>
-            <a:endParaRPr lang="en-US" dirty="0"/>
-          </a:p>
-        </p:txBody>
-      </p:sp>
-      <p:sp>
-        <p:nvSpPr>
-          <p:cNvPr id="4" name="Footer Placeholder 3">
-            <a:extLst>
-              <a:ext uri="{FF2B5EF4-FFF2-40B4-BE49-F238E27FC236}">
-                <a16:creationId xmlns:a16="http://schemas.microsoft.com/office/drawing/2014/main" id="{33330AC0-DD5D-414B-B5F3-E5376E06E73A}"/>
-              </a:ext>
-            </a:extLst>
-          </p:cNvPr>
-          <p:cNvSpPr>
-            <a:spLocks noGrp="1"/>
-          </p:cNvSpPr>
-          <p:nvPr>
-            <p:ph type="ftr" sz="quarter" idx="11"/>
-          </p:nvPr>
-        </p:nvSpPr>
-        <p:spPr/>
-        <p:txBody>
-          <a:bodyPr/>
-          <a:lstStyle/>
-          <a:p>
-            <a:r>
-              <a:rPr lang="en-US"/>
-              <a:t>Nodejs Basics</a:t>
-            </a:r>
-            <a:endParaRPr lang="en-US" dirty="0"/>
-          </a:p>
-        </p:txBody>
-      </p:sp>
-      <p:sp>
-        <p:nvSpPr>
-          <p:cNvPr id="5" name="Slide Number Placeholder 4">
-            <a:extLst>
-              <a:ext uri="{FF2B5EF4-FFF2-40B4-BE49-F238E27FC236}">
-                <a16:creationId xmlns:a16="http://schemas.microsoft.com/office/drawing/2014/main" id="{9A595E8B-E7FD-492B-95FA-4F8FF232267B}"/>
-              </a:ext>
-            </a:extLst>
-          </p:cNvPr>
-          <p:cNvSpPr>
-            <a:spLocks noGrp="1"/>
-          </p:cNvSpPr>
-          <p:nvPr>
-            <p:ph type="sldNum" sz="quarter" idx="12"/>
-          </p:nvPr>
-        </p:nvSpPr>
-        <p:spPr/>
-        <p:txBody>
-          <a:bodyPr/>
-          <a:lstStyle/>
-          <a:p>
-            <a:fld id="{3A98EE3D-8CD1-4C3F-BD1C-C98C9596463C}" type="slidenum">
-              <a:rPr lang="en-US" smtClean="0"/>
-              <a:t>24</a:t>
-            </a:fld>
-            <a:endParaRPr lang="en-US" dirty="0"/>
-          </a:p>
-        </p:txBody>
-      </p:sp>
-    </p:spTree>
-    <p:extLst>
-      <p:ext uri="{BB962C8B-B14F-4D97-AF65-F5344CB8AC3E}">
-        <p14:creationId xmlns:p14="http://schemas.microsoft.com/office/powerpoint/2010/main" val="3512331457"/>
-      </p:ext>
-    </p:extLst>
-  </p:cSld>
-  <p:clrMapOvr>
-    <a:masterClrMapping/>
-  </p:clrMapOvr>
-</p:sld>
-</file>
-
-<file path=ppt/slides/slide25.xml><?xml version="1.0" encoding="utf-8"?>
-<p:sld xmlns:a="http://schemas.openxmlformats.org/drawingml/2006/main" xmlns:r="http://schemas.openxmlformats.org/officeDocument/2006/relationships" xmlns:p="http://schemas.openxmlformats.org/presentationml/2006/main">
-  <p:cSld>
-    <p:spTree>
-      <p:nvGrpSpPr>
-        <p:cNvPr id="1" name=""/>
-        <p:cNvGrpSpPr/>
-        <p:nvPr/>
-      </p:nvGrpSpPr>
-      <p:grpSpPr>
-        <a:xfrm>
-          <a:off x="0" y="0"/>
-          <a:ext cx="0" cy="0"/>
-          <a:chOff x="0" y="0"/>
-          <a:chExt cx="0" cy="0"/>
-        </a:xfrm>
-      </p:grpSpPr>
-      <p:sp>
-        <p:nvSpPr>
-          <p:cNvPr id="2" name="Title 1">
-            <a:extLst>
-              <a:ext uri="{FF2B5EF4-FFF2-40B4-BE49-F238E27FC236}">
-                <a16:creationId xmlns:a16="http://schemas.microsoft.com/office/drawing/2014/main" id="{A2212392-47D1-45BF-80D6-DF125188D6F7}"/>
-              </a:ext>
-            </a:extLst>
-          </p:cNvPr>
-          <p:cNvSpPr>
-            <a:spLocks noGrp="1"/>
-          </p:cNvSpPr>
-          <p:nvPr>
-            <p:ph type="title"/>
-          </p:nvPr>
-        </p:nvSpPr>
-        <p:spPr/>
-        <p:txBody>
-          <a:bodyPr/>
-          <a:lstStyle/>
-          <a:p>
-            <a:r>
-              <a:rPr lang="en-US" dirty="0"/>
-              <a:t>Demo</a:t>
-            </a:r>
-          </a:p>
-        </p:txBody>
-      </p:sp>
-      <p:sp>
-        <p:nvSpPr>
-          <p:cNvPr id="3" name="Content Placeholder 2">
-            <a:extLst>
-              <a:ext uri="{FF2B5EF4-FFF2-40B4-BE49-F238E27FC236}">
-                <a16:creationId xmlns:a16="http://schemas.microsoft.com/office/drawing/2014/main" id="{96FEF173-664E-45DD-AD11-D89B2DCF7601}"/>
-              </a:ext>
-            </a:extLst>
-          </p:cNvPr>
-          <p:cNvSpPr>
-            <a:spLocks noGrp="1"/>
-          </p:cNvSpPr>
-          <p:nvPr>
-            <p:ph idx="1"/>
-          </p:nvPr>
-        </p:nvSpPr>
-        <p:spPr/>
-        <p:txBody>
-          <a:bodyPr/>
-          <a:lstStyle/>
-          <a:p>
-            <a:r>
-              <a:rPr lang="en-US" dirty="0"/>
-              <a:t>What about Malicious </a:t>
-            </a:r>
-            <a:r>
-              <a:rPr lang="en-US" dirty="0" err="1"/>
-              <a:t>datas</a:t>
-            </a:r>
-            <a:r>
-              <a:rPr lang="en-US" dirty="0"/>
-              <a:t>?</a:t>
-            </a:r>
-          </a:p>
-          <a:p>
-            <a:pPr lvl="1"/>
-            <a:r>
-              <a:rPr lang="en-US" dirty="0">
-                <a:latin typeface="Consolas" panose="020B0609020204030204" pitchFamily="49" charset="0"/>
-              </a:rPr>
-              <a:t>whitelist: true</a:t>
-            </a:r>
-          </a:p>
-          <a:p>
-            <a:pPr lvl="2"/>
-            <a:r>
-              <a:rPr lang="en-US" dirty="0"/>
-              <a:t>Avoid users to pass unwanted data</a:t>
-            </a:r>
-          </a:p>
-          <a:p>
-            <a:pPr lvl="1"/>
-            <a:r>
-              <a:rPr lang="en-US" dirty="0" err="1">
-                <a:latin typeface="Consolas" panose="020B0609020204030204" pitchFamily="49" charset="0"/>
-              </a:rPr>
-              <a:t>forbidNonWhitelited</a:t>
-            </a:r>
-            <a:r>
-              <a:rPr lang="en-US" dirty="0">
-                <a:latin typeface="Consolas" panose="020B0609020204030204" pitchFamily="49" charset="0"/>
-              </a:rPr>
-              <a:t>: true</a:t>
-            </a:r>
-          </a:p>
-          <a:p>
-            <a:pPr lvl="2"/>
-            <a:r>
-              <a:rPr lang="en-US" dirty="0"/>
-              <a:t>Throw error (Bad Request)</a:t>
-            </a:r>
-          </a:p>
-          <a:p>
-            <a:pPr lvl="1"/>
-            <a:endParaRPr lang="en-US" dirty="0"/>
-          </a:p>
-        </p:txBody>
-      </p:sp>
-      <p:sp>
-        <p:nvSpPr>
-          <p:cNvPr id="4" name="Footer Placeholder 3">
-            <a:extLst>
-              <a:ext uri="{FF2B5EF4-FFF2-40B4-BE49-F238E27FC236}">
-                <a16:creationId xmlns:a16="http://schemas.microsoft.com/office/drawing/2014/main" id="{650ABAD5-E216-406C-80D2-89A91C76CBB7}"/>
-              </a:ext>
-            </a:extLst>
-          </p:cNvPr>
-          <p:cNvSpPr>
-            <a:spLocks noGrp="1"/>
-          </p:cNvSpPr>
-          <p:nvPr>
-            <p:ph type="ftr" sz="quarter" idx="11"/>
-          </p:nvPr>
-        </p:nvSpPr>
-        <p:spPr/>
-        <p:txBody>
-          <a:bodyPr/>
-          <a:lstStyle/>
-          <a:p>
-            <a:r>
-              <a:rPr lang="en-US"/>
-              <a:t>Nodejs Basics</a:t>
-            </a:r>
-            <a:endParaRPr lang="en-US" dirty="0"/>
-          </a:p>
-        </p:txBody>
-      </p:sp>
-      <p:sp>
-        <p:nvSpPr>
-          <p:cNvPr id="5" name="Slide Number Placeholder 4">
-            <a:extLst>
-              <a:ext uri="{FF2B5EF4-FFF2-40B4-BE49-F238E27FC236}">
-                <a16:creationId xmlns:a16="http://schemas.microsoft.com/office/drawing/2014/main" id="{02FC62D3-2857-4769-9991-19891424A136}"/>
-              </a:ext>
-            </a:extLst>
-          </p:cNvPr>
-          <p:cNvSpPr>
-            <a:spLocks noGrp="1"/>
-          </p:cNvSpPr>
-          <p:nvPr>
-            <p:ph type="sldNum" sz="quarter" idx="12"/>
-          </p:nvPr>
-        </p:nvSpPr>
-        <p:spPr/>
-        <p:txBody>
-          <a:bodyPr/>
-          <a:lstStyle/>
-          <a:p>
-            <a:fld id="{3A98EE3D-8CD1-4C3F-BD1C-C98C9596463C}" type="slidenum">
-              <a:rPr lang="en-US" smtClean="0"/>
-              <a:t>25</a:t>
-            </a:fld>
-            <a:endParaRPr lang="en-US" dirty="0"/>
-          </a:p>
-        </p:txBody>
-      </p:sp>
-    </p:spTree>
-    <p:extLst>
-      <p:ext uri="{BB962C8B-B14F-4D97-AF65-F5344CB8AC3E}">
-        <p14:creationId xmlns:p14="http://schemas.microsoft.com/office/powerpoint/2010/main" val="569254341"/>
-      </p:ext>
-    </p:extLst>
-  </p:cSld>
-  <p:clrMapOvr>
-    <a:masterClrMapping/>
-  </p:clrMapOvr>
-</p:sld>
-</file>
-
-<file path=ppt/slides/slide26.xml><?xml version="1.0" encoding="utf-8"?>
-<p:sld xmlns:a="http://schemas.openxmlformats.org/drawingml/2006/main" xmlns:r="http://schemas.openxmlformats.org/officeDocument/2006/relationships" xmlns:p="http://schemas.openxmlformats.org/presentationml/2006/main">
-  <p:cSld>
-    <p:spTree>
-      <p:nvGrpSpPr>
-        <p:cNvPr id="1" name=""/>
-        <p:cNvGrpSpPr/>
-        <p:nvPr/>
-      </p:nvGrpSpPr>
-      <p:grpSpPr>
-        <a:xfrm>
-          <a:off x="0" y="0"/>
-          <a:ext cx="0" cy="0"/>
-          <a:chOff x="0" y="0"/>
-          <a:chExt cx="0" cy="0"/>
-        </a:xfrm>
-      </p:grpSpPr>
-      <p:sp>
-        <p:nvSpPr>
-          <p:cNvPr id="2" name="Title 1">
-            <a:extLst>
-              <a:ext uri="{FF2B5EF4-FFF2-40B4-BE49-F238E27FC236}">
-                <a16:creationId xmlns:a16="http://schemas.microsoft.com/office/drawing/2014/main" id="{4B7B2541-47BC-4B1B-9EA3-47F3951037C4}"/>
-              </a:ext>
-            </a:extLst>
-          </p:cNvPr>
-          <p:cNvSpPr>
-            <a:spLocks noGrp="1"/>
-          </p:cNvSpPr>
-          <p:nvPr>
-            <p:ph type="title"/>
-          </p:nvPr>
-        </p:nvSpPr>
-        <p:spPr/>
-        <p:txBody>
-          <a:bodyPr/>
-          <a:lstStyle/>
-          <a:p>
-            <a:r>
-              <a:rPr lang="en-US" dirty="0"/>
-              <a:t>Demo</a:t>
-            </a:r>
-          </a:p>
-        </p:txBody>
-      </p:sp>
-      <p:sp>
-        <p:nvSpPr>
-          <p:cNvPr id="3" name="Content Placeholder 2">
-            <a:extLst>
-              <a:ext uri="{FF2B5EF4-FFF2-40B4-BE49-F238E27FC236}">
-                <a16:creationId xmlns:a16="http://schemas.microsoft.com/office/drawing/2014/main" id="{CC019233-64DB-48EE-819B-7A49C8B7AB1C}"/>
-              </a:ext>
-            </a:extLst>
-          </p:cNvPr>
-          <p:cNvSpPr>
-            <a:spLocks noGrp="1"/>
-          </p:cNvSpPr>
-          <p:nvPr>
-            <p:ph idx="1"/>
-          </p:nvPr>
-        </p:nvSpPr>
-        <p:spPr/>
-        <p:txBody>
-          <a:bodyPr/>
-          <a:lstStyle/>
-          <a:p>
-            <a:r>
-              <a:rPr lang="en-US" dirty="0"/>
-              <a:t>Payload type transforming</a:t>
-            </a:r>
-          </a:p>
-          <a:p>
-            <a:pPr lvl="1"/>
-            <a:r>
-              <a:rPr lang="en-US" dirty="0" err="1">
-                <a:latin typeface="Consolas" panose="020B0609020204030204" pitchFamily="49" charset="0"/>
-              </a:rPr>
-              <a:t>instanceof</a:t>
-            </a:r>
-            <a:r>
-              <a:rPr lang="en-US" dirty="0"/>
-              <a:t> ?</a:t>
-            </a:r>
-          </a:p>
-          <a:p>
-            <a:pPr lvl="2"/>
-            <a:r>
-              <a:rPr lang="en-US" dirty="0"/>
-              <a:t>Payloads are not the class itself</a:t>
-            </a:r>
-          </a:p>
-          <a:p>
-            <a:pPr lvl="1"/>
-            <a:r>
-              <a:rPr lang="en-US" dirty="0">
-                <a:latin typeface="Consolas" panose="020B0609020204030204" pitchFamily="49" charset="0"/>
-              </a:rPr>
-              <a:t>transform: true</a:t>
-            </a:r>
-          </a:p>
-          <a:p>
-            <a:pPr lvl="2"/>
-            <a:r>
-              <a:rPr lang="en-US" dirty="0"/>
-              <a:t>Now try </a:t>
-            </a:r>
-            <a:r>
-              <a:rPr lang="en-US" sz="2100" dirty="0" err="1">
-                <a:latin typeface="Consolas" panose="020B0609020204030204" pitchFamily="49" charset="0"/>
-              </a:rPr>
-              <a:t>instanceof</a:t>
-            </a:r>
-            <a:r>
-              <a:rPr lang="en-US" dirty="0"/>
-              <a:t> again</a:t>
-            </a:r>
-          </a:p>
-          <a:p>
-            <a:pPr lvl="1"/>
-            <a:r>
-              <a:rPr lang="en-US" dirty="0"/>
-              <a:t>Every query or path params are strings</a:t>
-            </a:r>
-          </a:p>
-          <a:p>
-            <a:pPr lvl="2"/>
-            <a:r>
-              <a:rPr lang="en-US" dirty="0"/>
-              <a:t>Use </a:t>
-            </a:r>
-            <a:r>
-              <a:rPr lang="en-US" sz="2100" dirty="0" err="1">
-                <a:latin typeface="Consolas" panose="020B0609020204030204" pitchFamily="49" charset="0"/>
-              </a:rPr>
-              <a:t>typeof</a:t>
-            </a:r>
-            <a:r>
-              <a:rPr lang="en-US" dirty="0"/>
-              <a:t> to test</a:t>
-            </a:r>
-          </a:p>
-        </p:txBody>
-      </p:sp>
-      <p:sp>
-        <p:nvSpPr>
-          <p:cNvPr id="4" name="Footer Placeholder 3">
-            <a:extLst>
-              <a:ext uri="{FF2B5EF4-FFF2-40B4-BE49-F238E27FC236}">
-                <a16:creationId xmlns:a16="http://schemas.microsoft.com/office/drawing/2014/main" id="{AD2E8C46-98AF-4B5E-9274-906B9FAC185C}"/>
-              </a:ext>
-            </a:extLst>
-          </p:cNvPr>
-          <p:cNvSpPr>
-            <a:spLocks noGrp="1"/>
-          </p:cNvSpPr>
-          <p:nvPr>
-            <p:ph type="ftr" sz="quarter" idx="11"/>
-          </p:nvPr>
-        </p:nvSpPr>
-        <p:spPr/>
-        <p:txBody>
-          <a:bodyPr/>
-          <a:lstStyle/>
-          <a:p>
-            <a:r>
-              <a:rPr lang="en-US"/>
-              <a:t>Nodejs Basics</a:t>
-            </a:r>
-            <a:endParaRPr lang="en-US" dirty="0"/>
-          </a:p>
-        </p:txBody>
-      </p:sp>
-      <p:sp>
-        <p:nvSpPr>
-          <p:cNvPr id="5" name="Slide Number Placeholder 4">
-            <a:extLst>
-              <a:ext uri="{FF2B5EF4-FFF2-40B4-BE49-F238E27FC236}">
-                <a16:creationId xmlns:a16="http://schemas.microsoft.com/office/drawing/2014/main" id="{13635DE3-31CF-4BFD-9170-467EF32A5B04}"/>
-              </a:ext>
-            </a:extLst>
-          </p:cNvPr>
-          <p:cNvSpPr>
-            <a:spLocks noGrp="1"/>
-          </p:cNvSpPr>
-          <p:nvPr>
-            <p:ph type="sldNum" sz="quarter" idx="12"/>
-          </p:nvPr>
-        </p:nvSpPr>
-        <p:spPr/>
-        <p:txBody>
-          <a:bodyPr/>
-          <a:lstStyle/>
-          <a:p>
-            <a:fld id="{3A98EE3D-8CD1-4C3F-BD1C-C98C9596463C}" type="slidenum">
-              <a:rPr lang="en-US" smtClean="0"/>
-              <a:t>26</a:t>
-            </a:fld>
-            <a:endParaRPr lang="en-US" dirty="0"/>
-          </a:p>
-        </p:txBody>
-      </p:sp>
-    </p:spTree>
-    <p:extLst>
-      <p:ext uri="{BB962C8B-B14F-4D97-AF65-F5344CB8AC3E}">
-        <p14:creationId xmlns:p14="http://schemas.microsoft.com/office/powerpoint/2010/main" val="2322070702"/>
-      </p:ext>
-    </p:extLst>
-  </p:cSld>
-  <p:clrMapOvr>
-    <a:masterClrMapping/>
-  </p:clrMapOvr>
-</p:sld>
-</file>
-
-<file path=ppt/slides/slide27.xml><?xml version="1.0" encoding="utf-8"?>
-<p:sld xmlns:a="http://schemas.openxmlformats.org/drawingml/2006/main" xmlns:r="http://schemas.openxmlformats.org/officeDocument/2006/relationships" xmlns:p="http://schemas.openxmlformats.org/presentationml/2006/main">
-  <p:cSld>
-    <p:spTree>
-      <p:nvGrpSpPr>
-        <p:cNvPr id="1" name=""/>
-        <p:cNvGrpSpPr/>
-        <p:nvPr/>
-      </p:nvGrpSpPr>
-      <p:grpSpPr>
-        <a:xfrm>
-          <a:off x="0" y="0"/>
-          <a:ext cx="0" cy="0"/>
-          <a:chOff x="0" y="0"/>
-          <a:chExt cx="0" cy="0"/>
-        </a:xfrm>
-      </p:grpSpPr>
-      <p:sp>
-        <p:nvSpPr>
-          <p:cNvPr id="2" name="Title 1">
-            <a:extLst>
-              <a:ext uri="{FF2B5EF4-FFF2-40B4-BE49-F238E27FC236}">
-                <a16:creationId xmlns:a16="http://schemas.microsoft.com/office/drawing/2014/main" id="{6B1A0672-14A7-4501-900C-A98EBCCF7AFE}"/>
-              </a:ext>
-            </a:extLst>
-          </p:cNvPr>
-          <p:cNvSpPr>
-            <a:spLocks noGrp="1"/>
-          </p:cNvSpPr>
-          <p:nvPr>
-            <p:ph type="title"/>
-          </p:nvPr>
-        </p:nvSpPr>
-        <p:spPr/>
-        <p:txBody>
-          <a:bodyPr/>
-          <a:lstStyle/>
-          <a:p>
-            <a:r>
-              <a:rPr lang="en-US" dirty="0" err="1"/>
-              <a:t>Excercise</a:t>
-            </a:r>
-            <a:endParaRPr lang="en-US" dirty="0"/>
-          </a:p>
-        </p:txBody>
-      </p:sp>
-      <p:sp>
-        <p:nvSpPr>
-          <p:cNvPr id="3" name="Content Placeholder 2">
-            <a:extLst>
-              <a:ext uri="{FF2B5EF4-FFF2-40B4-BE49-F238E27FC236}">
-                <a16:creationId xmlns:a16="http://schemas.microsoft.com/office/drawing/2014/main" id="{2AEB1BE9-8435-42BF-A4F1-2F148FA9187A}"/>
-              </a:ext>
-            </a:extLst>
-          </p:cNvPr>
-          <p:cNvSpPr>
-            <a:spLocks noGrp="1"/>
-          </p:cNvSpPr>
-          <p:nvPr>
-            <p:ph idx="1"/>
-          </p:nvPr>
-        </p:nvSpPr>
-        <p:spPr/>
-        <p:txBody>
-          <a:bodyPr/>
-          <a:lstStyle/>
-          <a:p>
-            <a:r>
-              <a:rPr lang="en-US" dirty="0"/>
-              <a:t>Required:</a:t>
-            </a:r>
-          </a:p>
-          <a:p>
-            <a:pPr lvl="1"/>
-            <a:r>
-              <a:rPr lang="en-US" dirty="0"/>
-              <a:t>Install nest.js and practice all we speak in this session</a:t>
-            </a:r>
-          </a:p>
-          <a:p>
-            <a:r>
-              <a:rPr lang="en-US" dirty="0"/>
-              <a:t>Optional:</a:t>
-            </a:r>
-          </a:p>
-          <a:p>
-            <a:pPr lvl="1"/>
-            <a:r>
-              <a:rPr lang="en-US" dirty="0"/>
-              <a:t>Create a validator to check if the string length is more than 3 character </a:t>
-            </a:r>
-            <a:r>
-              <a:rPr lang="en-US"/>
-              <a:t>or not</a:t>
-            </a:r>
-            <a:endParaRPr lang="en-US" dirty="0"/>
-          </a:p>
-        </p:txBody>
-      </p:sp>
-      <p:sp>
-        <p:nvSpPr>
-          <p:cNvPr id="4" name="Footer Placeholder 3">
-            <a:extLst>
-              <a:ext uri="{FF2B5EF4-FFF2-40B4-BE49-F238E27FC236}">
-                <a16:creationId xmlns:a16="http://schemas.microsoft.com/office/drawing/2014/main" id="{E3C0E9F9-B143-43AD-BD5C-508C3E46FF7B}"/>
-              </a:ext>
-            </a:extLst>
-          </p:cNvPr>
-          <p:cNvSpPr>
-            <a:spLocks noGrp="1"/>
-          </p:cNvSpPr>
-          <p:nvPr>
-            <p:ph type="ftr" sz="quarter" idx="11"/>
-          </p:nvPr>
-        </p:nvSpPr>
-        <p:spPr/>
-        <p:txBody>
-          <a:bodyPr/>
-          <a:lstStyle/>
-          <a:p>
-            <a:r>
-              <a:rPr lang="en-US"/>
-              <a:t>Nodejs Basics</a:t>
-            </a:r>
-            <a:endParaRPr lang="en-US" dirty="0"/>
-          </a:p>
-        </p:txBody>
-      </p:sp>
-      <p:sp>
-        <p:nvSpPr>
-          <p:cNvPr id="5" name="Slide Number Placeholder 4">
-            <a:extLst>
-              <a:ext uri="{FF2B5EF4-FFF2-40B4-BE49-F238E27FC236}">
-                <a16:creationId xmlns:a16="http://schemas.microsoft.com/office/drawing/2014/main" id="{1B95C015-BA9F-40C7-A04C-3B835E7354AB}"/>
-              </a:ext>
-            </a:extLst>
-          </p:cNvPr>
-          <p:cNvSpPr>
-            <a:spLocks noGrp="1"/>
-          </p:cNvSpPr>
-          <p:nvPr>
-            <p:ph type="sldNum" sz="quarter" idx="12"/>
-          </p:nvPr>
-        </p:nvSpPr>
-        <p:spPr/>
-        <p:txBody>
-          <a:bodyPr/>
-          <a:lstStyle/>
-          <a:p>
-            <a:fld id="{3A98EE3D-8CD1-4C3F-BD1C-C98C9596463C}" type="slidenum">
-              <a:rPr lang="en-US" smtClean="0"/>
-              <a:t>27</a:t>
-            </a:fld>
-            <a:endParaRPr lang="en-US" dirty="0"/>
-          </a:p>
-        </p:txBody>
-      </p:sp>
-    </p:spTree>
-    <p:extLst>
-      <p:ext uri="{BB962C8B-B14F-4D97-AF65-F5344CB8AC3E}">
-        <p14:creationId xmlns:p14="http://schemas.microsoft.com/office/powerpoint/2010/main" val="817859998"/>
       </p:ext>
     </p:extLst>
   </p:cSld>

</xml_diff>